<commit_message>
Update PRESENTACIÓN SISTEMAS DE CONTROL DE VERSIONES.pptx
Agregó Conclusiones.
</commit_message>
<xml_diff>
--- a/PRESENTACIÓN SISTEMAS DE CONTROL DE VERSIONES.pptx
+++ b/PRESENTACIÓN SISTEMAS DE CONTROL DE VERSIONES.pptx
@@ -3164,10 +3164,6 @@
               </a:rPr>
               <a:t>Agenda</a:t>
             </a:r>
-            <a:endParaRPr lang="es-SV" sz="4800" dirty="0">
-              <a:latin typeface="Arial" panose="020B0604020202020204" pitchFamily="34" charset="0"/>
-              <a:cs typeface="Arial" panose="020B0604020202020204" pitchFamily="34" charset="0"/>
-            </a:endParaRPr>
           </a:p>
         </p:txBody>
       </p:sp>
@@ -3209,19 +3205,7 @@
                 <a:latin typeface="Arial" panose="020B0604020202020204" pitchFamily="34" charset="0"/>
                 <a:cs typeface="Arial" panose="020B0604020202020204" pitchFamily="34" charset="0"/>
               </a:rPr>
-              <a:t>Definición y </a:t>
-            </a:r>
-            <a:r>
-              <a:rPr lang="es-SV" dirty="0">
-                <a:solidFill>
-                  <a:schemeClr val="bg1">
-                    <a:lumMod val="65000"/>
-                  </a:schemeClr>
-                </a:solidFill>
-                <a:latin typeface="Arial" panose="020B0604020202020204" pitchFamily="34" charset="0"/>
-                <a:cs typeface="Arial" panose="020B0604020202020204" pitchFamily="34" charset="0"/>
-              </a:rPr>
-              <a:t>Características de los Sistemas de control de versiones</a:t>
+              <a:t>Definición y Características de los Sistemas de control de versiones</a:t>
             </a:r>
           </a:p>
           <a:p>
@@ -3242,19 +3226,7 @@
                 <a:latin typeface="Arial" panose="020B0604020202020204" pitchFamily="34" charset="0"/>
                 <a:cs typeface="Arial" panose="020B0604020202020204" pitchFamily="34" charset="0"/>
               </a:rPr>
-              <a:t>Clasificación y Ejemplos de Sistemas de Control de </a:t>
-            </a:r>
-            <a:r>
-              <a:rPr lang="es-SV" dirty="0">
-                <a:solidFill>
-                  <a:schemeClr val="bg1">
-                    <a:lumMod val="65000"/>
-                  </a:schemeClr>
-                </a:solidFill>
-                <a:latin typeface="Arial" panose="020B0604020202020204" pitchFamily="34" charset="0"/>
-                <a:cs typeface="Arial" panose="020B0604020202020204" pitchFamily="34" charset="0"/>
-              </a:rPr>
-              <a:t>Versiones</a:t>
+              <a:t>Clasificación y Ejemplos de Sistemas de Control de Versiones</a:t>
             </a:r>
           </a:p>
           <a:p>
@@ -3275,29 +3247,8 @@
                 <a:latin typeface="Arial" panose="020B0604020202020204" pitchFamily="34" charset="0"/>
                 <a:cs typeface="Arial" panose="020B0604020202020204" pitchFamily="34" charset="0"/>
               </a:rPr>
-              <a:t>Ventajas y Desventajas de los Sistemas de Control de </a:t>
-            </a:r>
-            <a:r>
-              <a:rPr lang="es-SV" dirty="0">
-                <a:solidFill>
-                  <a:schemeClr val="bg1">
-                    <a:lumMod val="65000"/>
-                  </a:schemeClr>
-                </a:solidFill>
-                <a:latin typeface="Arial" panose="020B0604020202020204" pitchFamily="34" charset="0"/>
-                <a:cs typeface="Arial" panose="020B0604020202020204" pitchFamily="34" charset="0"/>
-              </a:rPr>
-              <a:t>Versiones</a:t>
-            </a:r>
-            <a:endParaRPr lang="es-SV" dirty="0">
-              <a:solidFill>
-                <a:schemeClr val="bg1">
-                  <a:lumMod val="65000"/>
-                </a:schemeClr>
-              </a:solidFill>
-              <a:latin typeface="Arial" panose="020B0604020202020204" pitchFamily="34" charset="0"/>
-              <a:cs typeface="Arial" panose="020B0604020202020204" pitchFamily="34" charset="0"/>
-            </a:endParaRPr>
+              <a:t>Ventajas y Desventajas de los Sistemas de Control de Versiones</a:t>
+            </a:r>
           </a:p>
           <a:p>
             <a:pPr marL="342900" indent="-342900" algn="just">
@@ -3318,11 +3269,6 @@
               </a:rPr>
               <a:t>Resumen</a:t>
             </a:r>
-            <a:endParaRPr lang="es-SV" dirty="0">
-              <a:latin typeface="Arial" panose="020B0604020202020204" pitchFamily="34" charset="0"/>
-              <a:ea typeface="Calibri" panose="020F0502020204030204" pitchFamily="34" charset="0"/>
-              <a:cs typeface="Arial" panose="020B0604020202020204" pitchFamily="34" charset="0"/>
-            </a:endParaRPr>
           </a:p>
           <a:p>
             <a:pPr marL="342900" indent="-342900" algn="just">
@@ -3369,31 +3315,7 @@
                 <a:latin typeface="Arial" panose="020B0604020202020204" pitchFamily="34" charset="0"/>
                 <a:cs typeface="Arial" panose="020B0604020202020204" pitchFamily="34" charset="0"/>
               </a:rPr>
-              <a:t>GITHUB </a:t>
-            </a:r>
-            <a:r>
-              <a:rPr lang="es-SV" dirty="0">
-                <a:solidFill>
-                  <a:schemeClr val="bg1">
-                    <a:lumMod val="65000"/>
-                  </a:schemeClr>
-                </a:solidFill>
-                <a:latin typeface="Arial" panose="020B0604020202020204" pitchFamily="34" charset="0"/>
-                <a:cs typeface="Arial" panose="020B0604020202020204" pitchFamily="34" charset="0"/>
-              </a:rPr>
-              <a:t>VS </a:t>
-            </a:r>
-            <a:r>
-              <a:rPr lang="es-SV" dirty="0">
-                <a:solidFill>
-                  <a:schemeClr val="bg1">
-                    <a:lumMod val="65000"/>
-                  </a:schemeClr>
-                </a:solidFill>
-                <a:latin typeface="Arial" panose="020B0604020202020204" pitchFamily="34" charset="0"/>
-                <a:cs typeface="Arial" panose="020B0604020202020204" pitchFamily="34" charset="0"/>
-              </a:rPr>
-              <a:t>GITLAB</a:t>
+              <a:t>GITHUB VS GITLAB</a:t>
             </a:r>
           </a:p>
           <a:p>
@@ -3682,10 +3604,6 @@
               </a:rPr>
               <a:t>Agenda</a:t>
             </a:r>
-            <a:endParaRPr lang="es-SV" sz="4800" dirty="0">
-              <a:latin typeface="Arial" panose="020B0604020202020204" pitchFamily="34" charset="0"/>
-              <a:cs typeface="Arial" panose="020B0604020202020204" pitchFamily="34" charset="0"/>
-            </a:endParaRPr>
           </a:p>
         </p:txBody>
       </p:sp>
@@ -3724,8 +3642,14 @@
                 <a:latin typeface="Arial" panose="020B0604020202020204" pitchFamily="34" charset="0"/>
                 <a:cs typeface="Arial" panose="020B0604020202020204" pitchFamily="34" charset="0"/>
               </a:rPr>
-              <a:t>Definición y </a:t>
-            </a:r>
+              <a:t>Definición y Características de los Sistemas de control de versiones</a:t>
+            </a:r>
+          </a:p>
+          <a:p>
+            <a:pPr marL="342900" indent="-342900" algn="just">
+              <a:buFont typeface="Symbol" panose="05050102010706020507" pitchFamily="18" charset="2"/>
+              <a:buChar char=""/>
+            </a:pPr>
             <a:r>
               <a:rPr lang="es-SV" dirty="0">
                 <a:solidFill>
@@ -3736,7 +3660,7 @@
                 <a:latin typeface="Arial" panose="020B0604020202020204" pitchFamily="34" charset="0"/>
                 <a:cs typeface="Arial" panose="020B0604020202020204" pitchFamily="34" charset="0"/>
               </a:rPr>
-              <a:t>Características de los Sistemas de control de versiones</a:t>
+              <a:t>Clasificación y Ejemplos de Sistemas de Control de Versiones</a:t>
             </a:r>
           </a:p>
           <a:p>
@@ -3754,8 +3678,14 @@
                 <a:latin typeface="Arial" panose="020B0604020202020204" pitchFamily="34" charset="0"/>
                 <a:cs typeface="Arial" panose="020B0604020202020204" pitchFamily="34" charset="0"/>
               </a:rPr>
-              <a:t>Clasificación y Ejemplos de Sistemas de Control de </a:t>
-            </a:r>
+              <a:t>Ventajas y Desventajas de los Sistemas de Control de Versiones</a:t>
+            </a:r>
+          </a:p>
+          <a:p>
+            <a:pPr marL="342900" indent="-342900" algn="just">
+              <a:buFont typeface="Symbol" panose="05050102010706020507" pitchFamily="18" charset="2"/>
+              <a:buChar char=""/>
+            </a:pPr>
             <a:r>
               <a:rPr lang="es-SV" dirty="0">
                 <a:solidFill>
@@ -3764,78 +3694,11 @@
                   </a:schemeClr>
                 </a:solidFill>
                 <a:latin typeface="Arial" panose="020B0604020202020204" pitchFamily="34" charset="0"/>
-                <a:cs typeface="Arial" panose="020B0604020202020204" pitchFamily="34" charset="0"/>
-              </a:rPr>
-              <a:t>Versiones</a:t>
-            </a:r>
-          </a:p>
-          <a:p>
-            <a:pPr marL="342900" indent="-342900" algn="just">
-              <a:buFont typeface="Symbol" panose="05050102010706020507" pitchFamily="18" charset="2"/>
-              <a:buChar char=""/>
-            </a:pPr>
-            <a:r>
-              <a:rPr lang="es-SV" dirty="0">
-                <a:solidFill>
-                  <a:schemeClr val="bg1">
-                    <a:lumMod val="65000"/>
-                  </a:schemeClr>
-                </a:solidFill>
-                <a:latin typeface="Arial" panose="020B0604020202020204" pitchFamily="34" charset="0"/>
-                <a:cs typeface="Arial" panose="020B0604020202020204" pitchFamily="34" charset="0"/>
-              </a:rPr>
-              <a:t>Ventajas y Desventajas de los Sistemas de Control de </a:t>
-            </a:r>
-            <a:r>
-              <a:rPr lang="es-SV" dirty="0">
-                <a:solidFill>
-                  <a:schemeClr val="bg1">
-                    <a:lumMod val="65000"/>
-                  </a:schemeClr>
-                </a:solidFill>
-                <a:latin typeface="Arial" panose="020B0604020202020204" pitchFamily="34" charset="0"/>
-                <a:cs typeface="Arial" panose="020B0604020202020204" pitchFamily="34" charset="0"/>
-              </a:rPr>
-              <a:t>Versiones</a:t>
-            </a:r>
-            <a:endParaRPr lang="es-SV" dirty="0">
-              <a:solidFill>
-                <a:schemeClr val="bg1">
-                  <a:lumMod val="65000"/>
-                </a:schemeClr>
-              </a:solidFill>
-              <a:latin typeface="Arial" panose="020B0604020202020204" pitchFamily="34" charset="0"/>
-              <a:cs typeface="Arial" panose="020B0604020202020204" pitchFamily="34" charset="0"/>
-            </a:endParaRPr>
-          </a:p>
-          <a:p>
-            <a:pPr marL="342900" indent="-342900" algn="just">
-              <a:buFont typeface="Symbol" panose="05050102010706020507" pitchFamily="18" charset="2"/>
-              <a:buChar char=""/>
-            </a:pPr>
-            <a:r>
-              <a:rPr lang="es-SV" dirty="0">
-                <a:solidFill>
-                  <a:schemeClr val="bg1">
-                    <a:lumMod val="65000"/>
-                  </a:schemeClr>
-                </a:solidFill>
-                <a:latin typeface="Arial" panose="020B0604020202020204" pitchFamily="34" charset="0"/>
                 <a:ea typeface="Calibri" panose="020F0502020204030204" pitchFamily="34" charset="0"/>
                 <a:cs typeface="Arial" panose="020B0604020202020204" pitchFamily="34" charset="0"/>
               </a:rPr>
               <a:t>Resumen</a:t>
             </a:r>
-            <a:endParaRPr lang="es-SV" dirty="0">
-              <a:solidFill>
-                <a:schemeClr val="bg1">
-                  <a:lumMod val="65000"/>
-                </a:schemeClr>
-              </a:solidFill>
-              <a:latin typeface="Arial" panose="020B0604020202020204" pitchFamily="34" charset="0"/>
-              <a:ea typeface="Calibri" panose="020F0502020204030204" pitchFamily="34" charset="0"/>
-              <a:cs typeface="Arial" panose="020B0604020202020204" pitchFamily="34" charset="0"/>
-            </a:endParaRPr>
           </a:p>
           <a:p>
             <a:pPr marL="342900" indent="-342900" algn="just">
@@ -3874,31 +3737,7 @@
                 <a:latin typeface="Arial" panose="020B0604020202020204" pitchFamily="34" charset="0"/>
                 <a:cs typeface="Arial" panose="020B0604020202020204" pitchFamily="34" charset="0"/>
               </a:rPr>
-              <a:t>GITHUB </a:t>
-            </a:r>
-            <a:r>
-              <a:rPr lang="es-SV" dirty="0">
-                <a:solidFill>
-                  <a:schemeClr val="bg1">
-                    <a:lumMod val="65000"/>
-                  </a:schemeClr>
-                </a:solidFill>
-                <a:latin typeface="Arial" panose="020B0604020202020204" pitchFamily="34" charset="0"/>
-                <a:cs typeface="Arial" panose="020B0604020202020204" pitchFamily="34" charset="0"/>
-              </a:rPr>
-              <a:t>VS </a:t>
-            </a:r>
-            <a:r>
-              <a:rPr lang="es-SV" dirty="0">
-                <a:solidFill>
-                  <a:schemeClr val="bg1">
-                    <a:lumMod val="65000"/>
-                  </a:schemeClr>
-                </a:solidFill>
-                <a:latin typeface="Arial" panose="020B0604020202020204" pitchFamily="34" charset="0"/>
-                <a:cs typeface="Arial" panose="020B0604020202020204" pitchFamily="34" charset="0"/>
-              </a:rPr>
-              <a:t>GITLAB</a:t>
+              <a:t>GITHUB VS GITLAB</a:t>
             </a:r>
           </a:p>
           <a:p>
@@ -6718,10 +6557,6 @@
               </a:rPr>
               <a:t>Agenda</a:t>
             </a:r>
-            <a:endParaRPr lang="es-SV" sz="4800" dirty="0">
-              <a:latin typeface="Arial" panose="020B0604020202020204" pitchFamily="34" charset="0"/>
-              <a:cs typeface="Arial" panose="020B0604020202020204" pitchFamily="34" charset="0"/>
-            </a:endParaRPr>
           </a:p>
         </p:txBody>
       </p:sp>
@@ -6763,19 +6598,7 @@
                 <a:latin typeface="Arial" panose="020B0604020202020204" pitchFamily="34" charset="0"/>
                 <a:cs typeface="Arial" panose="020B0604020202020204" pitchFamily="34" charset="0"/>
               </a:rPr>
-              <a:t>Definición y </a:t>
-            </a:r>
-            <a:r>
-              <a:rPr lang="es-SV" dirty="0">
-                <a:solidFill>
-                  <a:schemeClr val="bg1">
-                    <a:lumMod val="65000"/>
-                  </a:schemeClr>
-                </a:solidFill>
-                <a:latin typeface="Arial" panose="020B0604020202020204" pitchFamily="34" charset="0"/>
-                <a:cs typeface="Arial" panose="020B0604020202020204" pitchFamily="34" charset="0"/>
-              </a:rPr>
-              <a:t>Características de los Sistemas de control de versiones</a:t>
+              <a:t>Definición y Características de los Sistemas de control de versiones</a:t>
             </a:r>
           </a:p>
           <a:p>
@@ -6796,19 +6619,7 @@
                 <a:latin typeface="Arial" panose="020B0604020202020204" pitchFamily="34" charset="0"/>
                 <a:cs typeface="Arial" panose="020B0604020202020204" pitchFamily="34" charset="0"/>
               </a:rPr>
-              <a:t>Clasificación y Ejemplos de Sistemas de Control de </a:t>
-            </a:r>
-            <a:r>
-              <a:rPr lang="es-SV" dirty="0">
-                <a:solidFill>
-                  <a:schemeClr val="bg1">
-                    <a:lumMod val="65000"/>
-                  </a:schemeClr>
-                </a:solidFill>
-                <a:latin typeface="Arial" panose="020B0604020202020204" pitchFamily="34" charset="0"/>
-                <a:cs typeface="Arial" panose="020B0604020202020204" pitchFamily="34" charset="0"/>
-              </a:rPr>
-              <a:t>Versiones</a:t>
+              <a:t>Clasificación y Ejemplos de Sistemas de Control de Versiones</a:t>
             </a:r>
           </a:p>
           <a:p>
@@ -6829,29 +6640,8 @@
                 <a:latin typeface="Arial" panose="020B0604020202020204" pitchFamily="34" charset="0"/>
                 <a:cs typeface="Arial" panose="020B0604020202020204" pitchFamily="34" charset="0"/>
               </a:rPr>
-              <a:t>Ventajas y Desventajas de los Sistemas de Control de </a:t>
-            </a:r>
-            <a:r>
-              <a:rPr lang="es-SV" dirty="0">
-                <a:solidFill>
-                  <a:schemeClr val="bg1">
-                    <a:lumMod val="65000"/>
-                  </a:schemeClr>
-                </a:solidFill>
-                <a:latin typeface="Arial" panose="020B0604020202020204" pitchFamily="34" charset="0"/>
-                <a:cs typeface="Arial" panose="020B0604020202020204" pitchFamily="34" charset="0"/>
-              </a:rPr>
-              <a:t>Versiones</a:t>
-            </a:r>
-            <a:endParaRPr lang="es-SV" dirty="0">
-              <a:solidFill>
-                <a:schemeClr val="bg1">
-                  <a:lumMod val="65000"/>
-                </a:schemeClr>
-              </a:solidFill>
-              <a:latin typeface="Arial" panose="020B0604020202020204" pitchFamily="34" charset="0"/>
-              <a:cs typeface="Arial" panose="020B0604020202020204" pitchFamily="34" charset="0"/>
-            </a:endParaRPr>
+              <a:t>Ventajas y Desventajas de los Sistemas de Control de Versiones</a:t>
+            </a:r>
           </a:p>
           <a:p>
             <a:pPr marL="342900" indent="-342900" algn="just">
@@ -6874,16 +6664,6 @@
               </a:rPr>
               <a:t>Resumen</a:t>
             </a:r>
-            <a:endParaRPr lang="es-SV" dirty="0">
-              <a:solidFill>
-                <a:schemeClr val="bg1">
-                  <a:lumMod val="65000"/>
-                </a:schemeClr>
-              </a:solidFill>
-              <a:latin typeface="Arial" panose="020B0604020202020204" pitchFamily="34" charset="0"/>
-              <a:ea typeface="Calibri" panose="020F0502020204030204" pitchFamily="34" charset="0"/>
-              <a:cs typeface="Arial" panose="020B0604020202020204" pitchFamily="34" charset="0"/>
-            </a:endParaRPr>
           </a:p>
           <a:p>
             <a:pPr marL="342900" indent="-342900" algn="just">
@@ -6928,21 +6708,7 @@
                 <a:latin typeface="Arial" panose="020B0604020202020204" pitchFamily="34" charset="0"/>
                 <a:cs typeface="Arial" panose="020B0604020202020204" pitchFamily="34" charset="0"/>
               </a:rPr>
-              <a:t>GITHUB </a:t>
-            </a:r>
-            <a:r>
-              <a:rPr lang="es-SV" dirty="0">
-                <a:latin typeface="Arial" panose="020B0604020202020204" pitchFamily="34" charset="0"/>
-                <a:cs typeface="Arial" panose="020B0604020202020204" pitchFamily="34" charset="0"/>
-              </a:rPr>
-              <a:t>VS </a:t>
-            </a:r>
-            <a:r>
-              <a:rPr lang="es-SV" dirty="0">
-                <a:latin typeface="Arial" panose="020B0604020202020204" pitchFamily="34" charset="0"/>
-                <a:cs typeface="Arial" panose="020B0604020202020204" pitchFamily="34" charset="0"/>
-              </a:rPr>
-              <a:t>GITLAB</a:t>
+              <a:t>GITHUB VS GITLAB</a:t>
             </a:r>
           </a:p>
           <a:p>
@@ -7563,10 +7329,6 @@
               </a:rPr>
               <a:t>Objetivos</a:t>
             </a:r>
-            <a:endParaRPr lang="es-SV" sz="4800" b="1" dirty="0">
-              <a:latin typeface="Arial" panose="020B0604020202020204" pitchFamily="34" charset="0"/>
-              <a:cs typeface="Arial" panose="020B0604020202020204" pitchFamily="34" charset="0"/>
-            </a:endParaRPr>
           </a:p>
         </p:txBody>
       </p:sp>
@@ -8187,10 +7949,6 @@
               </a:rPr>
               <a:t>Agenda</a:t>
             </a:r>
-            <a:endParaRPr lang="es-SV" sz="4800" b="1" dirty="0">
-              <a:latin typeface="Arial" panose="020B0604020202020204" pitchFamily="34" charset="0"/>
-              <a:cs typeface="Arial" panose="020B0604020202020204" pitchFamily="34" charset="0"/>
-            </a:endParaRPr>
           </a:p>
         </p:txBody>
       </p:sp>
@@ -8232,19 +7990,7 @@
                 <a:latin typeface="Arial" panose="020B0604020202020204" pitchFamily="34" charset="0"/>
                 <a:cs typeface="Arial" panose="020B0604020202020204" pitchFamily="34" charset="0"/>
               </a:rPr>
-              <a:t>Definición y </a:t>
-            </a:r>
-            <a:r>
-              <a:rPr lang="es-SV" dirty="0">
-                <a:solidFill>
-                  <a:schemeClr val="bg1">
-                    <a:lumMod val="65000"/>
-                  </a:schemeClr>
-                </a:solidFill>
-                <a:latin typeface="Arial" panose="020B0604020202020204" pitchFamily="34" charset="0"/>
-                <a:cs typeface="Arial" panose="020B0604020202020204" pitchFamily="34" charset="0"/>
-              </a:rPr>
-              <a:t>Características de los Sistemas de control de versiones</a:t>
+              <a:t>Definición y Características de los Sistemas de control de versiones</a:t>
             </a:r>
           </a:p>
           <a:p>
@@ -8265,19 +8011,7 @@
                 <a:latin typeface="Arial" panose="020B0604020202020204" pitchFamily="34" charset="0"/>
                 <a:cs typeface="Arial" panose="020B0604020202020204" pitchFamily="34" charset="0"/>
               </a:rPr>
-              <a:t>Clasificación y Ejemplos de Sistemas de Control de </a:t>
-            </a:r>
-            <a:r>
-              <a:rPr lang="es-SV" dirty="0">
-                <a:solidFill>
-                  <a:schemeClr val="bg1">
-                    <a:lumMod val="65000"/>
-                  </a:schemeClr>
-                </a:solidFill>
-                <a:latin typeface="Arial" panose="020B0604020202020204" pitchFamily="34" charset="0"/>
-                <a:cs typeface="Arial" panose="020B0604020202020204" pitchFamily="34" charset="0"/>
-              </a:rPr>
-              <a:t>Versiones</a:t>
+              <a:t>Clasificación y Ejemplos de Sistemas de Control de Versiones</a:t>
             </a:r>
           </a:p>
           <a:p>
@@ -8298,29 +8032,8 @@
                 <a:latin typeface="Arial" panose="020B0604020202020204" pitchFamily="34" charset="0"/>
                 <a:cs typeface="Arial" panose="020B0604020202020204" pitchFamily="34" charset="0"/>
               </a:rPr>
-              <a:t>Ventajas y Desventajas de los Sistemas de Control de </a:t>
-            </a:r>
-            <a:r>
-              <a:rPr lang="es-SV" dirty="0">
-                <a:solidFill>
-                  <a:schemeClr val="bg1">
-                    <a:lumMod val="65000"/>
-                  </a:schemeClr>
-                </a:solidFill>
-                <a:latin typeface="Arial" panose="020B0604020202020204" pitchFamily="34" charset="0"/>
-                <a:cs typeface="Arial" panose="020B0604020202020204" pitchFamily="34" charset="0"/>
-              </a:rPr>
-              <a:t>Versiones</a:t>
-            </a:r>
-            <a:endParaRPr lang="es-SV" dirty="0">
-              <a:solidFill>
-                <a:schemeClr val="bg1">
-                  <a:lumMod val="65000"/>
-                </a:schemeClr>
-              </a:solidFill>
-              <a:latin typeface="Arial" panose="020B0604020202020204" pitchFamily="34" charset="0"/>
-              <a:cs typeface="Arial" panose="020B0604020202020204" pitchFamily="34" charset="0"/>
-            </a:endParaRPr>
+              <a:t>Ventajas y Desventajas de los Sistemas de Control de Versiones</a:t>
+            </a:r>
           </a:p>
           <a:p>
             <a:pPr marL="342900" indent="-342900" algn="just">
@@ -8343,16 +8056,6 @@
               </a:rPr>
               <a:t>Resumen</a:t>
             </a:r>
-            <a:endParaRPr lang="es-SV" dirty="0">
-              <a:solidFill>
-                <a:schemeClr val="bg1">
-                  <a:lumMod val="65000"/>
-                </a:schemeClr>
-              </a:solidFill>
-              <a:latin typeface="Arial" panose="020B0604020202020204" pitchFamily="34" charset="0"/>
-              <a:ea typeface="Calibri" panose="020F0502020204030204" pitchFamily="34" charset="0"/>
-              <a:cs typeface="Arial" panose="020B0604020202020204" pitchFamily="34" charset="0"/>
-            </a:endParaRPr>
           </a:p>
           <a:p>
             <a:pPr marL="342900" indent="-342900" algn="just">
@@ -8399,31 +8102,7 @@
                 <a:latin typeface="Arial" panose="020B0604020202020204" pitchFamily="34" charset="0"/>
                 <a:cs typeface="Arial" panose="020B0604020202020204" pitchFamily="34" charset="0"/>
               </a:rPr>
-              <a:t>GITHUB </a:t>
-            </a:r>
-            <a:r>
-              <a:rPr lang="es-SV" dirty="0">
-                <a:solidFill>
-                  <a:schemeClr val="bg1">
-                    <a:lumMod val="65000"/>
-                  </a:schemeClr>
-                </a:solidFill>
-                <a:latin typeface="Arial" panose="020B0604020202020204" pitchFamily="34" charset="0"/>
-                <a:cs typeface="Arial" panose="020B0604020202020204" pitchFamily="34" charset="0"/>
-              </a:rPr>
-              <a:t>VS </a:t>
-            </a:r>
-            <a:r>
-              <a:rPr lang="es-SV" dirty="0">
-                <a:solidFill>
-                  <a:schemeClr val="bg1">
-                    <a:lumMod val="65000"/>
-                  </a:schemeClr>
-                </a:solidFill>
-                <a:latin typeface="Arial" panose="020B0604020202020204" pitchFamily="34" charset="0"/>
-                <a:cs typeface="Arial" panose="020B0604020202020204" pitchFamily="34" charset="0"/>
-              </a:rPr>
-              <a:t>GITLAB</a:t>
+              <a:t>GITHUB VS GITLAB</a:t>
             </a:r>
           </a:p>
           <a:p>
@@ -8506,7 +8185,7 @@
         </p:nvSpPr>
         <p:spPr>
           <a:xfrm>
-            <a:off x="2135560" y="836713"/>
+            <a:off x="2148439" y="656409"/>
             <a:ext cx="8136904" cy="830997"/>
           </a:xfrm>
           <a:prstGeom prst="rect">
@@ -8528,23 +8207,19 @@
               </a:rPr>
               <a:t>Conclusiones</a:t>
             </a:r>
-            <a:endParaRPr lang="es-SV" sz="4800" b="1" dirty="0">
-              <a:latin typeface="Arial" panose="020B0604020202020204" pitchFamily="34" charset="0"/>
-              <a:cs typeface="Arial" panose="020B0604020202020204" pitchFamily="34" charset="0"/>
-            </a:endParaRPr>
           </a:p>
         </p:txBody>
       </p:sp>
       <p:sp>
         <p:nvSpPr>
-          <p:cNvPr id="5" name="Rectángulo 4"/>
+          <p:cNvPr id="7" name="Rectángulo 6"/>
           <p:cNvSpPr/>
           <p:nvPr/>
         </p:nvSpPr>
         <p:spPr>
           <a:xfrm>
-            <a:off x="2135560" y="1916832"/>
-            <a:ext cx="7272808" cy="369332"/>
+            <a:off x="682582" y="1676656"/>
+            <a:ext cx="10509160" cy="5078313"/>
           </a:xfrm>
           <a:prstGeom prst="rect">
             <a:avLst/>
@@ -8556,154 +8231,91 @@
           </a:bodyPr>
           <a:lstStyle/>
           <a:p>
-            <a:r>
-              <a:rPr lang="es-SV" b="1" dirty="0">
-                <a:latin typeface="Arial" panose="020B0604020202020204" pitchFamily="34" charset="0"/>
-              </a:rPr>
-              <a:t>Después de finalizar esta lección, usted debería ser capaz de:</a:t>
-            </a:r>
-            <a:endParaRPr lang="es-SV" b="1" dirty="0"/>
-          </a:p>
-        </p:txBody>
-      </p:sp>
-      <p:sp>
-        <p:nvSpPr>
-          <p:cNvPr id="7" name="Rectángulo 6"/>
-          <p:cNvSpPr/>
-          <p:nvPr/>
-        </p:nvSpPr>
-        <p:spPr>
-          <a:xfrm>
-            <a:off x="2135560" y="2420888"/>
-            <a:ext cx="8208912" cy="3780522"/>
-          </a:xfrm>
-          <a:prstGeom prst="rect">
-            <a:avLst/>
-          </a:prstGeom>
-        </p:spPr>
-        <p:txBody>
-          <a:bodyPr wrap="square">
-            <a:spAutoFit/>
-          </a:bodyPr>
-          <a:lstStyle/>
-          <a:p>
-            <a:pPr marL="342900" indent="-342900" algn="just">
+            <a:pPr marL="285750" indent="-285750" algn="just">
               <a:lnSpc>
                 <a:spcPct val="150000"/>
               </a:lnSpc>
-              <a:buFont typeface="Symbol" panose="05050102010706020507" pitchFamily="18" charset="2"/>
-              <a:buChar char=""/>
+              <a:buFont typeface="Arial" panose="020B0604020202020204" pitchFamily="34" charset="0"/>
+              <a:buChar char="•"/>
             </a:pPr>
             <a:r>
-              <a:rPr lang="es-SV" dirty="0">
-                <a:latin typeface="Arial" panose="020B0604020202020204" pitchFamily="34" charset="0"/>
-                <a:ea typeface="Calibri" panose="020F0502020204030204" pitchFamily="34" charset="0"/>
-                <a:cs typeface="Arial" panose="020B0604020202020204" pitchFamily="34" charset="0"/>
-              </a:rPr>
-              <a:t>Enumerar las Características de los Sistemas de Control de versiones.</a:t>
-            </a:r>
-          </a:p>
-          <a:p>
-            <a:pPr marL="342900" indent="-342900" algn="just">
+              <a:rPr lang="es-SV" dirty="0"/>
+              <a:t>Los </a:t>
+            </a:r>
+            <a:r>
+              <a:rPr lang="es-SV" b="1" dirty="0"/>
+              <a:t>Sistemas de Control de Versiones</a:t>
+            </a:r>
+            <a:r>
+              <a:rPr lang="es-SV" dirty="0"/>
+              <a:t>, son una herramienta indispensable para los grupos de programadores que trabajan en proyectos comunes, han evolucionado de Centralizados a Distribuidos, adquiriendo ventajas y disminuyendo el trabajo de combinar todos los sub códigos proporcionados por todos los integrantes.</a:t>
+            </a:r>
+          </a:p>
+          <a:p>
+            <a:pPr marL="285750" indent="-285750" algn="just">
               <a:lnSpc>
                 <a:spcPct val="150000"/>
               </a:lnSpc>
-              <a:buFont typeface="Symbol" panose="05050102010706020507" pitchFamily="18" charset="2"/>
-              <a:buChar char=""/>
+              <a:buFont typeface="Arial" panose="020B0604020202020204" pitchFamily="34" charset="0"/>
+              <a:buChar char="•"/>
             </a:pPr>
             <a:r>
-              <a:rPr lang="es-SV" dirty="0">
-                <a:latin typeface="Arial" panose="020B0604020202020204" pitchFamily="34" charset="0"/>
-                <a:ea typeface="Calibri" panose="020F0502020204030204" pitchFamily="34" charset="0"/>
-                <a:cs typeface="Arial" panose="020B0604020202020204" pitchFamily="34" charset="0"/>
-              </a:rPr>
-              <a:t>Destacar Ventajas y Desventajas de los Sistemas de Control  de versiones Centralizados como Distribuidos.</a:t>
-            </a:r>
-          </a:p>
-          <a:p>
-            <a:pPr marL="342900" indent="-342900" algn="just">
+              <a:rPr lang="es-SV" dirty="0"/>
+              <a:t>La irrupción del internet, las redes sociales y ahora redes de programadores, ha posibilitado el trabajo conjunto de personas en polos opuestos del planeta, combinando conocimientos, experiencias y dando como resultado mejores proyectos, más completos y eficientes.</a:t>
+            </a:r>
+          </a:p>
+          <a:p>
+            <a:pPr marL="285750" indent="-285750" algn="just">
               <a:lnSpc>
                 <a:spcPct val="150000"/>
               </a:lnSpc>
-              <a:buFont typeface="Symbol" panose="05050102010706020507" pitchFamily="18" charset="2"/>
-              <a:buChar char=""/>
+              <a:buFont typeface="Arial" panose="020B0604020202020204" pitchFamily="34" charset="0"/>
+              <a:buChar char="•"/>
             </a:pPr>
             <a:r>
-              <a:rPr lang="es-SV" dirty="0">
-                <a:latin typeface="Arial" panose="020B0604020202020204" pitchFamily="34" charset="0"/>
-                <a:ea typeface="Calibri" panose="020F0502020204030204" pitchFamily="34" charset="0"/>
-                <a:cs typeface="Arial" panose="020B0604020202020204" pitchFamily="34" charset="0"/>
-              </a:rPr>
-              <a:t>Proporcionar Ejemplos de Sistemas de Control de Versiones tanto Centralizados como Distribuidos.</a:t>
-            </a:r>
-          </a:p>
-          <a:p>
-            <a:pPr marL="342900" indent="-342900" algn="just">
+              <a:rPr lang="es-SV" b="1" dirty="0"/>
+              <a:t>El Software </a:t>
+            </a:r>
+            <a:r>
+              <a:rPr lang="es-SV" b="1" dirty="0" err="1"/>
+              <a:t>Git</a:t>
+            </a:r>
+            <a:r>
+              <a:rPr lang="es-SV" b="1" dirty="0"/>
+              <a:t>, </a:t>
+            </a:r>
+            <a:r>
+              <a:rPr lang="es-SV" dirty="0"/>
+              <a:t>proporciona de una forma fácil, intuitiva y muy efectiva la integración de las versiones y el control de cambios, el cual es una de sus virtudes al hacer uso de ramas y combinaciones de código que permite seguir ocupando la aplicación ininterrumpida mientras se modifica.</a:t>
+            </a:r>
+          </a:p>
+          <a:p>
+            <a:pPr marL="285750" indent="-285750" algn="just">
               <a:lnSpc>
                 <a:spcPct val="150000"/>
               </a:lnSpc>
-              <a:buFont typeface="Symbol" panose="05050102010706020507" pitchFamily="18" charset="2"/>
-              <a:buChar char=""/>
+              <a:buFont typeface="Arial" panose="020B0604020202020204" pitchFamily="34" charset="0"/>
+              <a:buChar char="•"/>
             </a:pPr>
             <a:r>
-              <a:rPr lang="es-SV" dirty="0">
-                <a:latin typeface="Arial" panose="020B0604020202020204" pitchFamily="34" charset="0"/>
-                <a:ea typeface="Calibri" panose="020F0502020204030204" pitchFamily="34" charset="0"/>
-                <a:cs typeface="Arial" panose="020B0604020202020204" pitchFamily="34" charset="0"/>
-              </a:rPr>
-              <a:t>Presentar el </a:t>
-            </a:r>
-            <a:r>
-              <a:rPr lang="es-SV" dirty="0" err="1">
-                <a:latin typeface="Arial" panose="020B0604020202020204" pitchFamily="34" charset="0"/>
-                <a:ea typeface="Calibri" panose="020F0502020204030204" pitchFamily="34" charset="0"/>
-                <a:cs typeface="Arial" panose="020B0604020202020204" pitchFamily="34" charset="0"/>
-              </a:rPr>
-              <a:t>Sofware</a:t>
-            </a:r>
-            <a:r>
-              <a:rPr lang="es-SV" dirty="0">
-                <a:latin typeface="Arial" panose="020B0604020202020204" pitchFamily="34" charset="0"/>
-                <a:ea typeface="Calibri" panose="020F0502020204030204" pitchFamily="34" charset="0"/>
-                <a:cs typeface="Arial" panose="020B0604020202020204" pitchFamily="34" charset="0"/>
-              </a:rPr>
-              <a:t> </a:t>
-            </a:r>
-            <a:r>
-              <a:rPr lang="es-SV" dirty="0" err="1">
-                <a:latin typeface="Arial" panose="020B0604020202020204" pitchFamily="34" charset="0"/>
-                <a:ea typeface="Calibri" panose="020F0502020204030204" pitchFamily="34" charset="0"/>
-                <a:cs typeface="Arial" panose="020B0604020202020204" pitchFamily="34" charset="0"/>
-              </a:rPr>
-              <a:t>Git</a:t>
-            </a:r>
-            <a:r>
-              <a:rPr lang="es-SV" dirty="0">
-                <a:latin typeface="Arial" panose="020B0604020202020204" pitchFamily="34" charset="0"/>
-                <a:ea typeface="Calibri" panose="020F0502020204030204" pitchFamily="34" charset="0"/>
-                <a:cs typeface="Arial" panose="020B0604020202020204" pitchFamily="34" charset="0"/>
-              </a:rPr>
-              <a:t> como alternativa para llevar el control de los proyectos, para conocerlo y aprender a implementarlo.</a:t>
-            </a:r>
-          </a:p>
-          <a:p>
-            <a:pPr marL="342900" indent="-342900" algn="just">
-              <a:lnSpc>
-                <a:spcPct val="150000"/>
-              </a:lnSpc>
-              <a:spcAft>
-                <a:spcPts val="800"/>
-              </a:spcAft>
-              <a:buFont typeface="Symbol" panose="05050102010706020507" pitchFamily="18" charset="2"/>
-              <a:buChar char=""/>
-            </a:pPr>
-            <a:r>
-              <a:rPr lang="es-SV" dirty="0">
-                <a:latin typeface="Arial" panose="020B0604020202020204" pitchFamily="34" charset="0"/>
-                <a:ea typeface="Calibri" panose="020F0502020204030204" pitchFamily="34" charset="0"/>
-                <a:cs typeface="Arial" panose="020B0604020202020204" pitchFamily="34" charset="0"/>
-              </a:rPr>
-              <a:t>Comparar las Plataformas web para distribuir y compartir proyectos usando el Software de Control de versiones GIT.</a:t>
+              <a:rPr lang="es-SV" dirty="0"/>
+              <a:t>Tanto </a:t>
+            </a:r>
+            <a:r>
+              <a:rPr lang="es-SV" b="1" dirty="0" err="1"/>
+              <a:t>GitHub</a:t>
+            </a:r>
+            <a:r>
+              <a:rPr lang="es-SV" dirty="0"/>
+              <a:t> como </a:t>
+            </a:r>
+            <a:r>
+              <a:rPr lang="es-SV" b="1" dirty="0" err="1"/>
+              <a:t>GitLab</a:t>
+            </a:r>
+            <a:r>
+              <a:rPr lang="es-SV" dirty="0"/>
+              <a:t>, proporcionan un sitio de reunión, para el control, creación y distribución de códigos de aplicaciones, donde todos pueden apoyar o aprender de los participantes.</a:t>
             </a:r>
           </a:p>
         </p:txBody>
@@ -8775,10 +8387,6 @@
               </a:rPr>
               <a:t>Agenda</a:t>
             </a:r>
-            <a:endParaRPr lang="es-SV" sz="4800" b="1" dirty="0">
-              <a:latin typeface="Arial" panose="020B0604020202020204" pitchFamily="34" charset="0"/>
-              <a:cs typeface="Arial" panose="020B0604020202020204" pitchFamily="34" charset="0"/>
-            </a:endParaRPr>
           </a:p>
         </p:txBody>
       </p:sp>
@@ -8815,14 +8423,7 @@
                 <a:latin typeface="Arial" panose="020B0604020202020204" pitchFamily="34" charset="0"/>
                 <a:cs typeface="Arial" panose="020B0604020202020204" pitchFamily="34" charset="0"/>
               </a:rPr>
-              <a:t>Definición y </a:t>
-            </a:r>
-            <a:r>
-              <a:rPr lang="es-SV" dirty="0">
-                <a:latin typeface="Arial" panose="020B0604020202020204" pitchFamily="34" charset="0"/>
-                <a:cs typeface="Arial" panose="020B0604020202020204" pitchFamily="34" charset="0"/>
-              </a:rPr>
-              <a:t>Características de los Sistemas de control de versiones</a:t>
+              <a:t>Definición y Características de los Sistemas de control de versiones</a:t>
             </a:r>
           </a:p>
           <a:p>
@@ -8838,14 +8439,7 @@
                 <a:latin typeface="Arial" panose="020B0604020202020204" pitchFamily="34" charset="0"/>
                 <a:cs typeface="Arial" panose="020B0604020202020204" pitchFamily="34" charset="0"/>
               </a:rPr>
-              <a:t>Clasificación y Ejemplos de Sistemas de Control de </a:t>
-            </a:r>
-            <a:r>
-              <a:rPr lang="es-SV" dirty="0">
-                <a:latin typeface="Arial" panose="020B0604020202020204" pitchFamily="34" charset="0"/>
-                <a:cs typeface="Arial" panose="020B0604020202020204" pitchFamily="34" charset="0"/>
-              </a:rPr>
-              <a:t>Versiones</a:t>
+              <a:t>Clasificación y Ejemplos de Sistemas de Control de Versiones</a:t>
             </a:r>
           </a:p>
           <a:p>
@@ -8861,19 +8455,8 @@
                 <a:latin typeface="Arial" panose="020B0604020202020204" pitchFamily="34" charset="0"/>
                 <a:cs typeface="Arial" panose="020B0604020202020204" pitchFamily="34" charset="0"/>
               </a:rPr>
-              <a:t>Ventajas y Desventajas de los Sistemas de Control de </a:t>
-            </a:r>
-            <a:r>
-              <a:rPr lang="es-SV" dirty="0">
-                <a:latin typeface="Arial" panose="020B0604020202020204" pitchFamily="34" charset="0"/>
-                <a:cs typeface="Arial" panose="020B0604020202020204" pitchFamily="34" charset="0"/>
-              </a:rPr>
-              <a:t>Versiones</a:t>
-            </a:r>
-            <a:endParaRPr lang="es-SV" dirty="0">
-              <a:latin typeface="Arial" panose="020B0604020202020204" pitchFamily="34" charset="0"/>
-              <a:cs typeface="Arial" panose="020B0604020202020204" pitchFamily="34" charset="0"/>
-            </a:endParaRPr>
+              <a:t>Ventajas y Desventajas de los Sistemas de Control de Versiones</a:t>
+            </a:r>
           </a:p>
           <a:p>
             <a:pPr marL="342900" indent="-342900" algn="just">
@@ -8891,11 +8474,6 @@
               </a:rPr>
               <a:t>Resumen</a:t>
             </a:r>
-            <a:endParaRPr lang="es-SV" dirty="0">
-              <a:latin typeface="Arial" panose="020B0604020202020204" pitchFamily="34" charset="0"/>
-              <a:ea typeface="Calibri" panose="020F0502020204030204" pitchFamily="34" charset="0"/>
-              <a:cs typeface="Arial" panose="020B0604020202020204" pitchFamily="34" charset="0"/>
-            </a:endParaRPr>
           </a:p>
           <a:p>
             <a:pPr marL="342900" indent="-342900" algn="just">
@@ -8932,21 +8510,7 @@
                 <a:latin typeface="Arial" panose="020B0604020202020204" pitchFamily="34" charset="0"/>
                 <a:cs typeface="Arial" panose="020B0604020202020204" pitchFamily="34" charset="0"/>
               </a:rPr>
-              <a:t>GITHUB </a:t>
-            </a:r>
-            <a:r>
-              <a:rPr lang="es-SV" dirty="0">
-                <a:latin typeface="Arial" panose="020B0604020202020204" pitchFamily="34" charset="0"/>
-                <a:cs typeface="Arial" panose="020B0604020202020204" pitchFamily="34" charset="0"/>
-              </a:rPr>
-              <a:t>VS </a:t>
-            </a:r>
-            <a:r>
-              <a:rPr lang="es-SV" dirty="0">
-                <a:latin typeface="Arial" panose="020B0604020202020204" pitchFamily="34" charset="0"/>
-                <a:cs typeface="Arial" panose="020B0604020202020204" pitchFamily="34" charset="0"/>
-              </a:rPr>
-              <a:t>GITLAB</a:t>
+              <a:t>GITHUB VS GITLAB</a:t>
             </a:r>
           </a:p>
           <a:p>
@@ -9048,10 +8612,6 @@
               </a:rPr>
               <a:t>Agenda</a:t>
             </a:r>
-            <a:endParaRPr lang="es-SV" sz="4800" dirty="0">
-              <a:latin typeface="Arial" panose="020B0604020202020204" pitchFamily="34" charset="0"/>
-              <a:cs typeface="Arial" panose="020B0604020202020204" pitchFamily="34" charset="0"/>
-            </a:endParaRPr>
           </a:p>
         </p:txBody>
       </p:sp>
@@ -9091,14 +8651,7 @@
                 <a:latin typeface="Arial" panose="020B0604020202020204" pitchFamily="34" charset="0"/>
                 <a:cs typeface="Arial" panose="020B0604020202020204" pitchFamily="34" charset="0"/>
               </a:rPr>
-              <a:t>Definición y </a:t>
-            </a:r>
-            <a:r>
-              <a:rPr lang="es-SV" dirty="0">
-                <a:latin typeface="Arial" panose="020B0604020202020204" pitchFamily="34" charset="0"/>
-                <a:cs typeface="Arial" panose="020B0604020202020204" pitchFamily="34" charset="0"/>
-              </a:rPr>
-              <a:t>Características de los Sistemas de control de versiones</a:t>
+              <a:t>Definición y Características de los Sistemas de control de versiones</a:t>
             </a:r>
           </a:p>
           <a:p>
@@ -9119,19 +8672,7 @@
                 <a:latin typeface="Arial" panose="020B0604020202020204" pitchFamily="34" charset="0"/>
                 <a:cs typeface="Arial" panose="020B0604020202020204" pitchFamily="34" charset="0"/>
               </a:rPr>
-              <a:t>Clasificación y Ejemplos de Sistemas de Control de </a:t>
-            </a:r>
-            <a:r>
-              <a:rPr lang="es-SV" dirty="0">
-                <a:solidFill>
-                  <a:schemeClr val="bg1">
-                    <a:lumMod val="65000"/>
-                  </a:schemeClr>
-                </a:solidFill>
-                <a:latin typeface="Arial" panose="020B0604020202020204" pitchFamily="34" charset="0"/>
-                <a:cs typeface="Arial" panose="020B0604020202020204" pitchFamily="34" charset="0"/>
-              </a:rPr>
-              <a:t>Versiones</a:t>
+              <a:t>Clasificación y Ejemplos de Sistemas de Control de Versiones</a:t>
             </a:r>
           </a:p>
           <a:p>
@@ -9152,29 +8693,8 @@
                 <a:latin typeface="Arial" panose="020B0604020202020204" pitchFamily="34" charset="0"/>
                 <a:cs typeface="Arial" panose="020B0604020202020204" pitchFamily="34" charset="0"/>
               </a:rPr>
-              <a:t>Ventajas y Desventajas de los Sistemas de Control de </a:t>
-            </a:r>
-            <a:r>
-              <a:rPr lang="es-SV" dirty="0">
-                <a:solidFill>
-                  <a:schemeClr val="bg1">
-                    <a:lumMod val="65000"/>
-                  </a:schemeClr>
-                </a:solidFill>
-                <a:latin typeface="Arial" panose="020B0604020202020204" pitchFamily="34" charset="0"/>
-                <a:cs typeface="Arial" panose="020B0604020202020204" pitchFamily="34" charset="0"/>
-              </a:rPr>
-              <a:t>Versiones</a:t>
-            </a:r>
-            <a:endParaRPr lang="es-SV" dirty="0">
-              <a:solidFill>
-                <a:schemeClr val="bg1">
-                  <a:lumMod val="65000"/>
-                </a:schemeClr>
-              </a:solidFill>
-              <a:latin typeface="Arial" panose="020B0604020202020204" pitchFamily="34" charset="0"/>
-              <a:cs typeface="Arial" panose="020B0604020202020204" pitchFamily="34" charset="0"/>
-            </a:endParaRPr>
+              <a:t>Ventajas y Desventajas de los Sistemas de Control de Versiones</a:t>
+            </a:r>
           </a:p>
           <a:p>
             <a:pPr marL="342900" indent="-342900" algn="just">
@@ -9197,16 +8717,6 @@
               </a:rPr>
               <a:t>Resumen</a:t>
             </a:r>
-            <a:endParaRPr lang="es-SV" dirty="0">
-              <a:solidFill>
-                <a:schemeClr val="bg1">
-                  <a:lumMod val="65000"/>
-                </a:schemeClr>
-              </a:solidFill>
-              <a:latin typeface="Arial" panose="020B0604020202020204" pitchFamily="34" charset="0"/>
-              <a:ea typeface="Calibri" panose="020F0502020204030204" pitchFamily="34" charset="0"/>
-              <a:cs typeface="Arial" panose="020B0604020202020204" pitchFamily="34" charset="0"/>
-            </a:endParaRPr>
           </a:p>
           <a:p>
             <a:pPr marL="342900" indent="-342900" algn="just">
@@ -9253,31 +8763,7 @@
                 <a:latin typeface="Arial" panose="020B0604020202020204" pitchFamily="34" charset="0"/>
                 <a:cs typeface="Arial" panose="020B0604020202020204" pitchFamily="34" charset="0"/>
               </a:rPr>
-              <a:t>GITHUB </a:t>
-            </a:r>
-            <a:r>
-              <a:rPr lang="es-SV" dirty="0">
-                <a:solidFill>
-                  <a:schemeClr val="bg1">
-                    <a:lumMod val="65000"/>
-                  </a:schemeClr>
-                </a:solidFill>
-                <a:latin typeface="Arial" panose="020B0604020202020204" pitchFamily="34" charset="0"/>
-                <a:cs typeface="Arial" panose="020B0604020202020204" pitchFamily="34" charset="0"/>
-              </a:rPr>
-              <a:t>VS </a:t>
-            </a:r>
-            <a:r>
-              <a:rPr lang="es-SV" dirty="0">
-                <a:solidFill>
-                  <a:schemeClr val="bg1">
-                    <a:lumMod val="65000"/>
-                  </a:schemeClr>
-                </a:solidFill>
-                <a:latin typeface="Arial" panose="020B0604020202020204" pitchFamily="34" charset="0"/>
-                <a:cs typeface="Arial" panose="020B0604020202020204" pitchFamily="34" charset="0"/>
-              </a:rPr>
-              <a:t>GITLAB</a:t>
+              <a:t>GITHUB VS GITLAB</a:t>
             </a:r>
           </a:p>
           <a:p>
@@ -9691,10 +9177,6 @@
               </a:rPr>
               <a:t>Agenda</a:t>
             </a:r>
-            <a:endParaRPr lang="es-SV" sz="4800" dirty="0">
-              <a:latin typeface="Arial" panose="020B0604020202020204" pitchFamily="34" charset="0"/>
-              <a:cs typeface="Arial" panose="020B0604020202020204" pitchFamily="34" charset="0"/>
-            </a:endParaRPr>
           </a:p>
         </p:txBody>
       </p:sp>
@@ -9736,19 +9218,7 @@
                 <a:latin typeface="Arial" panose="020B0604020202020204" pitchFamily="34" charset="0"/>
                 <a:cs typeface="Arial" panose="020B0604020202020204" pitchFamily="34" charset="0"/>
               </a:rPr>
-              <a:t>Definición y </a:t>
-            </a:r>
-            <a:r>
-              <a:rPr lang="es-SV" dirty="0">
-                <a:solidFill>
-                  <a:schemeClr val="bg1">
-                    <a:lumMod val="65000"/>
-                  </a:schemeClr>
-                </a:solidFill>
-                <a:latin typeface="Arial" panose="020B0604020202020204" pitchFamily="34" charset="0"/>
-                <a:cs typeface="Arial" panose="020B0604020202020204" pitchFamily="34" charset="0"/>
-              </a:rPr>
-              <a:t>Características de los Sistemas de control de versiones</a:t>
+              <a:t>Definición y Características de los Sistemas de control de versiones</a:t>
             </a:r>
           </a:p>
           <a:p>
@@ -9767,14 +9237,7 @@
                 <a:latin typeface="Arial" panose="020B0604020202020204" pitchFamily="34" charset="0"/>
                 <a:cs typeface="Arial" panose="020B0604020202020204" pitchFamily="34" charset="0"/>
               </a:rPr>
-              <a:t>Clasificación y Ejemplos de Sistemas de Control de </a:t>
-            </a:r>
-            <a:r>
-              <a:rPr lang="es-SV" dirty="0">
-                <a:latin typeface="Arial" panose="020B0604020202020204" pitchFamily="34" charset="0"/>
-                <a:cs typeface="Arial" panose="020B0604020202020204" pitchFamily="34" charset="0"/>
-              </a:rPr>
-              <a:t>Versiones</a:t>
+              <a:t>Clasificación y Ejemplos de Sistemas de Control de Versiones</a:t>
             </a:r>
           </a:p>
           <a:p>
@@ -9795,29 +9258,8 @@
                 <a:latin typeface="Arial" panose="020B0604020202020204" pitchFamily="34" charset="0"/>
                 <a:cs typeface="Arial" panose="020B0604020202020204" pitchFamily="34" charset="0"/>
               </a:rPr>
-              <a:t>Ventajas y Desventajas de los Sistemas de Control de </a:t>
-            </a:r>
-            <a:r>
-              <a:rPr lang="es-SV" dirty="0">
-                <a:solidFill>
-                  <a:schemeClr val="bg1">
-                    <a:lumMod val="65000"/>
-                  </a:schemeClr>
-                </a:solidFill>
-                <a:latin typeface="Arial" panose="020B0604020202020204" pitchFamily="34" charset="0"/>
-                <a:cs typeface="Arial" panose="020B0604020202020204" pitchFamily="34" charset="0"/>
-              </a:rPr>
-              <a:t>Versiones</a:t>
-            </a:r>
-            <a:endParaRPr lang="es-SV" dirty="0">
-              <a:solidFill>
-                <a:schemeClr val="bg1">
-                  <a:lumMod val="65000"/>
-                </a:schemeClr>
-              </a:solidFill>
-              <a:latin typeface="Arial" panose="020B0604020202020204" pitchFamily="34" charset="0"/>
-              <a:cs typeface="Arial" panose="020B0604020202020204" pitchFamily="34" charset="0"/>
-            </a:endParaRPr>
+              <a:t>Ventajas y Desventajas de los Sistemas de Control de Versiones</a:t>
+            </a:r>
           </a:p>
           <a:p>
             <a:pPr marL="342900" indent="-342900" algn="just">
@@ -9840,16 +9282,6 @@
               </a:rPr>
               <a:t>Resumen</a:t>
             </a:r>
-            <a:endParaRPr lang="es-SV" dirty="0">
-              <a:solidFill>
-                <a:schemeClr val="bg1">
-                  <a:lumMod val="65000"/>
-                </a:schemeClr>
-              </a:solidFill>
-              <a:latin typeface="Arial" panose="020B0604020202020204" pitchFamily="34" charset="0"/>
-              <a:ea typeface="Calibri" panose="020F0502020204030204" pitchFamily="34" charset="0"/>
-              <a:cs typeface="Arial" panose="020B0604020202020204" pitchFamily="34" charset="0"/>
-            </a:endParaRPr>
           </a:p>
           <a:p>
             <a:pPr marL="342900" indent="-342900" algn="just">
@@ -9896,31 +9328,7 @@
                 <a:latin typeface="Arial" panose="020B0604020202020204" pitchFamily="34" charset="0"/>
                 <a:cs typeface="Arial" panose="020B0604020202020204" pitchFamily="34" charset="0"/>
               </a:rPr>
-              <a:t>GITHUB </a:t>
-            </a:r>
-            <a:r>
-              <a:rPr lang="es-SV" dirty="0">
-                <a:solidFill>
-                  <a:schemeClr val="bg1">
-                    <a:lumMod val="65000"/>
-                  </a:schemeClr>
-                </a:solidFill>
-                <a:latin typeface="Arial" panose="020B0604020202020204" pitchFamily="34" charset="0"/>
-                <a:cs typeface="Arial" panose="020B0604020202020204" pitchFamily="34" charset="0"/>
-              </a:rPr>
-              <a:t>VS </a:t>
-            </a:r>
-            <a:r>
-              <a:rPr lang="es-SV" dirty="0">
-                <a:solidFill>
-                  <a:schemeClr val="bg1">
-                    <a:lumMod val="65000"/>
-                  </a:schemeClr>
-                </a:solidFill>
-                <a:latin typeface="Arial" panose="020B0604020202020204" pitchFamily="34" charset="0"/>
-                <a:cs typeface="Arial" panose="020B0604020202020204" pitchFamily="34" charset="0"/>
-              </a:rPr>
-              <a:t>GITLAB</a:t>
+              <a:t>GITHUB VS GITLAB</a:t>
             </a:r>
           </a:p>
           <a:p>
@@ -10060,14 +9468,14 @@
                 <a:gridCol w="573178">
                   <a:extLst>
                     <a:ext uri="{9D8B030D-6E8A-4147-A177-3AD203B41FA5}">
-                      <a16:colId xmlns="" xmlns:a16="http://schemas.microsoft.com/office/drawing/2014/main" val="2342766503"/>
+                      <a16:colId xmlns:a16="http://schemas.microsoft.com/office/drawing/2014/main" xmlns="" val="2342766503"/>
                     </a:ext>
                   </a:extLst>
                 </a:gridCol>
                 <a:gridCol w="8964523">
                   <a:extLst>
                     <a:ext uri="{9D8B030D-6E8A-4147-A177-3AD203B41FA5}">
-                      <a16:colId xmlns="" xmlns:a16="http://schemas.microsoft.com/office/drawing/2014/main" val="583804734"/>
+                      <a16:colId xmlns:a16="http://schemas.microsoft.com/office/drawing/2014/main" xmlns="" val="583804734"/>
                     </a:ext>
                   </a:extLst>
                 </a:gridCol>
@@ -10174,7 +9582,7 @@
                 </a:tc>
                 <a:extLst>
                   <a:ext uri="{0D108BD9-81ED-4DB2-BD59-A6C34878D82A}">
-                    <a16:rowId xmlns="" xmlns:a16="http://schemas.microsoft.com/office/drawing/2014/main" val="3762790894"/>
+                    <a16:rowId xmlns:a16="http://schemas.microsoft.com/office/drawing/2014/main" xmlns="" val="3762790894"/>
                   </a:ext>
                 </a:extLst>
               </a:tr>
@@ -10280,7 +9688,7 @@
                 </a:tc>
                 <a:extLst>
                   <a:ext uri="{0D108BD9-81ED-4DB2-BD59-A6C34878D82A}">
-                    <a16:rowId xmlns="" xmlns:a16="http://schemas.microsoft.com/office/drawing/2014/main" val="2998220991"/>
+                    <a16:rowId xmlns:a16="http://schemas.microsoft.com/office/drawing/2014/main" xmlns="" val="2998220991"/>
                   </a:ext>
                 </a:extLst>
               </a:tr>
@@ -10897,10 +10305,6 @@
               </a:rPr>
               <a:t>Agenda</a:t>
             </a:r>
-            <a:endParaRPr lang="es-SV" sz="4800" dirty="0">
-              <a:latin typeface="Arial" panose="020B0604020202020204" pitchFamily="34" charset="0"/>
-              <a:cs typeface="Arial" panose="020B0604020202020204" pitchFamily="34" charset="0"/>
-            </a:endParaRPr>
           </a:p>
         </p:txBody>
       </p:sp>
@@ -10942,19 +10346,7 @@
                 <a:latin typeface="Arial" panose="020B0604020202020204" pitchFamily="34" charset="0"/>
                 <a:cs typeface="Arial" panose="020B0604020202020204" pitchFamily="34" charset="0"/>
               </a:rPr>
-              <a:t>Definición y </a:t>
-            </a:r>
-            <a:r>
-              <a:rPr lang="es-SV" dirty="0">
-                <a:solidFill>
-                  <a:schemeClr val="bg1">
-                    <a:lumMod val="65000"/>
-                  </a:schemeClr>
-                </a:solidFill>
-                <a:latin typeface="Arial" panose="020B0604020202020204" pitchFamily="34" charset="0"/>
-                <a:cs typeface="Arial" panose="020B0604020202020204" pitchFamily="34" charset="0"/>
-              </a:rPr>
-              <a:t>Características de los Sistemas de control de versiones</a:t>
+              <a:t>Definición y Características de los Sistemas de control de versiones</a:t>
             </a:r>
           </a:p>
           <a:p>
@@ -10975,19 +10367,7 @@
                 <a:latin typeface="Arial" panose="020B0604020202020204" pitchFamily="34" charset="0"/>
                 <a:cs typeface="Arial" panose="020B0604020202020204" pitchFamily="34" charset="0"/>
               </a:rPr>
-              <a:t>Clasificación y Ejemplos de Sistemas de Control de </a:t>
-            </a:r>
-            <a:r>
-              <a:rPr lang="es-SV" dirty="0">
-                <a:solidFill>
-                  <a:schemeClr val="bg1">
-                    <a:lumMod val="65000"/>
-                  </a:schemeClr>
-                </a:solidFill>
-                <a:latin typeface="Arial" panose="020B0604020202020204" pitchFamily="34" charset="0"/>
-                <a:cs typeface="Arial" panose="020B0604020202020204" pitchFamily="34" charset="0"/>
-              </a:rPr>
-              <a:t>Versiones</a:t>
+              <a:t>Clasificación y Ejemplos de Sistemas de Control de Versiones</a:t>
             </a:r>
           </a:p>
           <a:p>
@@ -11006,19 +10386,8 @@
                 <a:latin typeface="Arial" panose="020B0604020202020204" pitchFamily="34" charset="0"/>
                 <a:cs typeface="Arial" panose="020B0604020202020204" pitchFamily="34" charset="0"/>
               </a:rPr>
-              <a:t>Ventajas y Desventajas de los Sistemas de Control de </a:t>
-            </a:r>
-            <a:r>
-              <a:rPr lang="es-SV" dirty="0">
-                <a:latin typeface="Arial" panose="020B0604020202020204" pitchFamily="34" charset="0"/>
-                <a:cs typeface="Arial" panose="020B0604020202020204" pitchFamily="34" charset="0"/>
-              </a:rPr>
-              <a:t>Versiones</a:t>
-            </a:r>
-            <a:endParaRPr lang="es-SV" dirty="0">
-              <a:latin typeface="Arial" panose="020B0604020202020204" pitchFamily="34" charset="0"/>
-              <a:cs typeface="Arial" panose="020B0604020202020204" pitchFamily="34" charset="0"/>
-            </a:endParaRPr>
+              <a:t>Ventajas y Desventajas de los Sistemas de Control de Versiones</a:t>
+            </a:r>
           </a:p>
           <a:p>
             <a:pPr marL="342900" indent="-342900" algn="just">
@@ -11041,16 +10410,6 @@
               </a:rPr>
               <a:t>Resumen</a:t>
             </a:r>
-            <a:endParaRPr lang="es-SV" dirty="0">
-              <a:solidFill>
-                <a:schemeClr val="bg1">
-                  <a:lumMod val="65000"/>
-                </a:schemeClr>
-              </a:solidFill>
-              <a:latin typeface="Arial" panose="020B0604020202020204" pitchFamily="34" charset="0"/>
-              <a:ea typeface="Calibri" panose="020F0502020204030204" pitchFamily="34" charset="0"/>
-              <a:cs typeface="Arial" panose="020B0604020202020204" pitchFamily="34" charset="0"/>
-            </a:endParaRPr>
           </a:p>
           <a:p>
             <a:pPr marL="342900" indent="-342900" algn="just">
@@ -11097,31 +10456,7 @@
                 <a:latin typeface="Arial" panose="020B0604020202020204" pitchFamily="34" charset="0"/>
                 <a:cs typeface="Arial" panose="020B0604020202020204" pitchFamily="34" charset="0"/>
               </a:rPr>
-              <a:t>GITHUB </a:t>
-            </a:r>
-            <a:r>
-              <a:rPr lang="es-SV" dirty="0">
-                <a:solidFill>
-                  <a:schemeClr val="bg1">
-                    <a:lumMod val="65000"/>
-                  </a:schemeClr>
-                </a:solidFill>
-                <a:latin typeface="Arial" panose="020B0604020202020204" pitchFamily="34" charset="0"/>
-                <a:cs typeface="Arial" panose="020B0604020202020204" pitchFamily="34" charset="0"/>
-              </a:rPr>
-              <a:t>VS </a:t>
-            </a:r>
-            <a:r>
-              <a:rPr lang="es-SV" dirty="0">
-                <a:solidFill>
-                  <a:schemeClr val="bg1">
-                    <a:lumMod val="65000"/>
-                  </a:schemeClr>
-                </a:solidFill>
-                <a:latin typeface="Arial" panose="020B0604020202020204" pitchFamily="34" charset="0"/>
-                <a:cs typeface="Arial" panose="020B0604020202020204" pitchFamily="34" charset="0"/>
-              </a:rPr>
-              <a:t>GITLAB</a:t>
+              <a:t>GITHUB VS GITLAB</a:t>
             </a:r>
           </a:p>
           <a:p>

</xml_diff>

<commit_message>
Adicion de ejemplos en presentacion
</commit_message>
<xml_diff>
--- a/PRESENTACIÓN SISTEMAS DE CONTROL DE VERSIONES.pptx
+++ b/PRESENTACIÓN SISTEMAS DE CONTROL DE VERSIONES.pptx
@@ -26,8 +26,12 @@
     <p:sldId id="270" r:id="rId20"/>
     <p:sldId id="271" r:id="rId21"/>
     <p:sldId id="272" r:id="rId22"/>
-    <p:sldId id="283" r:id="rId23"/>
-    <p:sldId id="284" r:id="rId24"/>
+    <p:sldId id="285" r:id="rId23"/>
+    <p:sldId id="286" r:id="rId24"/>
+    <p:sldId id="287" r:id="rId25"/>
+    <p:sldId id="288" r:id="rId26"/>
+    <p:sldId id="283" r:id="rId27"/>
+    <p:sldId id="284" r:id="rId28"/>
   </p:sldIdLst>
   <p:sldSz cx="12192000" cy="6858000"/>
   <p:notesSz cx="6858000" cy="9144000"/>
@@ -187,7 +191,7 @@
           </a:lstStyle>
           <a:p>
             <a:r>
-              <a:rPr lang="es-ES" smtClean="0"/>
+              <a:rPr lang="es-ES"/>
               <a:t>Haga clic para modificar el estilo de título del patrón</a:t>
             </a:r>
             <a:endParaRPr lang="es-SV"/>
@@ -252,7 +256,7 @@
           </a:lstStyle>
           <a:p>
             <a:r>
-              <a:rPr lang="es-ES" smtClean="0"/>
+              <a:rPr lang="es-ES"/>
               <a:t>Haga clic para editar el estilo de subtítulo del patrón</a:t>
             </a:r>
             <a:endParaRPr lang="es-SV"/>
@@ -276,7 +280,7 @@
           <a:p>
             <a:fld id="{BACD905E-5B96-466E-AB84-775EAD2AD0C0}" type="datetimeFigureOut">
               <a:rPr lang="es-SV" smtClean="0"/>
-              <a:t>15/09/2019</a:t>
+              <a:t>15/9/2019</a:t>
             </a:fld>
             <a:endParaRPr lang="es-SV"/>
           </a:p>
@@ -370,7 +374,7 @@
           <a:lstStyle/>
           <a:p>
             <a:r>
-              <a:rPr lang="es-ES" smtClean="0"/>
+              <a:rPr lang="es-ES"/>
               <a:t>Haga clic para modificar el estilo de título del patrón</a:t>
             </a:r>
             <a:endParaRPr lang="es-SV"/>
@@ -394,35 +398,35 @@
           <a:p>
             <a:pPr lvl="0"/>
             <a:r>
-              <a:rPr lang="es-ES" smtClean="0"/>
+              <a:rPr lang="es-ES"/>
               <a:t>Editar el estilo de texto del patrón</a:t>
             </a:r>
           </a:p>
           <a:p>
             <a:pPr lvl="1"/>
             <a:r>
-              <a:rPr lang="es-ES" smtClean="0"/>
+              <a:rPr lang="es-ES"/>
               <a:t>Segundo nivel</a:t>
             </a:r>
           </a:p>
           <a:p>
             <a:pPr lvl="2"/>
             <a:r>
-              <a:rPr lang="es-ES" smtClean="0"/>
+              <a:rPr lang="es-ES"/>
               <a:t>Tercer nivel</a:t>
             </a:r>
           </a:p>
           <a:p>
             <a:pPr lvl="3"/>
             <a:r>
-              <a:rPr lang="es-ES" smtClean="0"/>
+              <a:rPr lang="es-ES"/>
               <a:t>Cuarto nivel</a:t>
             </a:r>
           </a:p>
           <a:p>
             <a:pPr lvl="4"/>
             <a:r>
-              <a:rPr lang="es-ES" smtClean="0"/>
+              <a:rPr lang="es-ES"/>
               <a:t>Quinto nivel</a:t>
             </a:r>
             <a:endParaRPr lang="es-SV"/>
@@ -446,7 +450,7 @@
           <a:p>
             <a:fld id="{BACD905E-5B96-466E-AB84-775EAD2AD0C0}" type="datetimeFigureOut">
               <a:rPr lang="es-SV" smtClean="0"/>
-              <a:t>15/09/2019</a:t>
+              <a:t>15/9/2019</a:t>
             </a:fld>
             <a:endParaRPr lang="es-SV"/>
           </a:p>
@@ -545,7 +549,7 @@
           <a:lstStyle/>
           <a:p>
             <a:r>
-              <a:rPr lang="es-ES" smtClean="0"/>
+              <a:rPr lang="es-ES"/>
               <a:t>Haga clic para modificar el estilo de título del patrón</a:t>
             </a:r>
             <a:endParaRPr lang="es-SV"/>
@@ -574,35 +578,35 @@
           <a:p>
             <a:pPr lvl="0"/>
             <a:r>
-              <a:rPr lang="es-ES" smtClean="0"/>
+              <a:rPr lang="es-ES"/>
               <a:t>Editar el estilo de texto del patrón</a:t>
             </a:r>
           </a:p>
           <a:p>
             <a:pPr lvl="1"/>
             <a:r>
-              <a:rPr lang="es-ES" smtClean="0"/>
+              <a:rPr lang="es-ES"/>
               <a:t>Segundo nivel</a:t>
             </a:r>
           </a:p>
           <a:p>
             <a:pPr lvl="2"/>
             <a:r>
-              <a:rPr lang="es-ES" smtClean="0"/>
+              <a:rPr lang="es-ES"/>
               <a:t>Tercer nivel</a:t>
             </a:r>
           </a:p>
           <a:p>
             <a:pPr lvl="3"/>
             <a:r>
-              <a:rPr lang="es-ES" smtClean="0"/>
+              <a:rPr lang="es-ES"/>
               <a:t>Cuarto nivel</a:t>
             </a:r>
           </a:p>
           <a:p>
             <a:pPr lvl="4"/>
             <a:r>
-              <a:rPr lang="es-ES" smtClean="0"/>
+              <a:rPr lang="es-ES"/>
               <a:t>Quinto nivel</a:t>
             </a:r>
             <a:endParaRPr lang="es-SV"/>
@@ -626,7 +630,7 @@
           <a:p>
             <a:fld id="{BACD905E-5B96-466E-AB84-775EAD2AD0C0}" type="datetimeFigureOut">
               <a:rPr lang="es-SV" smtClean="0"/>
-              <a:t>15/09/2019</a:t>
+              <a:t>15/9/2019</a:t>
             </a:fld>
             <a:endParaRPr lang="es-SV"/>
           </a:p>
@@ -720,7 +724,7 @@
           <a:lstStyle/>
           <a:p>
             <a:r>
-              <a:rPr lang="es-ES" smtClean="0"/>
+              <a:rPr lang="es-ES"/>
               <a:t>Haga clic para modificar el estilo de título del patrón</a:t>
             </a:r>
             <a:endParaRPr lang="es-SV"/>
@@ -744,35 +748,35 @@
           <a:p>
             <a:pPr lvl="0"/>
             <a:r>
-              <a:rPr lang="es-ES" smtClean="0"/>
+              <a:rPr lang="es-ES"/>
               <a:t>Editar el estilo de texto del patrón</a:t>
             </a:r>
           </a:p>
           <a:p>
             <a:pPr lvl="1"/>
             <a:r>
-              <a:rPr lang="es-ES" smtClean="0"/>
+              <a:rPr lang="es-ES"/>
               <a:t>Segundo nivel</a:t>
             </a:r>
           </a:p>
           <a:p>
             <a:pPr lvl="2"/>
             <a:r>
-              <a:rPr lang="es-ES" smtClean="0"/>
+              <a:rPr lang="es-ES"/>
               <a:t>Tercer nivel</a:t>
             </a:r>
           </a:p>
           <a:p>
             <a:pPr lvl="3"/>
             <a:r>
-              <a:rPr lang="es-ES" smtClean="0"/>
+              <a:rPr lang="es-ES"/>
               <a:t>Cuarto nivel</a:t>
             </a:r>
           </a:p>
           <a:p>
             <a:pPr lvl="4"/>
             <a:r>
-              <a:rPr lang="es-ES" smtClean="0"/>
+              <a:rPr lang="es-ES"/>
               <a:t>Quinto nivel</a:t>
             </a:r>
             <a:endParaRPr lang="es-SV"/>
@@ -796,7 +800,7 @@
           <a:p>
             <a:fld id="{BACD905E-5B96-466E-AB84-775EAD2AD0C0}" type="datetimeFigureOut">
               <a:rPr lang="es-SV" smtClean="0"/>
-              <a:t>15/09/2019</a:t>
+              <a:t>15/9/2019</a:t>
             </a:fld>
             <a:endParaRPr lang="es-SV"/>
           </a:p>
@@ -899,7 +903,7 @@
           </a:lstStyle>
           <a:p>
             <a:r>
-              <a:rPr lang="es-ES" smtClean="0"/>
+              <a:rPr lang="es-ES"/>
               <a:t>Haga clic para modificar el estilo de título del patrón</a:t>
             </a:r>
             <a:endParaRPr lang="es-SV"/>
@@ -1019,7 +1023,7 @@
           <a:p>
             <a:pPr lvl="0"/>
             <a:r>
-              <a:rPr lang="es-ES" smtClean="0"/>
+              <a:rPr lang="es-ES"/>
               <a:t>Editar el estilo de texto del patrón</a:t>
             </a:r>
           </a:p>
@@ -1042,7 +1046,7 @@
           <a:p>
             <a:fld id="{BACD905E-5B96-466E-AB84-775EAD2AD0C0}" type="datetimeFigureOut">
               <a:rPr lang="es-SV" smtClean="0"/>
-              <a:t>15/09/2019</a:t>
+              <a:t>15/9/2019</a:t>
             </a:fld>
             <a:endParaRPr lang="es-SV"/>
           </a:p>
@@ -1136,7 +1140,7 @@
           <a:lstStyle/>
           <a:p>
             <a:r>
-              <a:rPr lang="es-ES" smtClean="0"/>
+              <a:rPr lang="es-ES"/>
               <a:t>Haga clic para modificar el estilo de título del patrón</a:t>
             </a:r>
             <a:endParaRPr lang="es-SV"/>
@@ -1165,35 +1169,35 @@
           <a:p>
             <a:pPr lvl="0"/>
             <a:r>
-              <a:rPr lang="es-ES" smtClean="0"/>
+              <a:rPr lang="es-ES"/>
               <a:t>Editar el estilo de texto del patrón</a:t>
             </a:r>
           </a:p>
           <a:p>
             <a:pPr lvl="1"/>
             <a:r>
-              <a:rPr lang="es-ES" smtClean="0"/>
+              <a:rPr lang="es-ES"/>
               <a:t>Segundo nivel</a:t>
             </a:r>
           </a:p>
           <a:p>
             <a:pPr lvl="2"/>
             <a:r>
-              <a:rPr lang="es-ES" smtClean="0"/>
+              <a:rPr lang="es-ES"/>
               <a:t>Tercer nivel</a:t>
             </a:r>
           </a:p>
           <a:p>
             <a:pPr lvl="3"/>
             <a:r>
-              <a:rPr lang="es-ES" smtClean="0"/>
+              <a:rPr lang="es-ES"/>
               <a:t>Cuarto nivel</a:t>
             </a:r>
           </a:p>
           <a:p>
             <a:pPr lvl="4"/>
             <a:r>
-              <a:rPr lang="es-ES" smtClean="0"/>
+              <a:rPr lang="es-ES"/>
               <a:t>Quinto nivel</a:t>
             </a:r>
             <a:endParaRPr lang="es-SV"/>
@@ -1222,35 +1226,35 @@
           <a:p>
             <a:pPr lvl="0"/>
             <a:r>
-              <a:rPr lang="es-ES" smtClean="0"/>
+              <a:rPr lang="es-ES"/>
               <a:t>Editar el estilo de texto del patrón</a:t>
             </a:r>
           </a:p>
           <a:p>
             <a:pPr lvl="1"/>
             <a:r>
-              <a:rPr lang="es-ES" smtClean="0"/>
+              <a:rPr lang="es-ES"/>
               <a:t>Segundo nivel</a:t>
             </a:r>
           </a:p>
           <a:p>
             <a:pPr lvl="2"/>
             <a:r>
-              <a:rPr lang="es-ES" smtClean="0"/>
+              <a:rPr lang="es-ES"/>
               <a:t>Tercer nivel</a:t>
             </a:r>
           </a:p>
           <a:p>
             <a:pPr lvl="3"/>
             <a:r>
-              <a:rPr lang="es-ES" smtClean="0"/>
+              <a:rPr lang="es-ES"/>
               <a:t>Cuarto nivel</a:t>
             </a:r>
           </a:p>
           <a:p>
             <a:pPr lvl="4"/>
             <a:r>
-              <a:rPr lang="es-ES" smtClean="0"/>
+              <a:rPr lang="es-ES"/>
               <a:t>Quinto nivel</a:t>
             </a:r>
             <a:endParaRPr lang="es-SV"/>
@@ -1274,7 +1278,7 @@
           <a:p>
             <a:fld id="{BACD905E-5B96-466E-AB84-775EAD2AD0C0}" type="datetimeFigureOut">
               <a:rPr lang="es-SV" smtClean="0"/>
-              <a:t>15/09/2019</a:t>
+              <a:t>15/9/2019</a:t>
             </a:fld>
             <a:endParaRPr lang="es-SV"/>
           </a:p>
@@ -1373,7 +1377,7 @@
           <a:lstStyle/>
           <a:p>
             <a:r>
-              <a:rPr lang="es-ES" smtClean="0"/>
+              <a:rPr lang="es-ES"/>
               <a:t>Haga clic para modificar el estilo de título del patrón</a:t>
             </a:r>
             <a:endParaRPr lang="es-SV"/>
@@ -1439,7 +1443,7 @@
           <a:p>
             <a:pPr lvl="0"/>
             <a:r>
-              <a:rPr lang="es-ES" smtClean="0"/>
+              <a:rPr lang="es-ES"/>
               <a:t>Editar el estilo de texto del patrón</a:t>
             </a:r>
           </a:p>
@@ -1467,35 +1471,35 @@
           <a:p>
             <a:pPr lvl="0"/>
             <a:r>
-              <a:rPr lang="es-ES" smtClean="0"/>
+              <a:rPr lang="es-ES"/>
               <a:t>Editar el estilo de texto del patrón</a:t>
             </a:r>
           </a:p>
           <a:p>
             <a:pPr lvl="1"/>
             <a:r>
-              <a:rPr lang="es-ES" smtClean="0"/>
+              <a:rPr lang="es-ES"/>
               <a:t>Segundo nivel</a:t>
             </a:r>
           </a:p>
           <a:p>
             <a:pPr lvl="2"/>
             <a:r>
-              <a:rPr lang="es-ES" smtClean="0"/>
+              <a:rPr lang="es-ES"/>
               <a:t>Tercer nivel</a:t>
             </a:r>
           </a:p>
           <a:p>
             <a:pPr lvl="3"/>
             <a:r>
-              <a:rPr lang="es-ES" smtClean="0"/>
+              <a:rPr lang="es-ES"/>
               <a:t>Cuarto nivel</a:t>
             </a:r>
           </a:p>
           <a:p>
             <a:pPr lvl="4"/>
             <a:r>
-              <a:rPr lang="es-ES" smtClean="0"/>
+              <a:rPr lang="es-ES"/>
               <a:t>Quinto nivel</a:t>
             </a:r>
             <a:endParaRPr lang="es-SV"/>
@@ -1561,7 +1565,7 @@
           <a:p>
             <a:pPr lvl="0"/>
             <a:r>
-              <a:rPr lang="es-ES" smtClean="0"/>
+              <a:rPr lang="es-ES"/>
               <a:t>Editar el estilo de texto del patrón</a:t>
             </a:r>
           </a:p>
@@ -1589,35 +1593,35 @@
           <a:p>
             <a:pPr lvl="0"/>
             <a:r>
-              <a:rPr lang="es-ES" smtClean="0"/>
+              <a:rPr lang="es-ES"/>
               <a:t>Editar el estilo de texto del patrón</a:t>
             </a:r>
           </a:p>
           <a:p>
             <a:pPr lvl="1"/>
             <a:r>
-              <a:rPr lang="es-ES" smtClean="0"/>
+              <a:rPr lang="es-ES"/>
               <a:t>Segundo nivel</a:t>
             </a:r>
           </a:p>
           <a:p>
             <a:pPr lvl="2"/>
             <a:r>
-              <a:rPr lang="es-ES" smtClean="0"/>
+              <a:rPr lang="es-ES"/>
               <a:t>Tercer nivel</a:t>
             </a:r>
           </a:p>
           <a:p>
             <a:pPr lvl="3"/>
             <a:r>
-              <a:rPr lang="es-ES" smtClean="0"/>
+              <a:rPr lang="es-ES"/>
               <a:t>Cuarto nivel</a:t>
             </a:r>
           </a:p>
           <a:p>
             <a:pPr lvl="4"/>
             <a:r>
-              <a:rPr lang="es-ES" smtClean="0"/>
+              <a:rPr lang="es-ES"/>
               <a:t>Quinto nivel</a:t>
             </a:r>
             <a:endParaRPr lang="es-SV"/>
@@ -1641,7 +1645,7 @@
           <a:p>
             <a:fld id="{BACD905E-5B96-466E-AB84-775EAD2AD0C0}" type="datetimeFigureOut">
               <a:rPr lang="es-SV" smtClean="0"/>
-              <a:t>15/09/2019</a:t>
+              <a:t>15/9/2019</a:t>
             </a:fld>
             <a:endParaRPr lang="es-SV"/>
           </a:p>
@@ -1735,7 +1739,7 @@
           <a:lstStyle/>
           <a:p>
             <a:r>
-              <a:rPr lang="es-ES" smtClean="0"/>
+              <a:rPr lang="es-ES"/>
               <a:t>Haga clic para modificar el estilo de título del patrón</a:t>
             </a:r>
             <a:endParaRPr lang="es-SV"/>
@@ -1759,7 +1763,7 @@
           <a:p>
             <a:fld id="{BACD905E-5B96-466E-AB84-775EAD2AD0C0}" type="datetimeFigureOut">
               <a:rPr lang="es-SV" smtClean="0"/>
-              <a:t>15/09/2019</a:t>
+              <a:t>15/9/2019</a:t>
             </a:fld>
             <a:endParaRPr lang="es-SV"/>
           </a:p>
@@ -1854,7 +1858,7 @@
           <a:p>
             <a:fld id="{BACD905E-5B96-466E-AB84-775EAD2AD0C0}" type="datetimeFigureOut">
               <a:rPr lang="es-SV" smtClean="0"/>
-              <a:t>15/09/2019</a:t>
+              <a:t>15/9/2019</a:t>
             </a:fld>
             <a:endParaRPr lang="es-SV"/>
           </a:p>
@@ -1957,7 +1961,7 @@
           </a:lstStyle>
           <a:p>
             <a:r>
-              <a:rPr lang="es-ES" smtClean="0"/>
+              <a:rPr lang="es-ES"/>
               <a:t>Haga clic para modificar el estilo de título del patrón</a:t>
             </a:r>
             <a:endParaRPr lang="es-SV"/>
@@ -2014,35 +2018,35 @@
           <a:p>
             <a:pPr lvl="0"/>
             <a:r>
-              <a:rPr lang="es-ES" smtClean="0"/>
+              <a:rPr lang="es-ES"/>
               <a:t>Editar el estilo de texto del patrón</a:t>
             </a:r>
           </a:p>
           <a:p>
             <a:pPr lvl="1"/>
             <a:r>
-              <a:rPr lang="es-ES" smtClean="0"/>
+              <a:rPr lang="es-ES"/>
               <a:t>Segundo nivel</a:t>
             </a:r>
           </a:p>
           <a:p>
             <a:pPr lvl="2"/>
             <a:r>
-              <a:rPr lang="es-ES" smtClean="0"/>
+              <a:rPr lang="es-ES"/>
               <a:t>Tercer nivel</a:t>
             </a:r>
           </a:p>
           <a:p>
             <a:pPr lvl="3"/>
             <a:r>
-              <a:rPr lang="es-ES" smtClean="0"/>
+              <a:rPr lang="es-ES"/>
               <a:t>Cuarto nivel</a:t>
             </a:r>
           </a:p>
           <a:p>
             <a:pPr lvl="4"/>
             <a:r>
-              <a:rPr lang="es-ES" smtClean="0"/>
+              <a:rPr lang="es-ES"/>
               <a:t>Quinto nivel</a:t>
             </a:r>
             <a:endParaRPr lang="es-SV"/>
@@ -2108,7 +2112,7 @@
           <a:p>
             <a:pPr lvl="0"/>
             <a:r>
-              <a:rPr lang="es-ES" smtClean="0"/>
+              <a:rPr lang="es-ES"/>
               <a:t>Editar el estilo de texto del patrón</a:t>
             </a:r>
           </a:p>
@@ -2131,7 +2135,7 @@
           <a:p>
             <a:fld id="{BACD905E-5B96-466E-AB84-775EAD2AD0C0}" type="datetimeFigureOut">
               <a:rPr lang="es-SV" smtClean="0"/>
-              <a:t>15/09/2019</a:t>
+              <a:t>15/9/2019</a:t>
             </a:fld>
             <a:endParaRPr lang="es-SV"/>
           </a:p>
@@ -2234,7 +2238,7 @@
           </a:lstStyle>
           <a:p>
             <a:r>
-              <a:rPr lang="es-ES" smtClean="0"/>
+              <a:rPr lang="es-ES"/>
               <a:t>Haga clic para modificar el estilo de título del patrón</a:t>
             </a:r>
             <a:endParaRPr lang="es-SV"/>
@@ -2361,7 +2365,7 @@
           <a:p>
             <a:pPr lvl="0"/>
             <a:r>
-              <a:rPr lang="es-ES" smtClean="0"/>
+              <a:rPr lang="es-ES"/>
               <a:t>Editar el estilo de texto del patrón</a:t>
             </a:r>
           </a:p>
@@ -2384,7 +2388,7 @@
           <a:p>
             <a:fld id="{BACD905E-5B96-466E-AB84-775EAD2AD0C0}" type="datetimeFigureOut">
               <a:rPr lang="es-SV" smtClean="0"/>
-              <a:t>15/09/2019</a:t>
+              <a:t>15/9/2019</a:t>
             </a:fld>
             <a:endParaRPr lang="es-SV"/>
           </a:p>
@@ -2502,7 +2506,7 @@
           <a:lstStyle/>
           <a:p>
             <a:r>
-              <a:rPr lang="es-ES" smtClean="0"/>
+              <a:rPr lang="es-ES"/>
               <a:t>Haga clic para modificar el estilo de título del patrón</a:t>
             </a:r>
             <a:endParaRPr lang="es-SV"/>
@@ -2536,35 +2540,35 @@
           <a:p>
             <a:pPr lvl="0"/>
             <a:r>
-              <a:rPr lang="es-ES" smtClean="0"/>
+              <a:rPr lang="es-ES"/>
               <a:t>Editar el estilo de texto del patrón</a:t>
             </a:r>
           </a:p>
           <a:p>
             <a:pPr lvl="1"/>
             <a:r>
-              <a:rPr lang="es-ES" smtClean="0"/>
+              <a:rPr lang="es-ES"/>
               <a:t>Segundo nivel</a:t>
             </a:r>
           </a:p>
           <a:p>
             <a:pPr lvl="2"/>
             <a:r>
-              <a:rPr lang="es-ES" smtClean="0"/>
+              <a:rPr lang="es-ES"/>
               <a:t>Tercer nivel</a:t>
             </a:r>
           </a:p>
           <a:p>
             <a:pPr lvl="3"/>
             <a:r>
-              <a:rPr lang="es-ES" smtClean="0"/>
+              <a:rPr lang="es-ES"/>
               <a:t>Cuarto nivel</a:t>
             </a:r>
           </a:p>
           <a:p>
             <a:pPr lvl="4"/>
             <a:r>
-              <a:rPr lang="es-ES" smtClean="0"/>
+              <a:rPr lang="es-ES"/>
               <a:t>Quinto nivel</a:t>
             </a:r>
             <a:endParaRPr lang="es-SV"/>
@@ -2606,7 +2610,7 @@
           <a:p>
             <a:fld id="{BACD905E-5B96-466E-AB84-775EAD2AD0C0}" type="datetimeFigureOut">
               <a:rPr lang="es-SV" smtClean="0"/>
-              <a:t>15/09/2019</a:t>
+              <a:t>15/9/2019</a:t>
             </a:fld>
             <a:endParaRPr lang="es-SV"/>
           </a:p>
@@ -3029,16 +3033,12 @@
           <a:lstStyle/>
           <a:p>
             <a:r>
-              <a:rPr lang="es-SV" sz="4800" b="1" dirty="0" smtClean="0">
+              <a:rPr lang="es-SV" sz="4800" b="1" dirty="0">
                 <a:latin typeface="Arial" panose="020B0604020202020204" pitchFamily="34" charset="0"/>
                 <a:cs typeface="Arial" panose="020B0604020202020204" pitchFamily="34" charset="0"/>
               </a:rPr>
               <a:t>SISTEMAS DE CONTROL DE VERSIONES</a:t>
             </a:r>
-            <a:endParaRPr lang="es-SV" sz="4800" b="1" dirty="0">
-              <a:latin typeface="Arial" panose="020B0604020202020204" pitchFamily="34" charset="0"/>
-              <a:cs typeface="Arial" panose="020B0604020202020204" pitchFamily="34" charset="0"/>
-            </a:endParaRPr>
           </a:p>
         </p:txBody>
       </p:sp>
@@ -3059,14 +3059,10 @@
           <a:p>
             <a:r>
               <a:rPr lang="es-SV" b="1" dirty="0"/>
-              <a:t>GRUPO 15: </a:t>
-            </a:r>
-            <a:r>
-              <a:rPr lang="es-SV" b="1" dirty="0" smtClean="0"/>
-              <a:t> </a:t>
-            </a:r>
-            <a:r>
-              <a:rPr lang="es-SV" b="1" dirty="0" err="1" smtClean="0"/>
+              <a:t>GRUPO 15:  </a:t>
+            </a:r>
+            <a:r>
+              <a:rPr lang="es-SV" b="1" dirty="0" err="1"/>
               <a:t>CGM15</a:t>
             </a:r>
             <a:endParaRPr lang="es-SV" dirty="0"/>
@@ -3107,13 +3103,6 @@
   <p:clrMapOvr>
     <a:masterClrMapping/>
   </p:clrMapOvr>
-  <p:timing>
-    <p:tnLst>
-      <p:par>
-        <p:cTn id="1" dur="indefinite" restart="never" nodeType="tmRoot"/>
-      </p:par>
-    </p:tnLst>
-  </p:timing>
 </p:sld>
 </file>
 
@@ -3176,7 +3165,7 @@
         <p:spPr>
           <a:xfrm>
             <a:off x="2351584" y="1988840"/>
-            <a:ext cx="8208912" cy="3585597"/>
+            <a:ext cx="8208912" cy="4103688"/>
           </a:xfrm>
           <a:prstGeom prst="rect">
             <a:avLst/>
@@ -3317,6 +3306,37 @@
               </a:rPr>
               <a:t>GITHUB VS GITLAB</a:t>
             </a:r>
+          </a:p>
+          <a:p>
+            <a:pPr marL="342900" indent="-342900" algn="just">
+              <a:lnSpc>
+                <a:spcPct val="150000"/>
+              </a:lnSpc>
+              <a:spcAft>
+                <a:spcPts val="800"/>
+              </a:spcAft>
+              <a:buFont typeface="Symbol" panose="05050102010706020507" pitchFamily="18" charset="2"/>
+              <a:buChar char=""/>
+            </a:pPr>
+            <a:r>
+              <a:rPr lang="es-SV" dirty="0">
+                <a:solidFill>
+                  <a:srgbClr val="A6A6A6"/>
+                </a:solidFill>
+                <a:latin typeface="Arial" panose="020B0604020202020204" pitchFamily="34" charset="0"/>
+                <a:cs typeface="Arial" panose="020B0604020202020204" pitchFamily="34" charset="0"/>
+              </a:rPr>
+              <a:t>Ejemplo de uso de Git en GITHUB</a:t>
+            </a:r>
+            <a:endParaRPr lang="es-SV" dirty="0">
+              <a:solidFill>
+                <a:schemeClr val="bg1">
+                  <a:lumMod val="65000"/>
+                </a:schemeClr>
+              </a:solidFill>
+              <a:latin typeface="Arial" panose="020B0604020202020204" pitchFamily="34" charset="0"/>
+              <a:cs typeface="Arial" panose="020B0604020202020204" pitchFamily="34" charset="0"/>
+            </a:endParaRPr>
           </a:p>
           <a:p>
             <a:pPr marL="342900" indent="-342900" algn="just">
@@ -3365,13 +3385,6 @@
   <p:clrMapOvr>
     <a:masterClrMapping/>
   </p:clrMapOvr>
-  <p:timing>
-    <p:tnLst>
-      <p:par>
-        <p:cTn id="1" dur="indefinite" restart="never" nodeType="tmRoot"/>
-      </p:par>
-    </p:tnLst>
-  </p:timing>
 </p:sld>
 </file>
 
@@ -3547,13 +3560,6 @@
   <p:clrMapOvr>
     <a:masterClrMapping/>
   </p:clrMapOvr>
-  <p:timing>
-    <p:tnLst>
-      <p:par>
-        <p:cTn id="1" dur="indefinite" restart="never" nodeType="tmRoot"/>
-      </p:par>
-    </p:tnLst>
-  </p:timing>
 </p:sld>
 </file>
 
@@ -3616,7 +3622,7 @@
         <p:spPr>
           <a:xfrm>
             <a:off x="2351584" y="1988840"/>
-            <a:ext cx="8208912" cy="2693558"/>
+            <a:ext cx="8208912" cy="2995692"/>
           </a:xfrm>
           <a:prstGeom prst="rect">
             <a:avLst/>
@@ -3739,6 +3745,34 @@
               </a:rPr>
               <a:t>GITHUB VS GITLAB</a:t>
             </a:r>
+          </a:p>
+          <a:p>
+            <a:pPr marL="342900" indent="-342900" algn="just">
+              <a:spcAft>
+                <a:spcPts val="800"/>
+              </a:spcAft>
+              <a:buFont typeface="Symbol" panose="05050102010706020507" pitchFamily="18" charset="2"/>
+              <a:buChar char=""/>
+            </a:pPr>
+            <a:r>
+              <a:rPr lang="es-SV" dirty="0">
+                <a:solidFill>
+                  <a:srgbClr val="A6A6A6"/>
+                </a:solidFill>
+                <a:latin typeface="Arial" panose="020B0604020202020204" pitchFamily="34" charset="0"/>
+                <a:cs typeface="Arial" panose="020B0604020202020204" pitchFamily="34" charset="0"/>
+              </a:rPr>
+              <a:t>Ejemplo de uso de Git en GITHUB</a:t>
+            </a:r>
+            <a:endParaRPr lang="es-SV" dirty="0">
+              <a:solidFill>
+                <a:schemeClr val="bg1">
+                  <a:lumMod val="65000"/>
+                </a:schemeClr>
+              </a:solidFill>
+              <a:latin typeface="Arial" panose="020B0604020202020204" pitchFamily="34" charset="0"/>
+              <a:cs typeface="Arial" panose="020B0604020202020204" pitchFamily="34" charset="0"/>
+            </a:endParaRPr>
           </a:p>
           <a:p>
             <a:pPr marL="342900" indent="-342900" algn="just">
@@ -3784,13 +3818,6 @@
   <p:clrMapOvr>
     <a:masterClrMapping/>
   </p:clrMapOvr>
-  <p:timing>
-    <p:tnLst>
-      <p:par>
-        <p:cTn id="1" dur="indefinite" restart="never" nodeType="tmRoot"/>
-      </p:par>
-    </p:tnLst>
-  </p:timing>
 </p:sld>
 </file>
 
@@ -3834,16 +3861,12 @@
           <a:lstStyle/>
           <a:p>
             <a:r>
-              <a:rPr lang="es-SV" sz="4800" b="1" dirty="0" smtClean="0">
+              <a:rPr lang="es-SV" sz="4800" b="1" dirty="0">
                 <a:latin typeface="Arial" panose="020B0604020202020204" pitchFamily="34" charset="0"/>
                 <a:cs typeface="Arial" panose="020B0604020202020204" pitchFamily="34" charset="0"/>
               </a:rPr>
               <a:t>CUADRO COMPARATIVO</a:t>
             </a:r>
-            <a:endParaRPr lang="es-SV" sz="4800" b="1" dirty="0">
-              <a:latin typeface="Arial" panose="020B0604020202020204" pitchFamily="34" charset="0"/>
-              <a:cs typeface="Arial" panose="020B0604020202020204" pitchFamily="34" charset="0"/>
-            </a:endParaRPr>
           </a:p>
         </p:txBody>
       </p:sp>
@@ -3870,7 +3893,7 @@
           <a:lstStyle/>
           <a:p>
             <a:r>
-              <a:rPr lang="es-SV" sz="4000" b="1" dirty="0" smtClean="0">
+              <a:rPr lang="es-SV" sz="4000" b="1" dirty="0">
                 <a:latin typeface="Arial" panose="020B0604020202020204" pitchFamily="34" charset="0"/>
                 <a:cs typeface="Arial" panose="020B0604020202020204" pitchFamily="34" charset="0"/>
               </a:rPr>
@@ -3904,9 +3927,27 @@
                 <a:tableStyleId>{5C22544A-7EE6-4342-B048-85BDC9FD1C3A}</a:tableStyleId>
               </a:tblPr>
               <a:tblGrid>
-                <a:gridCol w="3668293"/>
-                <a:gridCol w="3061410"/>
-                <a:gridCol w="3061410"/>
+                <a:gridCol w="3668293">
+                  <a:extLst>
+                    <a:ext uri="{9D8B030D-6E8A-4147-A177-3AD203B41FA5}">
+                      <a16:colId xmlns:a16="http://schemas.microsoft.com/office/drawing/2014/main" val="20000"/>
+                    </a:ext>
+                  </a:extLst>
+                </a:gridCol>
+                <a:gridCol w="3061410">
+                  <a:extLst>
+                    <a:ext uri="{9D8B030D-6E8A-4147-A177-3AD203B41FA5}">
+                      <a16:colId xmlns:a16="http://schemas.microsoft.com/office/drawing/2014/main" val="20001"/>
+                    </a:ext>
+                  </a:extLst>
+                </a:gridCol>
+                <a:gridCol w="3061410">
+                  <a:extLst>
+                    <a:ext uri="{9D8B030D-6E8A-4147-A177-3AD203B41FA5}">
+                      <a16:colId xmlns:a16="http://schemas.microsoft.com/office/drawing/2014/main" val="20002"/>
+                    </a:ext>
+                  </a:extLst>
+                </a:gridCol>
               </a:tblGrid>
               <a:tr h="754049">
                 <a:tc>
@@ -3923,7 +3964,7 @@
                         </a:spcAft>
                       </a:pPr>
                       <a:r>
-                        <a:rPr lang="es-SV" sz="1600" dirty="0" smtClean="0">
+                        <a:rPr lang="es-SV" sz="1600" dirty="0">
                           <a:effectLst/>
                           <a:latin typeface="Arial" panose="020B0604020202020204" pitchFamily="34" charset="0"/>
                           <a:cs typeface="Arial" panose="020B0604020202020204" pitchFamily="34" charset="0"/>
@@ -3954,7 +3995,7 @@
                         </a:spcAft>
                       </a:pPr>
                       <a:r>
-                        <a:rPr lang="es-SV" sz="1600" dirty="0" smtClean="0">
+                        <a:rPr lang="es-SV" sz="1600" dirty="0">
                           <a:effectLst/>
                           <a:latin typeface="Arial" panose="020B0604020202020204" pitchFamily="34" charset="0"/>
                           <a:cs typeface="Arial" panose="020B0604020202020204" pitchFamily="34" charset="0"/>
@@ -3985,7 +4026,7 @@
                         </a:spcAft>
                       </a:pPr>
                       <a:r>
-                        <a:rPr lang="es-SV" sz="1600" dirty="0" smtClean="0">
+                        <a:rPr lang="es-SV" sz="1600" dirty="0">
                           <a:effectLst/>
                           <a:latin typeface="Arial" panose="020B0604020202020204" pitchFamily="34" charset="0"/>
                           <a:cs typeface="Arial" panose="020B0604020202020204" pitchFamily="34" charset="0"/>
@@ -4002,6 +4043,11 @@
                   </a:txBody>
                   <a:tcPr marL="68580" marR="68580" marT="0" marB="0" anchor="ctr"/>
                 </a:tc>
+                <a:extLst>
+                  <a:ext uri="{0D108BD9-81ED-4DB2-BD59-A6C34878D82A}">
+                    <a16:rowId xmlns:a16="http://schemas.microsoft.com/office/drawing/2014/main" val="10000"/>
+                  </a:ext>
+                </a:extLst>
               </a:tr>
             </a:tbl>
           </a:graphicData>
@@ -4032,9 +4078,27 @@
                 <a:tableStyleId>{5C22544A-7EE6-4342-B048-85BDC9FD1C3A}</a:tableStyleId>
               </a:tblPr>
               <a:tblGrid>
-                <a:gridCol w="3615587"/>
-                <a:gridCol w="3017425"/>
-                <a:gridCol w="3017425"/>
+                <a:gridCol w="3615587">
+                  <a:extLst>
+                    <a:ext uri="{9D8B030D-6E8A-4147-A177-3AD203B41FA5}">
+                      <a16:colId xmlns:a16="http://schemas.microsoft.com/office/drawing/2014/main" val="20000"/>
+                    </a:ext>
+                  </a:extLst>
+                </a:gridCol>
+                <a:gridCol w="3017425">
+                  <a:extLst>
+                    <a:ext uri="{9D8B030D-6E8A-4147-A177-3AD203B41FA5}">
+                      <a16:colId xmlns:a16="http://schemas.microsoft.com/office/drawing/2014/main" val="20001"/>
+                    </a:ext>
+                  </a:extLst>
+                </a:gridCol>
+                <a:gridCol w="3017425">
+                  <a:extLst>
+                    <a:ext uri="{9D8B030D-6E8A-4147-A177-3AD203B41FA5}">
+                      <a16:colId xmlns:a16="http://schemas.microsoft.com/office/drawing/2014/main" val="20002"/>
+                    </a:ext>
+                  </a:extLst>
+                </a:gridCol>
               </a:tblGrid>
               <a:tr h="352175">
                 <a:tc>
@@ -4146,6 +4210,11 @@
                   </a:txBody>
                   <a:tcPr marL="68580" marR="68580" marT="0" marB="0" anchor="ctr"/>
                 </a:tc>
+                <a:extLst>
+                  <a:ext uri="{0D108BD9-81ED-4DB2-BD59-A6C34878D82A}">
+                    <a16:rowId xmlns:a16="http://schemas.microsoft.com/office/drawing/2014/main" val="10000"/>
+                  </a:ext>
+                </a:extLst>
               </a:tr>
             </a:tbl>
           </a:graphicData>
@@ -4446,13 +4515,6 @@
   <p:clrMapOvr>
     <a:masterClrMapping/>
   </p:clrMapOvr>
-  <p:timing>
-    <p:tnLst>
-      <p:par>
-        <p:cTn id="1" dur="indefinite" restart="never" nodeType="tmRoot"/>
-      </p:par>
-    </p:tnLst>
-  </p:timing>
 </p:sld>
 </file>
 
@@ -4561,9 +4623,27 @@
                 <a:tableStyleId>{5C22544A-7EE6-4342-B048-85BDC9FD1C3A}</a:tableStyleId>
               </a:tblPr>
               <a:tblGrid>
-                <a:gridCol w="3410202"/>
-                <a:gridCol w="3214302"/>
-                <a:gridCol w="3031753"/>
+                <a:gridCol w="3410202">
+                  <a:extLst>
+                    <a:ext uri="{9D8B030D-6E8A-4147-A177-3AD203B41FA5}">
+                      <a16:colId xmlns:a16="http://schemas.microsoft.com/office/drawing/2014/main" val="20000"/>
+                    </a:ext>
+                  </a:extLst>
+                </a:gridCol>
+                <a:gridCol w="3214302">
+                  <a:extLst>
+                    <a:ext uri="{9D8B030D-6E8A-4147-A177-3AD203B41FA5}">
+                      <a16:colId xmlns:a16="http://schemas.microsoft.com/office/drawing/2014/main" val="20001"/>
+                    </a:ext>
+                  </a:extLst>
+                </a:gridCol>
+                <a:gridCol w="3031753">
+                  <a:extLst>
+                    <a:ext uri="{9D8B030D-6E8A-4147-A177-3AD203B41FA5}">
+                      <a16:colId xmlns:a16="http://schemas.microsoft.com/office/drawing/2014/main" val="20002"/>
+                    </a:ext>
+                  </a:extLst>
+                </a:gridCol>
               </a:tblGrid>
               <a:tr h="2291223">
                 <a:tc>
@@ -4667,6 +4747,11 @@
                   </a:txBody>
                   <a:tcPr marL="68580" marR="68580" marT="0" marB="0" anchor="ctr"/>
                 </a:tc>
+                <a:extLst>
+                  <a:ext uri="{0D108BD9-81ED-4DB2-BD59-A6C34878D82A}">
+                    <a16:rowId xmlns:a16="http://schemas.microsoft.com/office/drawing/2014/main" val="10000"/>
+                  </a:ext>
+                </a:extLst>
               </a:tr>
             </a:tbl>
           </a:graphicData>
@@ -4697,9 +4782,27 @@
                 <a:tableStyleId>{5C22544A-7EE6-4342-B048-85BDC9FD1C3A}</a:tableStyleId>
               </a:tblPr>
               <a:tblGrid>
-                <a:gridCol w="3418449"/>
-                <a:gridCol w="3214563"/>
-                <a:gridCol w="3017425"/>
+                <a:gridCol w="3418449">
+                  <a:extLst>
+                    <a:ext uri="{9D8B030D-6E8A-4147-A177-3AD203B41FA5}">
+                      <a16:colId xmlns:a16="http://schemas.microsoft.com/office/drawing/2014/main" val="20000"/>
+                    </a:ext>
+                  </a:extLst>
+                </a:gridCol>
+                <a:gridCol w="3214563">
+                  <a:extLst>
+                    <a:ext uri="{9D8B030D-6E8A-4147-A177-3AD203B41FA5}">
+                      <a16:colId xmlns:a16="http://schemas.microsoft.com/office/drawing/2014/main" val="20001"/>
+                    </a:ext>
+                  </a:extLst>
+                </a:gridCol>
+                <a:gridCol w="3017425">
+                  <a:extLst>
+                    <a:ext uri="{9D8B030D-6E8A-4147-A177-3AD203B41FA5}">
+                      <a16:colId xmlns:a16="http://schemas.microsoft.com/office/drawing/2014/main" val="20002"/>
+                    </a:ext>
+                  </a:extLst>
+                </a:gridCol>
               </a:tblGrid>
               <a:tr h="352175">
                 <a:tc>
@@ -4811,6 +4914,11 @@
                   </a:txBody>
                   <a:tcPr marL="68580" marR="68580" marT="0" marB="0" anchor="ctr"/>
                 </a:tc>
+                <a:extLst>
+                  <a:ext uri="{0D108BD9-81ED-4DB2-BD59-A6C34878D82A}">
+                    <a16:rowId xmlns:a16="http://schemas.microsoft.com/office/drawing/2014/main" val="10000"/>
+                  </a:ext>
+                </a:extLst>
               </a:tr>
             </a:tbl>
           </a:graphicData>
@@ -4949,13 +5057,6 @@
   <p:clrMapOvr>
     <a:masterClrMapping/>
   </p:clrMapOvr>
-  <p:timing>
-    <p:tnLst>
-      <p:par>
-        <p:cTn id="1" dur="indefinite" restart="never" nodeType="tmRoot"/>
-      </p:par>
-    </p:tnLst>
-  </p:timing>
 </p:sld>
 </file>
 
@@ -4999,30 +5100,26 @@
           <a:lstStyle/>
           <a:p>
             <a:r>
-              <a:rPr lang="es-SV" sz="4800" b="1" dirty="0" smtClean="0">
+              <a:rPr lang="es-SV" sz="4800" b="1" dirty="0">
                 <a:latin typeface="Arial" panose="020B0604020202020204" pitchFamily="34" charset="0"/>
                 <a:cs typeface="Arial" panose="020B0604020202020204" pitchFamily="34" charset="0"/>
               </a:rPr>
               <a:t>CUADRO</a:t>
             </a:r>
             <a:r>
-              <a:rPr lang="es-SV" sz="4800" dirty="0" smtClean="0">
+              <a:rPr lang="es-SV" sz="4800" dirty="0">
                 <a:latin typeface="Arial" panose="020B0604020202020204" pitchFamily="34" charset="0"/>
                 <a:cs typeface="Arial" panose="020B0604020202020204" pitchFamily="34" charset="0"/>
               </a:rPr>
               <a:t> </a:t>
             </a:r>
             <a:r>
-              <a:rPr lang="es-SV" sz="4800" b="1" dirty="0" smtClean="0">
+              <a:rPr lang="es-SV" sz="4800" b="1" dirty="0">
                 <a:latin typeface="Arial" panose="020B0604020202020204" pitchFamily="34" charset="0"/>
                 <a:cs typeface="Arial" panose="020B0604020202020204" pitchFamily="34" charset="0"/>
               </a:rPr>
               <a:t>COMPARATIVO</a:t>
             </a:r>
-            <a:endParaRPr lang="es-SV" sz="4800" b="1" dirty="0">
-              <a:latin typeface="Arial" panose="020B0604020202020204" pitchFamily="34" charset="0"/>
-              <a:cs typeface="Arial" panose="020B0604020202020204" pitchFamily="34" charset="0"/>
-            </a:endParaRPr>
           </a:p>
         </p:txBody>
       </p:sp>
@@ -5049,16 +5146,12 @@
           <a:lstStyle/>
           <a:p>
             <a:r>
-              <a:rPr lang="es-SV" sz="4000" b="1" dirty="0" smtClean="0">
+              <a:rPr lang="es-SV" sz="4000" b="1" dirty="0">
                 <a:latin typeface="Arial" panose="020B0604020202020204" pitchFamily="34" charset="0"/>
                 <a:cs typeface="Arial" panose="020B0604020202020204" pitchFamily="34" charset="0"/>
               </a:rPr>
               <a:t>Esquemas</a:t>
             </a:r>
-            <a:endParaRPr lang="es-SV" sz="4000" b="1" dirty="0">
-              <a:latin typeface="Arial" panose="020B0604020202020204" pitchFamily="34" charset="0"/>
-              <a:cs typeface="Arial" panose="020B0604020202020204" pitchFamily="34" charset="0"/>
-            </a:endParaRPr>
           </a:p>
         </p:txBody>
       </p:sp>
@@ -5087,9 +5180,27 @@
                 <a:tableStyleId>{5C22544A-7EE6-4342-B048-85BDC9FD1C3A}</a:tableStyleId>
               </a:tblPr>
               <a:tblGrid>
-                <a:gridCol w="3348112"/>
-                <a:gridCol w="3263705"/>
-                <a:gridCol w="3223270"/>
+                <a:gridCol w="3348112">
+                  <a:extLst>
+                    <a:ext uri="{9D8B030D-6E8A-4147-A177-3AD203B41FA5}">
+                      <a16:colId xmlns:a16="http://schemas.microsoft.com/office/drawing/2014/main" val="20000"/>
+                    </a:ext>
+                  </a:extLst>
+                </a:gridCol>
+                <a:gridCol w="3263705">
+                  <a:extLst>
+                    <a:ext uri="{9D8B030D-6E8A-4147-A177-3AD203B41FA5}">
+                      <a16:colId xmlns:a16="http://schemas.microsoft.com/office/drawing/2014/main" val="20001"/>
+                    </a:ext>
+                  </a:extLst>
+                </a:gridCol>
+                <a:gridCol w="3223270">
+                  <a:extLst>
+                    <a:ext uri="{9D8B030D-6E8A-4147-A177-3AD203B41FA5}">
+                      <a16:colId xmlns:a16="http://schemas.microsoft.com/office/drawing/2014/main" val="20002"/>
+                    </a:ext>
+                  </a:extLst>
+                </a:gridCol>
               </a:tblGrid>
               <a:tr h="1729896">
                 <a:tc>
@@ -5115,28 +5226,12 @@
                         <a:defRPr/>
                       </a:pPr>
                       <a:r>
-                        <a:rPr lang="es-SV" sz="1600" dirty="0" smtClean="0">
-                          <a:effectLst/>
-                          <a:latin typeface="Arial" panose="020B0604020202020204" pitchFamily="34" charset="0"/>
-                          <a:cs typeface="Arial" panose="020B0604020202020204" pitchFamily="34" charset="0"/>
-                        </a:rPr>
-                        <a:t>Dos </a:t>
-                      </a:r>
-                      <a:r>
                         <a:rPr lang="es-SV" sz="1600" dirty="0">
                           <a:effectLst/>
                           <a:latin typeface="Arial" panose="020B0604020202020204" pitchFamily="34" charset="0"/>
                           <a:cs typeface="Arial" panose="020B0604020202020204" pitchFamily="34" charset="0"/>
                         </a:rPr>
-                        <a:t>copias </a:t>
-                      </a:r>
-                      <a:r>
-                        <a:rPr lang="es-SV" sz="1600" dirty="0" smtClean="0">
-                          <a:effectLst/>
-                          <a:latin typeface="Arial" panose="020B0604020202020204" pitchFamily="34" charset="0"/>
-                          <a:cs typeface="Arial" panose="020B0604020202020204" pitchFamily="34" charset="0"/>
-                        </a:rPr>
-                        <a:t>Más espacio de almacenamiento:  </a:t>
+                        <a:t>Dos copias Más espacio de almacenamiento:  </a:t>
                       </a:r>
                     </a:p>
                     <a:p>
@@ -5149,34 +5244,13 @@
                         </a:spcAft>
                       </a:pPr>
                       <a:r>
-                        <a:rPr lang="es-SV" sz="1600" dirty="0" smtClean="0">
-                          <a:effectLst/>
-                          <a:latin typeface="Arial" panose="020B0604020202020204" pitchFamily="34" charset="0"/>
-                          <a:cs typeface="Arial" panose="020B0604020202020204" pitchFamily="34" charset="0"/>
-                        </a:rPr>
-                        <a:t>de </a:t>
-                      </a:r>
-                      <a:r>
                         <a:rPr lang="es-SV" sz="1600" dirty="0">
                           <a:effectLst/>
                           <a:latin typeface="Arial" panose="020B0604020202020204" pitchFamily="34" charset="0"/>
                           <a:cs typeface="Arial" panose="020B0604020202020204" pitchFamily="34" charset="0"/>
                         </a:rPr>
-                        <a:t>un archivo en el directorio de trabajo de SVN</a:t>
+                        <a:t>de un archivo en el directorio de trabajo de SVN.</a:t>
                       </a:r>
-                      <a:r>
-                        <a:rPr lang="es-SV" sz="1600" dirty="0" smtClean="0">
-                          <a:effectLst/>
-                          <a:latin typeface="Arial" panose="020B0604020202020204" pitchFamily="34" charset="0"/>
-                          <a:cs typeface="Arial" panose="020B0604020202020204" pitchFamily="34" charset="0"/>
-                        </a:rPr>
-                        <a:t>.</a:t>
-                      </a:r>
-                      <a:endParaRPr lang="es-SV" sz="1600" dirty="0">
-                        <a:effectLst/>
-                        <a:latin typeface="Arial" panose="020B0604020202020204" pitchFamily="34" charset="0"/>
-                        <a:cs typeface="Arial" panose="020B0604020202020204" pitchFamily="34" charset="0"/>
-                      </a:endParaRPr>
                     </a:p>
                   </a:txBody>
                   <a:tcPr marL="68580" marR="68580" marT="0" marB="0" anchor="ctr"/>
@@ -5218,21 +5292,8 @@
                           <a:latin typeface="Arial" panose="020B0604020202020204" pitchFamily="34" charset="0"/>
                           <a:cs typeface="Arial" panose="020B0604020202020204" pitchFamily="34" charset="0"/>
                         </a:rPr>
-                        <a:t>Tiene una memoria eficiente porque el formato de archivo de los datos está comprimido</a:t>
+                        <a:t>Tiene una memoria eficiente porque el formato de archivo de los datos está comprimido.</a:t>
                       </a:r>
-                      <a:r>
-                        <a:rPr lang="es-SV" sz="1600" dirty="0" smtClean="0">
-                          <a:effectLst/>
-                          <a:latin typeface="Arial" panose="020B0604020202020204" pitchFamily="34" charset="0"/>
-                          <a:cs typeface="Arial" panose="020B0604020202020204" pitchFamily="34" charset="0"/>
-                        </a:rPr>
-                        <a:t>.</a:t>
-                      </a:r>
-                      <a:endParaRPr lang="es-SV" sz="1600" dirty="0">
-                        <a:effectLst/>
-                        <a:latin typeface="Arial" panose="020B0604020202020204" pitchFamily="34" charset="0"/>
-                        <a:cs typeface="Arial" panose="020B0604020202020204" pitchFamily="34" charset="0"/>
-                      </a:endParaRPr>
                     </a:p>
                   </a:txBody>
                   <a:tcPr marL="68580" marR="68580" marT="0" marB="0" anchor="ctr"/>
@@ -5251,20 +5312,12 @@
                         </a:spcAft>
                       </a:pPr>
                       <a:r>
-                        <a:rPr lang="es-SV" sz="1600" dirty="0" smtClean="0">
-                          <a:effectLst/>
-                          <a:latin typeface="Arial" panose="020B0604020202020204" pitchFamily="34" charset="0"/>
-                          <a:cs typeface="Arial" panose="020B0604020202020204" pitchFamily="34" charset="0"/>
-                        </a:rPr>
-                        <a:t>gestión </a:t>
-                      </a:r>
-                      <a:r>
                         <a:rPr lang="es-SV" sz="1600" dirty="0">
                           <a:effectLst/>
                           <a:latin typeface="Arial" panose="020B0604020202020204" pitchFamily="34" charset="0"/>
                           <a:cs typeface="Arial" panose="020B0604020202020204" pitchFamily="34" charset="0"/>
                         </a:rPr>
-                        <a:t>de espacio en disco ya que siempre Mercurial está estructurado de tal forma que siempre se añaden objetos al repositorio.</a:t>
+                        <a:t>gestión de espacio en disco ya que siempre Mercurial está estructurado de tal forma que siempre se añaden objetos al repositorio.</a:t>
                       </a:r>
                       <a:endParaRPr lang="es-SV" sz="1600" dirty="0">
                         <a:effectLst/>
@@ -5276,6 +5329,11 @@
                   </a:txBody>
                   <a:tcPr marL="68580" marR="68580" marT="0" marB="0" anchor="ctr"/>
                 </a:tc>
+                <a:extLst>
+                  <a:ext uri="{0D108BD9-81ED-4DB2-BD59-A6C34878D82A}">
+                    <a16:rowId xmlns:a16="http://schemas.microsoft.com/office/drawing/2014/main" val="10000"/>
+                  </a:ext>
+                </a:extLst>
               </a:tr>
             </a:tbl>
           </a:graphicData>
@@ -5505,9 +5563,27 @@
                 <a:tableStyleId>{5C22544A-7EE6-4342-B048-85BDC9FD1C3A}</a:tableStyleId>
               </a:tblPr>
               <a:tblGrid>
-                <a:gridCol w="3418449"/>
-                <a:gridCol w="3214563"/>
-                <a:gridCol w="3017425"/>
+                <a:gridCol w="3418449">
+                  <a:extLst>
+                    <a:ext uri="{9D8B030D-6E8A-4147-A177-3AD203B41FA5}">
+                      <a16:colId xmlns:a16="http://schemas.microsoft.com/office/drawing/2014/main" val="20000"/>
+                    </a:ext>
+                  </a:extLst>
+                </a:gridCol>
+                <a:gridCol w="3214563">
+                  <a:extLst>
+                    <a:ext uri="{9D8B030D-6E8A-4147-A177-3AD203B41FA5}">
+                      <a16:colId xmlns:a16="http://schemas.microsoft.com/office/drawing/2014/main" val="20001"/>
+                    </a:ext>
+                  </a:extLst>
+                </a:gridCol>
+                <a:gridCol w="3017425">
+                  <a:extLst>
+                    <a:ext uri="{9D8B030D-6E8A-4147-A177-3AD203B41FA5}">
+                      <a16:colId xmlns:a16="http://schemas.microsoft.com/office/drawing/2014/main" val="20002"/>
+                    </a:ext>
+                  </a:extLst>
+                </a:gridCol>
               </a:tblGrid>
               <a:tr h="352175">
                 <a:tc>
@@ -5619,6 +5695,11 @@
                   </a:txBody>
                   <a:tcPr marL="68580" marR="68580" marT="0" marB="0" anchor="ctr"/>
                 </a:tc>
+                <a:extLst>
+                  <a:ext uri="{0D108BD9-81ED-4DB2-BD59-A6C34878D82A}">
+                    <a16:rowId xmlns:a16="http://schemas.microsoft.com/office/drawing/2014/main" val="10000"/>
+                  </a:ext>
+                </a:extLst>
               </a:tr>
             </a:tbl>
           </a:graphicData>
@@ -5757,13 +5838,6 @@
   <p:clrMapOvr>
     <a:masterClrMapping/>
   </p:clrMapOvr>
-  <p:timing>
-    <p:tnLst>
-      <p:par>
-        <p:cTn id="1" dur="indefinite" restart="never" nodeType="tmRoot"/>
-      </p:par>
-    </p:tnLst>
-  </p:timing>
 </p:sld>
 </file>
 
@@ -5816,14 +5890,7 @@
                 <a:latin typeface="Arial" panose="020B0604020202020204" pitchFamily="34" charset="0"/>
                 <a:cs typeface="Arial" panose="020B0604020202020204" pitchFamily="34" charset="0"/>
               </a:rPr>
-              <a:t> (Fusión de ramas</a:t>
-            </a:r>
-            <a:r>
-              <a:rPr lang="es-SV" sz="4000" b="1" dirty="0" smtClean="0">
-                <a:latin typeface="Arial" panose="020B0604020202020204" pitchFamily="34" charset="0"/>
-                <a:cs typeface="Arial" panose="020B0604020202020204" pitchFamily="34" charset="0"/>
-              </a:rPr>
-              <a:t>)</a:t>
+              <a:t> (Fusión de ramas)</a:t>
             </a:r>
           </a:p>
           <a:p>
@@ -5895,9 +5962,27 @@
                 <a:tableStyleId>{5C22544A-7EE6-4342-B048-85BDC9FD1C3A}</a:tableStyleId>
               </a:tblPr>
               <a:tblGrid>
-                <a:gridCol w="3607605"/>
-                <a:gridCol w="2910024"/>
-                <a:gridCol w="3111501"/>
+                <a:gridCol w="3607605">
+                  <a:extLst>
+                    <a:ext uri="{9D8B030D-6E8A-4147-A177-3AD203B41FA5}">
+                      <a16:colId xmlns:a16="http://schemas.microsoft.com/office/drawing/2014/main" val="20000"/>
+                    </a:ext>
+                  </a:extLst>
+                </a:gridCol>
+                <a:gridCol w="2910024">
+                  <a:extLst>
+                    <a:ext uri="{9D8B030D-6E8A-4147-A177-3AD203B41FA5}">
+                      <a16:colId xmlns:a16="http://schemas.microsoft.com/office/drawing/2014/main" val="20001"/>
+                    </a:ext>
+                  </a:extLst>
+                </a:gridCol>
+                <a:gridCol w="3111501">
+                  <a:extLst>
+                    <a:ext uri="{9D8B030D-6E8A-4147-A177-3AD203B41FA5}">
+                      <a16:colId xmlns:a16="http://schemas.microsoft.com/office/drawing/2014/main" val="20002"/>
+                    </a:ext>
+                  </a:extLst>
+                </a:gridCol>
               </a:tblGrid>
               <a:tr h="1664648">
                 <a:tc>
@@ -5993,6 +6078,11 @@
                   </a:txBody>
                   <a:tcPr marL="68580" marR="68580" marT="0" marB="0" anchor="ctr"/>
                 </a:tc>
+                <a:extLst>
+                  <a:ext uri="{0D108BD9-81ED-4DB2-BD59-A6C34878D82A}">
+                    <a16:rowId xmlns:a16="http://schemas.microsoft.com/office/drawing/2014/main" val="10000"/>
+                  </a:ext>
+                </a:extLst>
               </a:tr>
             </a:tbl>
           </a:graphicData>
@@ -6196,21 +6286,21 @@
           </a:lstStyle>
           <a:p>
             <a:r>
-              <a:rPr lang="es-SV" sz="4800" b="1" smtClean="0">
+              <a:rPr lang="es-SV" sz="4800" b="1">
                 <a:latin typeface="Arial" panose="020B0604020202020204" pitchFamily="34" charset="0"/>
                 <a:cs typeface="Arial" panose="020B0604020202020204" pitchFamily="34" charset="0"/>
               </a:rPr>
               <a:t>CUADRO</a:t>
             </a:r>
             <a:r>
-              <a:rPr lang="es-SV" sz="4800" smtClean="0">
+              <a:rPr lang="es-SV" sz="4800">
                 <a:latin typeface="Arial" panose="020B0604020202020204" pitchFamily="34" charset="0"/>
                 <a:cs typeface="Arial" panose="020B0604020202020204" pitchFamily="34" charset="0"/>
               </a:rPr>
               <a:t> </a:t>
             </a:r>
             <a:r>
-              <a:rPr lang="es-SV" sz="4800" b="1" smtClean="0">
+              <a:rPr lang="es-SV" sz="4800" b="1">
                 <a:latin typeface="Arial" panose="020B0604020202020204" pitchFamily="34" charset="0"/>
                 <a:cs typeface="Arial" panose="020B0604020202020204" pitchFamily="34" charset="0"/>
               </a:rPr>
@@ -6248,9 +6338,27 @@
                 <a:tableStyleId>{5C22544A-7EE6-4342-B048-85BDC9FD1C3A}</a:tableStyleId>
               </a:tblPr>
               <a:tblGrid>
-                <a:gridCol w="3418449"/>
-                <a:gridCol w="3214563"/>
-                <a:gridCol w="3017425"/>
+                <a:gridCol w="3418449">
+                  <a:extLst>
+                    <a:ext uri="{9D8B030D-6E8A-4147-A177-3AD203B41FA5}">
+                      <a16:colId xmlns:a16="http://schemas.microsoft.com/office/drawing/2014/main" val="20000"/>
+                    </a:ext>
+                  </a:extLst>
+                </a:gridCol>
+                <a:gridCol w="3214563">
+                  <a:extLst>
+                    <a:ext uri="{9D8B030D-6E8A-4147-A177-3AD203B41FA5}">
+                      <a16:colId xmlns:a16="http://schemas.microsoft.com/office/drawing/2014/main" val="20001"/>
+                    </a:ext>
+                  </a:extLst>
+                </a:gridCol>
+                <a:gridCol w="3017425">
+                  <a:extLst>
+                    <a:ext uri="{9D8B030D-6E8A-4147-A177-3AD203B41FA5}">
+                      <a16:colId xmlns:a16="http://schemas.microsoft.com/office/drawing/2014/main" val="20002"/>
+                    </a:ext>
+                  </a:extLst>
+                </a:gridCol>
               </a:tblGrid>
               <a:tr h="352175">
                 <a:tc>
@@ -6362,6 +6470,11 @@
                   </a:txBody>
                   <a:tcPr marL="68580" marR="68580" marT="0" marB="0" anchor="ctr"/>
                 </a:tc>
+                <a:extLst>
+                  <a:ext uri="{0D108BD9-81ED-4DB2-BD59-A6C34878D82A}">
+                    <a16:rowId xmlns:a16="http://schemas.microsoft.com/office/drawing/2014/main" val="10000"/>
+                  </a:ext>
+                </a:extLst>
               </a:tr>
             </a:tbl>
           </a:graphicData>
@@ -6500,13 +6613,6 @@
   <p:clrMapOvr>
     <a:masterClrMapping/>
   </p:clrMapOvr>
-  <p:timing>
-    <p:tnLst>
-      <p:par>
-        <p:cTn id="1" dur="indefinite" restart="never" nodeType="tmRoot"/>
-      </p:par>
-    </p:tnLst>
-  </p:timing>
 </p:sld>
 </file>
 
@@ -6569,7 +6675,7 @@
         <p:spPr>
           <a:xfrm>
             <a:off x="2351584" y="1988840"/>
-            <a:ext cx="8208912" cy="3585597"/>
+            <a:ext cx="8208912" cy="4103688"/>
           </a:xfrm>
           <a:prstGeom prst="rect">
             <a:avLst/>
@@ -6709,6 +6815,31 @@
                 <a:cs typeface="Arial" panose="020B0604020202020204" pitchFamily="34" charset="0"/>
               </a:rPr>
               <a:t>GITHUB VS GITLAB</a:t>
+            </a:r>
+          </a:p>
+          <a:p>
+            <a:pPr marL="342900" indent="-342900" algn="just">
+              <a:lnSpc>
+                <a:spcPct val="150000"/>
+              </a:lnSpc>
+              <a:spcAft>
+                <a:spcPts val="800"/>
+              </a:spcAft>
+              <a:buClr>
+                <a:srgbClr val="A6A6A6"/>
+              </a:buClr>
+              <a:buFont typeface="Symbol" panose="05050102010706020507" pitchFamily="18" charset="2"/>
+              <a:buChar char=""/>
+            </a:pPr>
+            <a:r>
+              <a:rPr lang="es-SV" dirty="0">
+                <a:solidFill>
+                  <a:srgbClr val="A6A6A6"/>
+                </a:solidFill>
+                <a:latin typeface="Arial" panose="020B0604020202020204" pitchFamily="34" charset="0"/>
+                <a:cs typeface="Arial" panose="020B0604020202020204" pitchFamily="34" charset="0"/>
+              </a:rPr>
+              <a:t>Ejemplo de uso de Git en GITHUB</a:t>
             </a:r>
           </a:p>
           <a:p>
@@ -6758,13 +6889,6 @@
   <p:clrMapOvr>
     <a:masterClrMapping/>
   </p:clrMapOvr>
-  <p:timing>
-    <p:tnLst>
-      <p:par>
-        <p:cTn id="1" dur="indefinite" restart="never" nodeType="tmRoot"/>
-      </p:par>
-    </p:tnLst>
-  </p:timing>
 </p:sld>
 </file>
 
@@ -6807,16 +6931,12 @@
           <a:lstStyle/>
           <a:p>
             <a:r>
-              <a:rPr lang="es-SV" sz="4000" dirty="0" smtClean="0">
+              <a:rPr lang="es-SV" sz="4000" dirty="0">
                 <a:latin typeface="Arial" panose="020B0604020202020204" pitchFamily="34" charset="0"/>
                 <a:cs typeface="Arial" panose="020B0604020202020204" pitchFamily="34" charset="0"/>
               </a:rPr>
               <a:t>Definición:</a:t>
             </a:r>
-            <a:endParaRPr lang="es-SV" sz="4000" dirty="0">
-              <a:latin typeface="Arial" panose="020B0604020202020204" pitchFamily="34" charset="0"/>
-              <a:cs typeface="Arial" panose="020B0604020202020204" pitchFamily="34" charset="0"/>
-            </a:endParaRPr>
           </a:p>
           <a:p>
             <a:pPr algn="just">
@@ -6825,7 +6945,7 @@
               </a:lnSpc>
             </a:pPr>
             <a:r>
-              <a:rPr lang="es-SV" sz="1600" dirty="0" err="1" smtClean="0">
+              <a:rPr lang="es-SV" sz="1600" dirty="0" err="1">
                 <a:latin typeface="Arial" panose="020B0604020202020204" pitchFamily="34" charset="0"/>
                 <a:cs typeface="Arial" panose="020B0604020202020204" pitchFamily="34" charset="0"/>
               </a:rPr>
@@ -6929,21 +7049,21 @@
           <a:lstStyle/>
           <a:p>
             <a:r>
-              <a:rPr lang="es-SV" sz="4800" b="1" dirty="0" err="1" smtClean="0">
+              <a:rPr lang="es-SV" sz="4800" b="1" dirty="0" err="1">
                 <a:latin typeface="Arial" panose="020B0604020202020204" pitchFamily="34" charset="0"/>
                 <a:cs typeface="Arial" panose="020B0604020202020204" pitchFamily="34" charset="0"/>
               </a:rPr>
               <a:t>GITHUB</a:t>
             </a:r>
             <a:r>
-              <a:rPr lang="es-SV" sz="4800" b="1" dirty="0" smtClean="0">
+              <a:rPr lang="es-SV" sz="4800" b="1" dirty="0">
                 <a:latin typeface="Arial" panose="020B0604020202020204" pitchFamily="34" charset="0"/>
                 <a:cs typeface="Arial" panose="020B0604020202020204" pitchFamily="34" charset="0"/>
               </a:rPr>
               <a:t> VS </a:t>
             </a:r>
             <a:r>
-              <a:rPr lang="es-SV" sz="4800" b="1" dirty="0" err="1" smtClean="0">
+              <a:rPr lang="es-SV" sz="4800" b="1" dirty="0" err="1">
                 <a:latin typeface="Arial" panose="020B0604020202020204" pitchFamily="34" charset="0"/>
                 <a:cs typeface="Arial" panose="020B0604020202020204" pitchFamily="34" charset="0"/>
               </a:rPr>
@@ -7020,13 +7140,6 @@
   <p:clrMapOvr>
     <a:masterClrMapping/>
   </p:clrMapOvr>
-  <p:timing>
-    <p:tnLst>
-      <p:par>
-        <p:cTn id="1" dur="indefinite" restart="never" nodeType="tmRoot"/>
-      </p:par>
-    </p:tnLst>
-  </p:timing>
 </p:sld>
 </file>
 
@@ -7105,18 +7218,11 @@
               <a:buNone/>
             </a:pPr>
             <a:r>
-              <a:rPr lang="es-SV" sz="1600" dirty="0" smtClean="0">
-                <a:latin typeface="Arial" panose="020B0604020202020204" pitchFamily="34" charset="0"/>
-                <a:cs typeface="Arial" panose="020B0604020202020204" pitchFamily="34" charset="0"/>
-              </a:rPr>
-              <a:t>- </a:t>
-            </a:r>
-            <a:r>
               <a:rPr lang="es-SV" sz="1600" dirty="0">
                 <a:latin typeface="Arial" panose="020B0604020202020204" pitchFamily="34" charset="0"/>
                 <a:cs typeface="Arial" panose="020B0604020202020204" pitchFamily="34" charset="0"/>
               </a:rPr>
-              <a:t>Un </a:t>
+              <a:t>- Un </a:t>
             </a:r>
             <a:r>
               <a:rPr lang="es-SV" sz="1600" b="1" dirty="0">
@@ -7256,7 +7362,7 @@
           <a:p>
             <a:pPr algn="ctr"/>
             <a:r>
-              <a:rPr lang="es-SV" sz="4800" b="1" dirty="0" err="1" smtClean="0">
+              <a:rPr lang="es-SV" sz="4800" b="1" dirty="0" err="1">
                 <a:latin typeface="Arial" panose="020B0604020202020204" pitchFamily="34" charset="0"/>
                 <a:cs typeface="Arial" panose="020B0604020202020204" pitchFamily="34" charset="0"/>
               </a:rPr>
@@ -7515,13 +7621,6 @@
   <p:clrMapOvr>
     <a:masterClrMapping/>
   </p:clrMapOvr>
-  <p:timing>
-    <p:tnLst>
-      <p:par>
-        <p:cTn id="1" dur="indefinite" restart="never" nodeType="tmRoot"/>
-      </p:par>
-    </p:tnLst>
-  </p:timing>
 </p:sld>
 </file>
 
@@ -7564,16 +7663,12 @@
           <a:lstStyle/>
           <a:p>
             <a:r>
-              <a:rPr lang="es-SV" sz="4000" b="1" dirty="0" smtClean="0">
+              <a:rPr lang="es-SV" sz="4000" b="1" dirty="0">
                 <a:latin typeface="Arial" panose="020B0604020202020204" pitchFamily="34" charset="0"/>
                 <a:cs typeface="Arial" panose="020B0604020202020204" pitchFamily="34" charset="0"/>
               </a:rPr>
               <a:t>Definición:</a:t>
             </a:r>
-            <a:endParaRPr lang="es-SV" sz="4000" b="1" dirty="0">
-              <a:latin typeface="Arial" panose="020B0604020202020204" pitchFamily="34" charset="0"/>
-              <a:cs typeface="Arial" panose="020B0604020202020204" pitchFamily="34" charset="0"/>
-            </a:endParaRPr>
           </a:p>
           <a:p>
             <a:pPr algn="just">
@@ -7582,7 +7677,7 @@
               </a:lnSpc>
             </a:pPr>
             <a:r>
-              <a:rPr lang="es-SV" sz="1600" dirty="0" err="1" smtClean="0">
+              <a:rPr lang="es-SV" sz="1600" dirty="0" err="1">
                 <a:latin typeface="Arial" panose="020B0604020202020204" pitchFamily="34" charset="0"/>
                 <a:cs typeface="Arial" panose="020B0604020202020204" pitchFamily="34" charset="0"/>
               </a:rPr>
@@ -7630,16 +7725,12 @@
           <a:lstStyle/>
           <a:p>
             <a:r>
-              <a:rPr lang="es-SV" sz="4800" b="1" dirty="0" smtClean="0">
+              <a:rPr lang="es-SV" sz="4800" b="1" dirty="0">
                 <a:latin typeface="Arial" panose="020B0604020202020204" pitchFamily="34" charset="0"/>
                 <a:cs typeface="Arial" panose="020B0604020202020204" pitchFamily="34" charset="0"/>
               </a:rPr>
               <a:t>GITHUB VS GITLAB</a:t>
             </a:r>
-            <a:endParaRPr lang="es-SV" sz="4800" b="1" dirty="0">
-              <a:latin typeface="Arial" panose="020B0604020202020204" pitchFamily="34" charset="0"/>
-              <a:cs typeface="Arial" panose="020B0604020202020204" pitchFamily="34" charset="0"/>
-            </a:endParaRPr>
           </a:p>
         </p:txBody>
       </p:sp>
@@ -7751,7 +7842,7 @@
               <a:buNone/>
             </a:pPr>
             <a:r>
-              <a:rPr lang="es-SV" sz="4000" b="1" dirty="0" smtClean="0">
+              <a:rPr lang="es-SV" sz="4000" b="1" dirty="0">
                 <a:latin typeface="Arial" panose="020B0604020202020204" pitchFamily="34" charset="0"/>
                 <a:cs typeface="Arial" panose="020B0604020202020204" pitchFamily="34" charset="0"/>
               </a:rPr>
@@ -7766,18 +7857,11 @@
               <a:buNone/>
             </a:pPr>
             <a:r>
-              <a:rPr lang="es-SV" sz="1600" dirty="0" smtClean="0">
-                <a:latin typeface="Arial" panose="020B0604020202020204" pitchFamily="34" charset="0"/>
-                <a:cs typeface="Arial" panose="020B0604020202020204" pitchFamily="34" charset="0"/>
-              </a:rPr>
-              <a:t>- </a:t>
-            </a:r>
-            <a:r>
               <a:rPr lang="es-SV" sz="1600" dirty="0">
                 <a:latin typeface="Arial" panose="020B0604020202020204" pitchFamily="34" charset="0"/>
                 <a:cs typeface="Arial" panose="020B0604020202020204" pitchFamily="34" charset="0"/>
               </a:rPr>
-              <a:t>Control de versiones con </a:t>
+              <a:t>- Control de versiones con </a:t>
             </a:r>
             <a:r>
               <a:rPr lang="es-SV" sz="1600" dirty="0" err="1">
@@ -7876,16 +7960,12 @@
           <a:p>
             <a:pPr algn="ctr"/>
             <a:r>
-              <a:rPr lang="es-SV" sz="4800" b="1" dirty="0" smtClean="0">
+              <a:rPr lang="es-SV" sz="4800" b="1" dirty="0">
                 <a:latin typeface="Arial" panose="020B0604020202020204" pitchFamily="34" charset="0"/>
                 <a:cs typeface="Arial" panose="020B0604020202020204" pitchFamily="34" charset="0"/>
               </a:rPr>
               <a:t>GITLAB</a:t>
             </a:r>
-            <a:endParaRPr lang="es-SV" sz="4800" b="1" dirty="0">
-              <a:latin typeface="Arial" panose="020B0604020202020204" pitchFamily="34" charset="0"/>
-              <a:cs typeface="Arial" panose="020B0604020202020204" pitchFamily="34" charset="0"/>
-            </a:endParaRPr>
           </a:p>
         </p:txBody>
       </p:sp>
@@ -7961,7 +8041,7 @@
         <p:spPr>
           <a:xfrm>
             <a:off x="2351584" y="1988840"/>
-            <a:ext cx="8208912" cy="3585597"/>
+            <a:ext cx="8208912" cy="4103688"/>
           </a:xfrm>
           <a:prstGeom prst="rect">
             <a:avLst/>
@@ -8103,6 +8183,2136 @@
                 <a:cs typeface="Arial" panose="020B0604020202020204" pitchFamily="34" charset="0"/>
               </a:rPr>
               <a:t>GITHUB VS GITLAB</a:t>
+            </a:r>
+          </a:p>
+          <a:p>
+            <a:pPr marL="342900" indent="-342900" algn="just">
+              <a:lnSpc>
+                <a:spcPct val="150000"/>
+              </a:lnSpc>
+              <a:spcAft>
+                <a:spcPts val="800"/>
+              </a:spcAft>
+              <a:buClr>
+                <a:schemeClr val="accent2"/>
+              </a:buClr>
+              <a:buFont typeface="Symbol" panose="05050102010706020507" pitchFamily="18" charset="2"/>
+              <a:buChar char=""/>
+            </a:pPr>
+            <a:r>
+              <a:rPr lang="es-SV" dirty="0">
+                <a:latin typeface="Arial" panose="020B0604020202020204" pitchFamily="34" charset="0"/>
+                <a:cs typeface="Arial" panose="020B0604020202020204" pitchFamily="34" charset="0"/>
+              </a:rPr>
+              <a:t>Ejemplo de uso de Git en GITHUB</a:t>
+            </a:r>
+          </a:p>
+          <a:p>
+            <a:pPr marL="342900" indent="-342900" algn="just">
+              <a:lnSpc>
+                <a:spcPct val="150000"/>
+              </a:lnSpc>
+              <a:spcAft>
+                <a:spcPts val="800"/>
+              </a:spcAft>
+              <a:buClr>
+                <a:srgbClr val="A6A6A6"/>
+              </a:buClr>
+              <a:buFont typeface="Symbol" panose="05050102010706020507" pitchFamily="18" charset="2"/>
+              <a:buChar char=""/>
+            </a:pPr>
+            <a:r>
+              <a:rPr lang="es-SV" dirty="0">
+                <a:solidFill>
+                  <a:schemeClr val="bg1">
+                    <a:lumMod val="65000"/>
+                  </a:schemeClr>
+                </a:solidFill>
+                <a:latin typeface="Arial" panose="020B0604020202020204" pitchFamily="34" charset="0"/>
+                <a:cs typeface="Arial" panose="020B0604020202020204" pitchFamily="34" charset="0"/>
+              </a:rPr>
+              <a:t>Conclusiones</a:t>
+            </a:r>
+          </a:p>
+          <a:p>
+            <a:pPr algn="just">
+              <a:spcAft>
+                <a:spcPts val="800"/>
+              </a:spcAft>
+            </a:pPr>
+            <a:endParaRPr lang="es-SV" dirty="0">
+              <a:latin typeface="Arial" panose="020B0604020202020204" pitchFamily="34" charset="0"/>
+              <a:cs typeface="Arial" panose="020B0604020202020204" pitchFamily="34" charset="0"/>
+            </a:endParaRPr>
+          </a:p>
+        </p:txBody>
+      </p:sp>
+    </p:spTree>
+    <p:extLst>
+      <p:ext uri="{BB962C8B-B14F-4D97-AF65-F5344CB8AC3E}">
+        <p14:creationId xmlns:p14="http://schemas.microsoft.com/office/powerpoint/2010/main" val="1002247121"/>
+      </p:ext>
+    </p:extLst>
+  </p:cSld>
+  <p:clrMapOvr>
+    <a:masterClrMapping/>
+  </p:clrMapOvr>
+</p:sld>
+</file>
+
+<file path=ppt/slides/slide23.xml><?xml version="1.0" encoding="utf-8"?>
+<p:sld xmlns:a="http://schemas.openxmlformats.org/drawingml/2006/main" xmlns:r="http://schemas.openxmlformats.org/officeDocument/2006/relationships" xmlns:p="http://schemas.openxmlformats.org/presentationml/2006/main">
+  <p:cSld>
+    <p:spTree>
+      <p:nvGrpSpPr>
+        <p:cNvPr id="1" name=""/>
+        <p:cNvGrpSpPr/>
+        <p:nvPr/>
+      </p:nvGrpSpPr>
+      <p:grpSpPr>
+        <a:xfrm>
+          <a:off x="0" y="0"/>
+          <a:ext cx="0" cy="0"/>
+          <a:chOff x="0" y="0"/>
+          <a:chExt cx="0" cy="0"/>
+        </a:xfrm>
+      </p:grpSpPr>
+      <p:sp>
+        <p:nvSpPr>
+          <p:cNvPr id="2" name="Título 1">
+            <a:extLst>
+              <a:ext uri="{FF2B5EF4-FFF2-40B4-BE49-F238E27FC236}">
+                <a16:creationId xmlns:a16="http://schemas.microsoft.com/office/drawing/2014/main" id="{82704E71-0377-4B9E-8535-2D034E571AB0}"/>
+              </a:ext>
+            </a:extLst>
+          </p:cNvPr>
+          <p:cNvSpPr>
+            <a:spLocks noGrp="1"/>
+          </p:cNvSpPr>
+          <p:nvPr>
+            <p:ph type="title"/>
+          </p:nvPr>
+        </p:nvSpPr>
+        <p:spPr/>
+        <p:txBody>
+          <a:bodyPr>
+            <a:normAutofit/>
+          </a:bodyPr>
+          <a:lstStyle/>
+          <a:p>
+            <a:pPr algn="just">
+              <a:lnSpc>
+                <a:spcPct val="150000"/>
+              </a:lnSpc>
+              <a:spcAft>
+                <a:spcPts val="800"/>
+              </a:spcAft>
+              <a:buClr>
+                <a:schemeClr val="accent2"/>
+              </a:buClr>
+            </a:pPr>
+            <a:r>
+              <a:rPr lang="es-SV" b="1" dirty="0">
+                <a:latin typeface="Arial" panose="020B0604020202020204" pitchFamily="34" charset="0"/>
+                <a:cs typeface="Arial" panose="020B0604020202020204" pitchFamily="34" charset="0"/>
+              </a:rPr>
+              <a:t>EJEMPLO DE USO DE GIT EN GITHUB</a:t>
+            </a:r>
+          </a:p>
+        </p:txBody>
+      </p:sp>
+      <p:sp>
+        <p:nvSpPr>
+          <p:cNvPr id="3" name="Marcador de contenido 2">
+            <a:extLst>
+              <a:ext uri="{FF2B5EF4-FFF2-40B4-BE49-F238E27FC236}">
+                <a16:creationId xmlns:a16="http://schemas.microsoft.com/office/drawing/2014/main" id="{A4165451-1C39-4628-BD84-AF243F580CF8}"/>
+              </a:ext>
+            </a:extLst>
+          </p:cNvPr>
+          <p:cNvSpPr>
+            <a:spLocks noGrp="1"/>
+          </p:cNvSpPr>
+          <p:nvPr>
+            <p:ph idx="1"/>
+          </p:nvPr>
+        </p:nvSpPr>
+        <p:spPr>
+          <a:xfrm>
+            <a:off x="838200" y="1825625"/>
+            <a:ext cx="5083206" cy="1254926"/>
+          </a:xfrm>
+        </p:spPr>
+        <p:txBody>
+          <a:bodyPr/>
+          <a:lstStyle/>
+          <a:p>
+            <a:r>
+              <a:rPr lang="es-SV" dirty="0"/>
+              <a:t>Creación de un repositorio local</a:t>
+            </a:r>
+          </a:p>
+        </p:txBody>
+      </p:sp>
+      <p:pic>
+        <p:nvPicPr>
+          <p:cNvPr id="5" name="Imagen 4">
+            <a:extLst>
+              <a:ext uri="{FF2B5EF4-FFF2-40B4-BE49-F238E27FC236}">
+                <a16:creationId xmlns:a16="http://schemas.microsoft.com/office/drawing/2014/main" id="{F4202DD0-15F3-4E3F-9C93-55808C824D7E}"/>
+              </a:ext>
+            </a:extLst>
+          </p:cNvPr>
+          <p:cNvPicPr>
+            <a:picLocks noChangeAspect="1"/>
+          </p:cNvPicPr>
+          <p:nvPr/>
+        </p:nvPicPr>
+        <p:blipFill>
+          <a:blip r:embed="rId2" cstate="print">
+            <a:extLst>
+              <a:ext uri="{28A0092B-C50C-407E-A947-70E740481C1C}">
+                <a14:useLocalDpi xmlns:a14="http://schemas.microsoft.com/office/drawing/2010/main" val="0"/>
+              </a:ext>
+            </a:extLst>
+          </a:blip>
+          <a:srcRect/>
+          <a:stretch/>
+        </p:blipFill>
+        <p:spPr>
+          <a:xfrm>
+            <a:off x="1526959" y="2223088"/>
+            <a:ext cx="3364637" cy="1894918"/>
+          </a:xfrm>
+          <a:prstGeom prst="rect">
+            <a:avLst/>
+          </a:prstGeom>
+        </p:spPr>
+      </p:pic>
+      <p:sp>
+        <p:nvSpPr>
+          <p:cNvPr id="6" name="Marcador de contenido 2">
+            <a:extLst>
+              <a:ext uri="{FF2B5EF4-FFF2-40B4-BE49-F238E27FC236}">
+                <a16:creationId xmlns:a16="http://schemas.microsoft.com/office/drawing/2014/main" id="{43E41D64-3096-4B85-B18C-C12122ED0167}"/>
+              </a:ext>
+            </a:extLst>
+          </p:cNvPr>
+          <p:cNvSpPr txBox="1">
+            <a:spLocks/>
+          </p:cNvSpPr>
+          <p:nvPr/>
+        </p:nvSpPr>
+        <p:spPr>
+          <a:xfrm>
+            <a:off x="6166281" y="1825625"/>
+            <a:ext cx="5481221" cy="1254926"/>
+          </a:xfrm>
+          <a:prstGeom prst="rect">
+            <a:avLst/>
+          </a:prstGeom>
+        </p:spPr>
+        <p:txBody>
+          <a:bodyPr vert="horz" lIns="91440" tIns="45720" rIns="91440" bIns="45720" rtlCol="0">
+            <a:normAutofit/>
+          </a:bodyPr>
+          <a:lstStyle>
+            <a:lvl1pPr marL="228600" indent="-228600" algn="l" defTabSz="914400" rtl="0" eaLnBrk="1" latinLnBrk="0" hangingPunct="1">
+              <a:lnSpc>
+                <a:spcPct val="90000"/>
+              </a:lnSpc>
+              <a:spcBef>
+                <a:spcPts val="1000"/>
+              </a:spcBef>
+              <a:buFont typeface="Arial" panose="020B0604020202020204" pitchFamily="34" charset="0"/>
+              <a:buChar char="•"/>
+              <a:defRPr sz="2800" kern="1200">
+                <a:solidFill>
+                  <a:schemeClr val="tx1"/>
+                </a:solidFill>
+                <a:latin typeface="+mn-lt"/>
+                <a:ea typeface="+mn-ea"/>
+                <a:cs typeface="+mn-cs"/>
+              </a:defRPr>
+            </a:lvl1pPr>
+            <a:lvl2pPr marL="685800" indent="-228600" algn="l" defTabSz="914400" rtl="0" eaLnBrk="1" latinLnBrk="0" hangingPunct="1">
+              <a:lnSpc>
+                <a:spcPct val="90000"/>
+              </a:lnSpc>
+              <a:spcBef>
+                <a:spcPts val="500"/>
+              </a:spcBef>
+              <a:buFont typeface="Arial" panose="020B0604020202020204" pitchFamily="34" charset="0"/>
+              <a:buChar char="•"/>
+              <a:defRPr sz="2400" kern="1200">
+                <a:solidFill>
+                  <a:schemeClr val="tx1"/>
+                </a:solidFill>
+                <a:latin typeface="+mn-lt"/>
+                <a:ea typeface="+mn-ea"/>
+                <a:cs typeface="+mn-cs"/>
+              </a:defRPr>
+            </a:lvl2pPr>
+            <a:lvl3pPr marL="1143000" indent="-228600" algn="l" defTabSz="914400" rtl="0" eaLnBrk="1" latinLnBrk="0" hangingPunct="1">
+              <a:lnSpc>
+                <a:spcPct val="90000"/>
+              </a:lnSpc>
+              <a:spcBef>
+                <a:spcPts val="500"/>
+              </a:spcBef>
+              <a:buFont typeface="Arial" panose="020B0604020202020204" pitchFamily="34" charset="0"/>
+              <a:buChar char="•"/>
+              <a:defRPr sz="2000" kern="1200">
+                <a:solidFill>
+                  <a:schemeClr val="tx1"/>
+                </a:solidFill>
+                <a:latin typeface="+mn-lt"/>
+                <a:ea typeface="+mn-ea"/>
+                <a:cs typeface="+mn-cs"/>
+              </a:defRPr>
+            </a:lvl3pPr>
+            <a:lvl4pPr marL="1600200" indent="-228600" algn="l" defTabSz="914400" rtl="0" eaLnBrk="1" latinLnBrk="0" hangingPunct="1">
+              <a:lnSpc>
+                <a:spcPct val="90000"/>
+              </a:lnSpc>
+              <a:spcBef>
+                <a:spcPts val="500"/>
+              </a:spcBef>
+              <a:buFont typeface="Arial" panose="020B0604020202020204" pitchFamily="34" charset="0"/>
+              <a:buChar char="•"/>
+              <a:defRPr sz="1800" kern="1200">
+                <a:solidFill>
+                  <a:schemeClr val="tx1"/>
+                </a:solidFill>
+                <a:latin typeface="+mn-lt"/>
+                <a:ea typeface="+mn-ea"/>
+                <a:cs typeface="+mn-cs"/>
+              </a:defRPr>
+            </a:lvl4pPr>
+            <a:lvl5pPr marL="2057400" indent="-228600" algn="l" defTabSz="914400" rtl="0" eaLnBrk="1" latinLnBrk="0" hangingPunct="1">
+              <a:lnSpc>
+                <a:spcPct val="90000"/>
+              </a:lnSpc>
+              <a:spcBef>
+                <a:spcPts val="500"/>
+              </a:spcBef>
+              <a:buFont typeface="Arial" panose="020B0604020202020204" pitchFamily="34" charset="0"/>
+              <a:buChar char="•"/>
+              <a:defRPr sz="1800" kern="1200">
+                <a:solidFill>
+                  <a:schemeClr val="tx1"/>
+                </a:solidFill>
+                <a:latin typeface="+mn-lt"/>
+                <a:ea typeface="+mn-ea"/>
+                <a:cs typeface="+mn-cs"/>
+              </a:defRPr>
+            </a:lvl5pPr>
+            <a:lvl6pPr marL="2514600" indent="-228600" algn="l" defTabSz="914400" rtl="0" eaLnBrk="1" latinLnBrk="0" hangingPunct="1">
+              <a:lnSpc>
+                <a:spcPct val="90000"/>
+              </a:lnSpc>
+              <a:spcBef>
+                <a:spcPts val="500"/>
+              </a:spcBef>
+              <a:buFont typeface="Arial" panose="020B0604020202020204" pitchFamily="34" charset="0"/>
+              <a:buChar char="•"/>
+              <a:defRPr sz="1800" kern="1200">
+                <a:solidFill>
+                  <a:schemeClr val="tx1"/>
+                </a:solidFill>
+                <a:latin typeface="+mn-lt"/>
+                <a:ea typeface="+mn-ea"/>
+                <a:cs typeface="+mn-cs"/>
+              </a:defRPr>
+            </a:lvl6pPr>
+            <a:lvl7pPr marL="2971800" indent="-228600" algn="l" defTabSz="914400" rtl="0" eaLnBrk="1" latinLnBrk="0" hangingPunct="1">
+              <a:lnSpc>
+                <a:spcPct val="90000"/>
+              </a:lnSpc>
+              <a:spcBef>
+                <a:spcPts val="500"/>
+              </a:spcBef>
+              <a:buFont typeface="Arial" panose="020B0604020202020204" pitchFamily="34" charset="0"/>
+              <a:buChar char="•"/>
+              <a:defRPr sz="1800" kern="1200">
+                <a:solidFill>
+                  <a:schemeClr val="tx1"/>
+                </a:solidFill>
+                <a:latin typeface="+mn-lt"/>
+                <a:ea typeface="+mn-ea"/>
+                <a:cs typeface="+mn-cs"/>
+              </a:defRPr>
+            </a:lvl7pPr>
+            <a:lvl8pPr marL="3429000" indent="-228600" algn="l" defTabSz="914400" rtl="0" eaLnBrk="1" latinLnBrk="0" hangingPunct="1">
+              <a:lnSpc>
+                <a:spcPct val="90000"/>
+              </a:lnSpc>
+              <a:spcBef>
+                <a:spcPts val="500"/>
+              </a:spcBef>
+              <a:buFont typeface="Arial" panose="020B0604020202020204" pitchFamily="34" charset="0"/>
+              <a:buChar char="•"/>
+              <a:defRPr sz="1800" kern="1200">
+                <a:solidFill>
+                  <a:schemeClr val="tx1"/>
+                </a:solidFill>
+                <a:latin typeface="+mn-lt"/>
+                <a:ea typeface="+mn-ea"/>
+                <a:cs typeface="+mn-cs"/>
+              </a:defRPr>
+            </a:lvl8pPr>
+            <a:lvl9pPr marL="3886200" indent="-228600" algn="l" defTabSz="914400" rtl="0" eaLnBrk="1" latinLnBrk="0" hangingPunct="1">
+              <a:lnSpc>
+                <a:spcPct val="90000"/>
+              </a:lnSpc>
+              <a:spcBef>
+                <a:spcPts val="500"/>
+              </a:spcBef>
+              <a:buFont typeface="Arial" panose="020B0604020202020204" pitchFamily="34" charset="0"/>
+              <a:buChar char="•"/>
+              <a:defRPr sz="1800" kern="1200">
+                <a:solidFill>
+                  <a:schemeClr val="tx1"/>
+                </a:solidFill>
+                <a:latin typeface="+mn-lt"/>
+                <a:ea typeface="+mn-ea"/>
+                <a:cs typeface="+mn-cs"/>
+              </a:defRPr>
+            </a:lvl9pPr>
+          </a:lstStyle>
+          <a:p>
+            <a:r>
+              <a:rPr lang="es-SV" dirty="0"/>
+              <a:t>Clonación de un repositorio origen</a:t>
+            </a:r>
+          </a:p>
+        </p:txBody>
+      </p:sp>
+      <p:pic>
+        <p:nvPicPr>
+          <p:cNvPr id="7" name="Imagen 6">
+            <a:extLst>
+              <a:ext uri="{FF2B5EF4-FFF2-40B4-BE49-F238E27FC236}">
+                <a16:creationId xmlns:a16="http://schemas.microsoft.com/office/drawing/2014/main" id="{FADC0FA3-2A76-4B4D-8AA3-71CDC34FFF9F}"/>
+              </a:ext>
+            </a:extLst>
+          </p:cNvPr>
+          <p:cNvPicPr>
+            <a:picLocks noChangeAspect="1"/>
+          </p:cNvPicPr>
+          <p:nvPr/>
+        </p:nvPicPr>
+        <p:blipFill>
+          <a:blip r:embed="rId3" cstate="print">
+            <a:extLst>
+              <a:ext uri="{28A0092B-C50C-407E-A947-70E740481C1C}">
+                <a14:useLocalDpi xmlns:a14="http://schemas.microsoft.com/office/drawing/2010/main" val="0"/>
+              </a:ext>
+            </a:extLst>
+          </a:blip>
+          <a:srcRect/>
+          <a:stretch/>
+        </p:blipFill>
+        <p:spPr>
+          <a:xfrm>
+            <a:off x="7219871" y="2359831"/>
+            <a:ext cx="3445170" cy="1697740"/>
+          </a:xfrm>
+          <a:prstGeom prst="rect">
+            <a:avLst/>
+          </a:prstGeom>
+        </p:spPr>
+      </p:pic>
+      <p:sp>
+        <p:nvSpPr>
+          <p:cNvPr id="8" name="Marcador de contenido 2">
+            <a:extLst>
+              <a:ext uri="{FF2B5EF4-FFF2-40B4-BE49-F238E27FC236}">
+                <a16:creationId xmlns:a16="http://schemas.microsoft.com/office/drawing/2014/main" id="{D3EB0FEC-D8B5-4946-9D52-649F9EEF2273}"/>
+              </a:ext>
+            </a:extLst>
+          </p:cNvPr>
+          <p:cNvSpPr txBox="1">
+            <a:spLocks/>
+          </p:cNvSpPr>
+          <p:nvPr/>
+        </p:nvSpPr>
+        <p:spPr>
+          <a:xfrm>
+            <a:off x="2830866" y="4211528"/>
+            <a:ext cx="6530267" cy="1254926"/>
+          </a:xfrm>
+          <a:prstGeom prst="rect">
+            <a:avLst/>
+          </a:prstGeom>
+        </p:spPr>
+        <p:txBody>
+          <a:bodyPr vert="horz" lIns="91440" tIns="45720" rIns="91440" bIns="45720" rtlCol="0">
+            <a:normAutofit/>
+          </a:bodyPr>
+          <a:lstStyle>
+            <a:lvl1pPr marL="228600" indent="-228600" algn="l" defTabSz="914400" rtl="0" eaLnBrk="1" latinLnBrk="0" hangingPunct="1">
+              <a:lnSpc>
+                <a:spcPct val="90000"/>
+              </a:lnSpc>
+              <a:spcBef>
+                <a:spcPts val="1000"/>
+              </a:spcBef>
+              <a:buFont typeface="Arial" panose="020B0604020202020204" pitchFamily="34" charset="0"/>
+              <a:buChar char="•"/>
+              <a:defRPr sz="2800" kern="1200">
+                <a:solidFill>
+                  <a:schemeClr val="tx1"/>
+                </a:solidFill>
+                <a:latin typeface="+mn-lt"/>
+                <a:ea typeface="+mn-ea"/>
+                <a:cs typeface="+mn-cs"/>
+              </a:defRPr>
+            </a:lvl1pPr>
+            <a:lvl2pPr marL="685800" indent="-228600" algn="l" defTabSz="914400" rtl="0" eaLnBrk="1" latinLnBrk="0" hangingPunct="1">
+              <a:lnSpc>
+                <a:spcPct val="90000"/>
+              </a:lnSpc>
+              <a:spcBef>
+                <a:spcPts val="500"/>
+              </a:spcBef>
+              <a:buFont typeface="Arial" panose="020B0604020202020204" pitchFamily="34" charset="0"/>
+              <a:buChar char="•"/>
+              <a:defRPr sz="2400" kern="1200">
+                <a:solidFill>
+                  <a:schemeClr val="tx1"/>
+                </a:solidFill>
+                <a:latin typeface="+mn-lt"/>
+                <a:ea typeface="+mn-ea"/>
+                <a:cs typeface="+mn-cs"/>
+              </a:defRPr>
+            </a:lvl2pPr>
+            <a:lvl3pPr marL="1143000" indent="-228600" algn="l" defTabSz="914400" rtl="0" eaLnBrk="1" latinLnBrk="0" hangingPunct="1">
+              <a:lnSpc>
+                <a:spcPct val="90000"/>
+              </a:lnSpc>
+              <a:spcBef>
+                <a:spcPts val="500"/>
+              </a:spcBef>
+              <a:buFont typeface="Arial" panose="020B0604020202020204" pitchFamily="34" charset="0"/>
+              <a:buChar char="•"/>
+              <a:defRPr sz="2000" kern="1200">
+                <a:solidFill>
+                  <a:schemeClr val="tx1"/>
+                </a:solidFill>
+                <a:latin typeface="+mn-lt"/>
+                <a:ea typeface="+mn-ea"/>
+                <a:cs typeface="+mn-cs"/>
+              </a:defRPr>
+            </a:lvl3pPr>
+            <a:lvl4pPr marL="1600200" indent="-228600" algn="l" defTabSz="914400" rtl="0" eaLnBrk="1" latinLnBrk="0" hangingPunct="1">
+              <a:lnSpc>
+                <a:spcPct val="90000"/>
+              </a:lnSpc>
+              <a:spcBef>
+                <a:spcPts val="500"/>
+              </a:spcBef>
+              <a:buFont typeface="Arial" panose="020B0604020202020204" pitchFamily="34" charset="0"/>
+              <a:buChar char="•"/>
+              <a:defRPr sz="1800" kern="1200">
+                <a:solidFill>
+                  <a:schemeClr val="tx1"/>
+                </a:solidFill>
+                <a:latin typeface="+mn-lt"/>
+                <a:ea typeface="+mn-ea"/>
+                <a:cs typeface="+mn-cs"/>
+              </a:defRPr>
+            </a:lvl4pPr>
+            <a:lvl5pPr marL="2057400" indent="-228600" algn="l" defTabSz="914400" rtl="0" eaLnBrk="1" latinLnBrk="0" hangingPunct="1">
+              <a:lnSpc>
+                <a:spcPct val="90000"/>
+              </a:lnSpc>
+              <a:spcBef>
+                <a:spcPts val="500"/>
+              </a:spcBef>
+              <a:buFont typeface="Arial" panose="020B0604020202020204" pitchFamily="34" charset="0"/>
+              <a:buChar char="•"/>
+              <a:defRPr sz="1800" kern="1200">
+                <a:solidFill>
+                  <a:schemeClr val="tx1"/>
+                </a:solidFill>
+                <a:latin typeface="+mn-lt"/>
+                <a:ea typeface="+mn-ea"/>
+                <a:cs typeface="+mn-cs"/>
+              </a:defRPr>
+            </a:lvl5pPr>
+            <a:lvl6pPr marL="2514600" indent="-228600" algn="l" defTabSz="914400" rtl="0" eaLnBrk="1" latinLnBrk="0" hangingPunct="1">
+              <a:lnSpc>
+                <a:spcPct val="90000"/>
+              </a:lnSpc>
+              <a:spcBef>
+                <a:spcPts val="500"/>
+              </a:spcBef>
+              <a:buFont typeface="Arial" panose="020B0604020202020204" pitchFamily="34" charset="0"/>
+              <a:buChar char="•"/>
+              <a:defRPr sz="1800" kern="1200">
+                <a:solidFill>
+                  <a:schemeClr val="tx1"/>
+                </a:solidFill>
+                <a:latin typeface="+mn-lt"/>
+                <a:ea typeface="+mn-ea"/>
+                <a:cs typeface="+mn-cs"/>
+              </a:defRPr>
+            </a:lvl6pPr>
+            <a:lvl7pPr marL="2971800" indent="-228600" algn="l" defTabSz="914400" rtl="0" eaLnBrk="1" latinLnBrk="0" hangingPunct="1">
+              <a:lnSpc>
+                <a:spcPct val="90000"/>
+              </a:lnSpc>
+              <a:spcBef>
+                <a:spcPts val="500"/>
+              </a:spcBef>
+              <a:buFont typeface="Arial" panose="020B0604020202020204" pitchFamily="34" charset="0"/>
+              <a:buChar char="•"/>
+              <a:defRPr sz="1800" kern="1200">
+                <a:solidFill>
+                  <a:schemeClr val="tx1"/>
+                </a:solidFill>
+                <a:latin typeface="+mn-lt"/>
+                <a:ea typeface="+mn-ea"/>
+                <a:cs typeface="+mn-cs"/>
+              </a:defRPr>
+            </a:lvl7pPr>
+            <a:lvl8pPr marL="3429000" indent="-228600" algn="l" defTabSz="914400" rtl="0" eaLnBrk="1" latinLnBrk="0" hangingPunct="1">
+              <a:lnSpc>
+                <a:spcPct val="90000"/>
+              </a:lnSpc>
+              <a:spcBef>
+                <a:spcPts val="500"/>
+              </a:spcBef>
+              <a:buFont typeface="Arial" panose="020B0604020202020204" pitchFamily="34" charset="0"/>
+              <a:buChar char="•"/>
+              <a:defRPr sz="1800" kern="1200">
+                <a:solidFill>
+                  <a:schemeClr val="tx1"/>
+                </a:solidFill>
+                <a:latin typeface="+mn-lt"/>
+                <a:ea typeface="+mn-ea"/>
+                <a:cs typeface="+mn-cs"/>
+              </a:defRPr>
+            </a:lvl8pPr>
+            <a:lvl9pPr marL="3886200" indent="-228600" algn="l" defTabSz="914400" rtl="0" eaLnBrk="1" latinLnBrk="0" hangingPunct="1">
+              <a:lnSpc>
+                <a:spcPct val="90000"/>
+              </a:lnSpc>
+              <a:spcBef>
+                <a:spcPts val="500"/>
+              </a:spcBef>
+              <a:buFont typeface="Arial" panose="020B0604020202020204" pitchFamily="34" charset="0"/>
+              <a:buChar char="•"/>
+              <a:defRPr sz="1800" kern="1200">
+                <a:solidFill>
+                  <a:schemeClr val="tx1"/>
+                </a:solidFill>
+                <a:latin typeface="+mn-lt"/>
+                <a:ea typeface="+mn-ea"/>
+                <a:cs typeface="+mn-cs"/>
+              </a:defRPr>
+            </a:lvl9pPr>
+          </a:lstStyle>
+          <a:p>
+            <a:r>
+              <a:rPr lang="es-SV" dirty="0"/>
+              <a:t>Configuración de usuario en equipo local</a:t>
+            </a:r>
+          </a:p>
+        </p:txBody>
+      </p:sp>
+      <p:pic>
+        <p:nvPicPr>
+          <p:cNvPr id="9" name="Imagen 8">
+            <a:extLst>
+              <a:ext uri="{FF2B5EF4-FFF2-40B4-BE49-F238E27FC236}">
+                <a16:creationId xmlns:a16="http://schemas.microsoft.com/office/drawing/2014/main" id="{068C64EC-2FC3-4346-91D2-8E6E1B461700}"/>
+              </a:ext>
+            </a:extLst>
+          </p:cNvPr>
+          <p:cNvPicPr>
+            <a:picLocks noChangeAspect="1"/>
+          </p:cNvPicPr>
+          <p:nvPr/>
+        </p:nvPicPr>
+        <p:blipFill>
+          <a:blip r:embed="rId4" cstate="print">
+            <a:extLst>
+              <a:ext uri="{28A0092B-C50C-407E-A947-70E740481C1C}">
+                <a14:useLocalDpi xmlns:a14="http://schemas.microsoft.com/office/drawing/2010/main" val="0"/>
+              </a:ext>
+            </a:extLst>
+          </a:blip>
+          <a:srcRect/>
+          <a:stretch/>
+        </p:blipFill>
+        <p:spPr>
+          <a:xfrm>
+            <a:off x="4574874" y="4770209"/>
+            <a:ext cx="3042250" cy="1714926"/>
+          </a:xfrm>
+          <a:prstGeom prst="rect">
+            <a:avLst/>
+          </a:prstGeom>
+        </p:spPr>
+      </p:pic>
+    </p:spTree>
+    <p:extLst>
+      <p:ext uri="{BB962C8B-B14F-4D97-AF65-F5344CB8AC3E}">
+        <p14:creationId xmlns:p14="http://schemas.microsoft.com/office/powerpoint/2010/main" val="2828839400"/>
+      </p:ext>
+    </p:extLst>
+  </p:cSld>
+  <p:clrMapOvr>
+    <a:masterClrMapping/>
+  </p:clrMapOvr>
+</p:sld>
+</file>
+
+<file path=ppt/slides/slide24.xml><?xml version="1.0" encoding="utf-8"?>
+<p:sld xmlns:a="http://schemas.openxmlformats.org/drawingml/2006/main" xmlns:r="http://schemas.openxmlformats.org/officeDocument/2006/relationships" xmlns:p="http://schemas.openxmlformats.org/presentationml/2006/main">
+  <p:cSld>
+    <p:spTree>
+      <p:nvGrpSpPr>
+        <p:cNvPr id="1" name=""/>
+        <p:cNvGrpSpPr/>
+        <p:nvPr/>
+      </p:nvGrpSpPr>
+      <p:grpSpPr>
+        <a:xfrm>
+          <a:off x="0" y="0"/>
+          <a:ext cx="0" cy="0"/>
+          <a:chOff x="0" y="0"/>
+          <a:chExt cx="0" cy="0"/>
+        </a:xfrm>
+      </p:grpSpPr>
+      <p:sp>
+        <p:nvSpPr>
+          <p:cNvPr id="2" name="Título 1">
+            <a:extLst>
+              <a:ext uri="{FF2B5EF4-FFF2-40B4-BE49-F238E27FC236}">
+                <a16:creationId xmlns:a16="http://schemas.microsoft.com/office/drawing/2014/main" id="{82704E71-0377-4B9E-8535-2D034E571AB0}"/>
+              </a:ext>
+            </a:extLst>
+          </p:cNvPr>
+          <p:cNvSpPr>
+            <a:spLocks noGrp="1"/>
+          </p:cNvSpPr>
+          <p:nvPr>
+            <p:ph type="title"/>
+          </p:nvPr>
+        </p:nvSpPr>
+        <p:spPr/>
+        <p:txBody>
+          <a:bodyPr>
+            <a:normAutofit/>
+          </a:bodyPr>
+          <a:lstStyle/>
+          <a:p>
+            <a:pPr algn="just">
+              <a:lnSpc>
+                <a:spcPct val="150000"/>
+              </a:lnSpc>
+              <a:spcAft>
+                <a:spcPts val="800"/>
+              </a:spcAft>
+              <a:buClr>
+                <a:schemeClr val="accent2"/>
+              </a:buClr>
+            </a:pPr>
+            <a:r>
+              <a:rPr lang="es-SV" b="1" dirty="0">
+                <a:latin typeface="Arial" panose="020B0604020202020204" pitchFamily="34" charset="0"/>
+                <a:cs typeface="Arial" panose="020B0604020202020204" pitchFamily="34" charset="0"/>
+              </a:rPr>
+              <a:t>EJEMPLO DE USO DE GIT EN GITHUB</a:t>
+            </a:r>
+          </a:p>
+        </p:txBody>
+      </p:sp>
+      <p:sp>
+        <p:nvSpPr>
+          <p:cNvPr id="3" name="Marcador de contenido 2">
+            <a:extLst>
+              <a:ext uri="{FF2B5EF4-FFF2-40B4-BE49-F238E27FC236}">
+                <a16:creationId xmlns:a16="http://schemas.microsoft.com/office/drawing/2014/main" id="{A4165451-1C39-4628-BD84-AF243F580CF8}"/>
+              </a:ext>
+            </a:extLst>
+          </p:cNvPr>
+          <p:cNvSpPr>
+            <a:spLocks noGrp="1"/>
+          </p:cNvSpPr>
+          <p:nvPr>
+            <p:ph idx="1"/>
+          </p:nvPr>
+        </p:nvSpPr>
+        <p:spPr>
+          <a:xfrm>
+            <a:off x="227860" y="2499592"/>
+            <a:ext cx="3780610" cy="1254926"/>
+          </a:xfrm>
+        </p:spPr>
+        <p:txBody>
+          <a:bodyPr/>
+          <a:lstStyle/>
+          <a:p>
+            <a:r>
+              <a:rPr lang="es-SV" dirty="0"/>
+              <a:t>Subida de archivos locales a origen</a:t>
+            </a:r>
+          </a:p>
+        </p:txBody>
+      </p:sp>
+      <p:pic>
+        <p:nvPicPr>
+          <p:cNvPr id="5" name="Imagen 4">
+            <a:extLst>
+              <a:ext uri="{FF2B5EF4-FFF2-40B4-BE49-F238E27FC236}">
+                <a16:creationId xmlns:a16="http://schemas.microsoft.com/office/drawing/2014/main" id="{F4202DD0-15F3-4E3F-9C93-55808C824D7E}"/>
+              </a:ext>
+            </a:extLst>
+          </p:cNvPr>
+          <p:cNvPicPr>
+            <a:picLocks noChangeAspect="1"/>
+          </p:cNvPicPr>
+          <p:nvPr/>
+        </p:nvPicPr>
+        <p:blipFill>
+          <a:blip r:embed="rId2" cstate="print">
+            <a:extLst>
+              <a:ext uri="{28A0092B-C50C-407E-A947-70E740481C1C}">
+                <a14:useLocalDpi xmlns:a14="http://schemas.microsoft.com/office/drawing/2010/main" val="0"/>
+              </a:ext>
+            </a:extLst>
+          </a:blip>
+          <a:srcRect/>
+          <a:stretch/>
+        </p:blipFill>
+        <p:spPr>
+          <a:xfrm>
+            <a:off x="426484" y="3400118"/>
+            <a:ext cx="3497446" cy="1969716"/>
+          </a:xfrm>
+          <a:prstGeom prst="rect">
+            <a:avLst/>
+          </a:prstGeom>
+        </p:spPr>
+      </p:pic>
+      <p:sp>
+        <p:nvSpPr>
+          <p:cNvPr id="6" name="Marcador de contenido 2">
+            <a:extLst>
+              <a:ext uri="{FF2B5EF4-FFF2-40B4-BE49-F238E27FC236}">
+                <a16:creationId xmlns:a16="http://schemas.microsoft.com/office/drawing/2014/main" id="{43E41D64-3096-4B85-B18C-C12122ED0167}"/>
+              </a:ext>
+            </a:extLst>
+          </p:cNvPr>
+          <p:cNvSpPr txBox="1">
+            <a:spLocks/>
+          </p:cNvSpPr>
+          <p:nvPr/>
+        </p:nvSpPr>
+        <p:spPr>
+          <a:xfrm>
+            <a:off x="7890568" y="2499592"/>
+            <a:ext cx="4426258" cy="1254926"/>
+          </a:xfrm>
+          <a:prstGeom prst="rect">
+            <a:avLst/>
+          </a:prstGeom>
+        </p:spPr>
+        <p:txBody>
+          <a:bodyPr vert="horz" lIns="91440" tIns="45720" rIns="91440" bIns="45720" rtlCol="0">
+            <a:normAutofit/>
+          </a:bodyPr>
+          <a:lstStyle>
+            <a:lvl1pPr marL="228600" indent="-228600" algn="l" defTabSz="914400" rtl="0" eaLnBrk="1" latinLnBrk="0" hangingPunct="1">
+              <a:lnSpc>
+                <a:spcPct val="90000"/>
+              </a:lnSpc>
+              <a:spcBef>
+                <a:spcPts val="1000"/>
+              </a:spcBef>
+              <a:buFont typeface="Arial" panose="020B0604020202020204" pitchFamily="34" charset="0"/>
+              <a:buChar char="•"/>
+              <a:defRPr sz="2800" kern="1200">
+                <a:solidFill>
+                  <a:schemeClr val="tx1"/>
+                </a:solidFill>
+                <a:latin typeface="+mn-lt"/>
+                <a:ea typeface="+mn-ea"/>
+                <a:cs typeface="+mn-cs"/>
+              </a:defRPr>
+            </a:lvl1pPr>
+            <a:lvl2pPr marL="685800" indent="-228600" algn="l" defTabSz="914400" rtl="0" eaLnBrk="1" latinLnBrk="0" hangingPunct="1">
+              <a:lnSpc>
+                <a:spcPct val="90000"/>
+              </a:lnSpc>
+              <a:spcBef>
+                <a:spcPts val="500"/>
+              </a:spcBef>
+              <a:buFont typeface="Arial" panose="020B0604020202020204" pitchFamily="34" charset="0"/>
+              <a:buChar char="•"/>
+              <a:defRPr sz="2400" kern="1200">
+                <a:solidFill>
+                  <a:schemeClr val="tx1"/>
+                </a:solidFill>
+                <a:latin typeface="+mn-lt"/>
+                <a:ea typeface="+mn-ea"/>
+                <a:cs typeface="+mn-cs"/>
+              </a:defRPr>
+            </a:lvl2pPr>
+            <a:lvl3pPr marL="1143000" indent="-228600" algn="l" defTabSz="914400" rtl="0" eaLnBrk="1" latinLnBrk="0" hangingPunct="1">
+              <a:lnSpc>
+                <a:spcPct val="90000"/>
+              </a:lnSpc>
+              <a:spcBef>
+                <a:spcPts val="500"/>
+              </a:spcBef>
+              <a:buFont typeface="Arial" panose="020B0604020202020204" pitchFamily="34" charset="0"/>
+              <a:buChar char="•"/>
+              <a:defRPr sz="2000" kern="1200">
+                <a:solidFill>
+                  <a:schemeClr val="tx1"/>
+                </a:solidFill>
+                <a:latin typeface="+mn-lt"/>
+                <a:ea typeface="+mn-ea"/>
+                <a:cs typeface="+mn-cs"/>
+              </a:defRPr>
+            </a:lvl3pPr>
+            <a:lvl4pPr marL="1600200" indent="-228600" algn="l" defTabSz="914400" rtl="0" eaLnBrk="1" latinLnBrk="0" hangingPunct="1">
+              <a:lnSpc>
+                <a:spcPct val="90000"/>
+              </a:lnSpc>
+              <a:spcBef>
+                <a:spcPts val="500"/>
+              </a:spcBef>
+              <a:buFont typeface="Arial" panose="020B0604020202020204" pitchFamily="34" charset="0"/>
+              <a:buChar char="•"/>
+              <a:defRPr sz="1800" kern="1200">
+                <a:solidFill>
+                  <a:schemeClr val="tx1"/>
+                </a:solidFill>
+                <a:latin typeface="+mn-lt"/>
+                <a:ea typeface="+mn-ea"/>
+                <a:cs typeface="+mn-cs"/>
+              </a:defRPr>
+            </a:lvl4pPr>
+            <a:lvl5pPr marL="2057400" indent="-228600" algn="l" defTabSz="914400" rtl="0" eaLnBrk="1" latinLnBrk="0" hangingPunct="1">
+              <a:lnSpc>
+                <a:spcPct val="90000"/>
+              </a:lnSpc>
+              <a:spcBef>
+                <a:spcPts val="500"/>
+              </a:spcBef>
+              <a:buFont typeface="Arial" panose="020B0604020202020204" pitchFamily="34" charset="0"/>
+              <a:buChar char="•"/>
+              <a:defRPr sz="1800" kern="1200">
+                <a:solidFill>
+                  <a:schemeClr val="tx1"/>
+                </a:solidFill>
+                <a:latin typeface="+mn-lt"/>
+                <a:ea typeface="+mn-ea"/>
+                <a:cs typeface="+mn-cs"/>
+              </a:defRPr>
+            </a:lvl5pPr>
+            <a:lvl6pPr marL="2514600" indent="-228600" algn="l" defTabSz="914400" rtl="0" eaLnBrk="1" latinLnBrk="0" hangingPunct="1">
+              <a:lnSpc>
+                <a:spcPct val="90000"/>
+              </a:lnSpc>
+              <a:spcBef>
+                <a:spcPts val="500"/>
+              </a:spcBef>
+              <a:buFont typeface="Arial" panose="020B0604020202020204" pitchFamily="34" charset="0"/>
+              <a:buChar char="•"/>
+              <a:defRPr sz="1800" kern="1200">
+                <a:solidFill>
+                  <a:schemeClr val="tx1"/>
+                </a:solidFill>
+                <a:latin typeface="+mn-lt"/>
+                <a:ea typeface="+mn-ea"/>
+                <a:cs typeface="+mn-cs"/>
+              </a:defRPr>
+            </a:lvl6pPr>
+            <a:lvl7pPr marL="2971800" indent="-228600" algn="l" defTabSz="914400" rtl="0" eaLnBrk="1" latinLnBrk="0" hangingPunct="1">
+              <a:lnSpc>
+                <a:spcPct val="90000"/>
+              </a:lnSpc>
+              <a:spcBef>
+                <a:spcPts val="500"/>
+              </a:spcBef>
+              <a:buFont typeface="Arial" panose="020B0604020202020204" pitchFamily="34" charset="0"/>
+              <a:buChar char="•"/>
+              <a:defRPr sz="1800" kern="1200">
+                <a:solidFill>
+                  <a:schemeClr val="tx1"/>
+                </a:solidFill>
+                <a:latin typeface="+mn-lt"/>
+                <a:ea typeface="+mn-ea"/>
+                <a:cs typeface="+mn-cs"/>
+              </a:defRPr>
+            </a:lvl7pPr>
+            <a:lvl8pPr marL="3429000" indent="-228600" algn="l" defTabSz="914400" rtl="0" eaLnBrk="1" latinLnBrk="0" hangingPunct="1">
+              <a:lnSpc>
+                <a:spcPct val="90000"/>
+              </a:lnSpc>
+              <a:spcBef>
+                <a:spcPts val="500"/>
+              </a:spcBef>
+              <a:buFont typeface="Arial" panose="020B0604020202020204" pitchFamily="34" charset="0"/>
+              <a:buChar char="•"/>
+              <a:defRPr sz="1800" kern="1200">
+                <a:solidFill>
+                  <a:schemeClr val="tx1"/>
+                </a:solidFill>
+                <a:latin typeface="+mn-lt"/>
+                <a:ea typeface="+mn-ea"/>
+                <a:cs typeface="+mn-cs"/>
+              </a:defRPr>
+            </a:lvl8pPr>
+            <a:lvl9pPr marL="3886200" indent="-228600" algn="l" defTabSz="914400" rtl="0" eaLnBrk="1" latinLnBrk="0" hangingPunct="1">
+              <a:lnSpc>
+                <a:spcPct val="90000"/>
+              </a:lnSpc>
+              <a:spcBef>
+                <a:spcPts val="500"/>
+              </a:spcBef>
+              <a:buFont typeface="Arial" panose="020B0604020202020204" pitchFamily="34" charset="0"/>
+              <a:buChar char="•"/>
+              <a:defRPr sz="1800" kern="1200">
+                <a:solidFill>
+                  <a:schemeClr val="tx1"/>
+                </a:solidFill>
+                <a:latin typeface="+mn-lt"/>
+                <a:ea typeface="+mn-ea"/>
+                <a:cs typeface="+mn-cs"/>
+              </a:defRPr>
+            </a:lvl9pPr>
+          </a:lstStyle>
+          <a:p>
+            <a:r>
+              <a:rPr lang="es-SV" dirty="0"/>
+              <a:t>Deshacer cambios locales</a:t>
+            </a:r>
+          </a:p>
+        </p:txBody>
+      </p:sp>
+      <p:pic>
+        <p:nvPicPr>
+          <p:cNvPr id="7" name="Imagen 6">
+            <a:extLst>
+              <a:ext uri="{FF2B5EF4-FFF2-40B4-BE49-F238E27FC236}">
+                <a16:creationId xmlns:a16="http://schemas.microsoft.com/office/drawing/2014/main" id="{FADC0FA3-2A76-4B4D-8AA3-71CDC34FFF9F}"/>
+              </a:ext>
+            </a:extLst>
+          </p:cNvPr>
+          <p:cNvPicPr>
+            <a:picLocks noChangeAspect="1"/>
+          </p:cNvPicPr>
+          <p:nvPr/>
+        </p:nvPicPr>
+        <p:blipFill>
+          <a:blip r:embed="rId3" cstate="print">
+            <a:extLst>
+              <a:ext uri="{28A0092B-C50C-407E-A947-70E740481C1C}">
+                <a14:useLocalDpi xmlns:a14="http://schemas.microsoft.com/office/drawing/2010/main" val="0"/>
+              </a:ext>
+            </a:extLst>
+          </a:blip>
+          <a:srcRect/>
+          <a:stretch/>
+        </p:blipFill>
+        <p:spPr>
+          <a:xfrm>
+            <a:off x="8169937" y="3387597"/>
+            <a:ext cx="3519677" cy="1982236"/>
+          </a:xfrm>
+          <a:prstGeom prst="rect">
+            <a:avLst/>
+          </a:prstGeom>
+        </p:spPr>
+      </p:pic>
+      <p:sp>
+        <p:nvSpPr>
+          <p:cNvPr id="8" name="Marcador de contenido 2">
+            <a:extLst>
+              <a:ext uri="{FF2B5EF4-FFF2-40B4-BE49-F238E27FC236}">
+                <a16:creationId xmlns:a16="http://schemas.microsoft.com/office/drawing/2014/main" id="{D3EB0FEC-D8B5-4946-9D52-649F9EEF2273}"/>
+              </a:ext>
+            </a:extLst>
+          </p:cNvPr>
+          <p:cNvSpPr txBox="1">
+            <a:spLocks/>
+          </p:cNvSpPr>
+          <p:nvPr/>
+        </p:nvSpPr>
+        <p:spPr>
+          <a:xfrm>
+            <a:off x="3962114" y="2493621"/>
+            <a:ext cx="4426258" cy="1254926"/>
+          </a:xfrm>
+          <a:prstGeom prst="rect">
+            <a:avLst/>
+          </a:prstGeom>
+        </p:spPr>
+        <p:txBody>
+          <a:bodyPr vert="horz" lIns="91440" tIns="45720" rIns="91440" bIns="45720" rtlCol="0">
+            <a:normAutofit/>
+          </a:bodyPr>
+          <a:lstStyle>
+            <a:lvl1pPr marL="228600" indent="-228600" algn="l" defTabSz="914400" rtl="0" eaLnBrk="1" latinLnBrk="0" hangingPunct="1">
+              <a:lnSpc>
+                <a:spcPct val="90000"/>
+              </a:lnSpc>
+              <a:spcBef>
+                <a:spcPts val="1000"/>
+              </a:spcBef>
+              <a:buFont typeface="Arial" panose="020B0604020202020204" pitchFamily="34" charset="0"/>
+              <a:buChar char="•"/>
+              <a:defRPr sz="2800" kern="1200">
+                <a:solidFill>
+                  <a:schemeClr val="tx1"/>
+                </a:solidFill>
+                <a:latin typeface="+mn-lt"/>
+                <a:ea typeface="+mn-ea"/>
+                <a:cs typeface="+mn-cs"/>
+              </a:defRPr>
+            </a:lvl1pPr>
+            <a:lvl2pPr marL="685800" indent="-228600" algn="l" defTabSz="914400" rtl="0" eaLnBrk="1" latinLnBrk="0" hangingPunct="1">
+              <a:lnSpc>
+                <a:spcPct val="90000"/>
+              </a:lnSpc>
+              <a:spcBef>
+                <a:spcPts val="500"/>
+              </a:spcBef>
+              <a:buFont typeface="Arial" panose="020B0604020202020204" pitchFamily="34" charset="0"/>
+              <a:buChar char="•"/>
+              <a:defRPr sz="2400" kern="1200">
+                <a:solidFill>
+                  <a:schemeClr val="tx1"/>
+                </a:solidFill>
+                <a:latin typeface="+mn-lt"/>
+                <a:ea typeface="+mn-ea"/>
+                <a:cs typeface="+mn-cs"/>
+              </a:defRPr>
+            </a:lvl2pPr>
+            <a:lvl3pPr marL="1143000" indent="-228600" algn="l" defTabSz="914400" rtl="0" eaLnBrk="1" latinLnBrk="0" hangingPunct="1">
+              <a:lnSpc>
+                <a:spcPct val="90000"/>
+              </a:lnSpc>
+              <a:spcBef>
+                <a:spcPts val="500"/>
+              </a:spcBef>
+              <a:buFont typeface="Arial" panose="020B0604020202020204" pitchFamily="34" charset="0"/>
+              <a:buChar char="•"/>
+              <a:defRPr sz="2000" kern="1200">
+                <a:solidFill>
+                  <a:schemeClr val="tx1"/>
+                </a:solidFill>
+                <a:latin typeface="+mn-lt"/>
+                <a:ea typeface="+mn-ea"/>
+                <a:cs typeface="+mn-cs"/>
+              </a:defRPr>
+            </a:lvl3pPr>
+            <a:lvl4pPr marL="1600200" indent="-228600" algn="l" defTabSz="914400" rtl="0" eaLnBrk="1" latinLnBrk="0" hangingPunct="1">
+              <a:lnSpc>
+                <a:spcPct val="90000"/>
+              </a:lnSpc>
+              <a:spcBef>
+                <a:spcPts val="500"/>
+              </a:spcBef>
+              <a:buFont typeface="Arial" panose="020B0604020202020204" pitchFamily="34" charset="0"/>
+              <a:buChar char="•"/>
+              <a:defRPr sz="1800" kern="1200">
+                <a:solidFill>
+                  <a:schemeClr val="tx1"/>
+                </a:solidFill>
+                <a:latin typeface="+mn-lt"/>
+                <a:ea typeface="+mn-ea"/>
+                <a:cs typeface="+mn-cs"/>
+              </a:defRPr>
+            </a:lvl4pPr>
+            <a:lvl5pPr marL="2057400" indent="-228600" algn="l" defTabSz="914400" rtl="0" eaLnBrk="1" latinLnBrk="0" hangingPunct="1">
+              <a:lnSpc>
+                <a:spcPct val="90000"/>
+              </a:lnSpc>
+              <a:spcBef>
+                <a:spcPts val="500"/>
+              </a:spcBef>
+              <a:buFont typeface="Arial" panose="020B0604020202020204" pitchFamily="34" charset="0"/>
+              <a:buChar char="•"/>
+              <a:defRPr sz="1800" kern="1200">
+                <a:solidFill>
+                  <a:schemeClr val="tx1"/>
+                </a:solidFill>
+                <a:latin typeface="+mn-lt"/>
+                <a:ea typeface="+mn-ea"/>
+                <a:cs typeface="+mn-cs"/>
+              </a:defRPr>
+            </a:lvl5pPr>
+            <a:lvl6pPr marL="2514600" indent="-228600" algn="l" defTabSz="914400" rtl="0" eaLnBrk="1" latinLnBrk="0" hangingPunct="1">
+              <a:lnSpc>
+                <a:spcPct val="90000"/>
+              </a:lnSpc>
+              <a:spcBef>
+                <a:spcPts val="500"/>
+              </a:spcBef>
+              <a:buFont typeface="Arial" panose="020B0604020202020204" pitchFamily="34" charset="0"/>
+              <a:buChar char="•"/>
+              <a:defRPr sz="1800" kern="1200">
+                <a:solidFill>
+                  <a:schemeClr val="tx1"/>
+                </a:solidFill>
+                <a:latin typeface="+mn-lt"/>
+                <a:ea typeface="+mn-ea"/>
+                <a:cs typeface="+mn-cs"/>
+              </a:defRPr>
+            </a:lvl6pPr>
+            <a:lvl7pPr marL="2971800" indent="-228600" algn="l" defTabSz="914400" rtl="0" eaLnBrk="1" latinLnBrk="0" hangingPunct="1">
+              <a:lnSpc>
+                <a:spcPct val="90000"/>
+              </a:lnSpc>
+              <a:spcBef>
+                <a:spcPts val="500"/>
+              </a:spcBef>
+              <a:buFont typeface="Arial" panose="020B0604020202020204" pitchFamily="34" charset="0"/>
+              <a:buChar char="•"/>
+              <a:defRPr sz="1800" kern="1200">
+                <a:solidFill>
+                  <a:schemeClr val="tx1"/>
+                </a:solidFill>
+                <a:latin typeface="+mn-lt"/>
+                <a:ea typeface="+mn-ea"/>
+                <a:cs typeface="+mn-cs"/>
+              </a:defRPr>
+            </a:lvl7pPr>
+            <a:lvl8pPr marL="3429000" indent="-228600" algn="l" defTabSz="914400" rtl="0" eaLnBrk="1" latinLnBrk="0" hangingPunct="1">
+              <a:lnSpc>
+                <a:spcPct val="90000"/>
+              </a:lnSpc>
+              <a:spcBef>
+                <a:spcPts val="500"/>
+              </a:spcBef>
+              <a:buFont typeface="Arial" panose="020B0604020202020204" pitchFamily="34" charset="0"/>
+              <a:buChar char="•"/>
+              <a:defRPr sz="1800" kern="1200">
+                <a:solidFill>
+                  <a:schemeClr val="tx1"/>
+                </a:solidFill>
+                <a:latin typeface="+mn-lt"/>
+                <a:ea typeface="+mn-ea"/>
+                <a:cs typeface="+mn-cs"/>
+              </a:defRPr>
+            </a:lvl8pPr>
+            <a:lvl9pPr marL="3886200" indent="-228600" algn="l" defTabSz="914400" rtl="0" eaLnBrk="1" latinLnBrk="0" hangingPunct="1">
+              <a:lnSpc>
+                <a:spcPct val="90000"/>
+              </a:lnSpc>
+              <a:spcBef>
+                <a:spcPts val="500"/>
+              </a:spcBef>
+              <a:buFont typeface="Arial" panose="020B0604020202020204" pitchFamily="34" charset="0"/>
+              <a:buChar char="•"/>
+              <a:defRPr sz="1800" kern="1200">
+                <a:solidFill>
+                  <a:schemeClr val="tx1"/>
+                </a:solidFill>
+                <a:latin typeface="+mn-lt"/>
+                <a:ea typeface="+mn-ea"/>
+                <a:cs typeface="+mn-cs"/>
+              </a:defRPr>
+            </a:lvl9pPr>
+          </a:lstStyle>
+          <a:p>
+            <a:r>
+              <a:rPr lang="es-SV" dirty="0"/>
+              <a:t>Integración de cambios origen a locales</a:t>
+            </a:r>
+          </a:p>
+        </p:txBody>
+      </p:sp>
+      <p:pic>
+        <p:nvPicPr>
+          <p:cNvPr id="9" name="Imagen 8">
+            <a:extLst>
+              <a:ext uri="{FF2B5EF4-FFF2-40B4-BE49-F238E27FC236}">
+                <a16:creationId xmlns:a16="http://schemas.microsoft.com/office/drawing/2014/main" id="{068C64EC-2FC3-4346-91D2-8E6E1B461700}"/>
+              </a:ext>
+            </a:extLst>
+          </p:cNvPr>
+          <p:cNvPicPr>
+            <a:picLocks noChangeAspect="1"/>
+          </p:cNvPicPr>
+          <p:nvPr/>
+        </p:nvPicPr>
+        <p:blipFill>
+          <a:blip r:embed="rId4" cstate="print">
+            <a:extLst>
+              <a:ext uri="{28A0092B-C50C-407E-A947-70E740481C1C}">
+                <a14:useLocalDpi xmlns:a14="http://schemas.microsoft.com/office/drawing/2010/main" val="0"/>
+              </a:ext>
+            </a:extLst>
+          </a:blip>
+          <a:srcRect/>
+          <a:stretch/>
+        </p:blipFill>
+        <p:spPr>
+          <a:xfrm>
+            <a:off x="4299765" y="3401868"/>
+            <a:ext cx="3494338" cy="1967965"/>
+          </a:xfrm>
+          <a:prstGeom prst="rect">
+            <a:avLst/>
+          </a:prstGeom>
+        </p:spPr>
+      </p:pic>
+    </p:spTree>
+    <p:extLst>
+      <p:ext uri="{BB962C8B-B14F-4D97-AF65-F5344CB8AC3E}">
+        <p14:creationId xmlns:p14="http://schemas.microsoft.com/office/powerpoint/2010/main" val="357874935"/>
+      </p:ext>
+    </p:extLst>
+  </p:cSld>
+  <p:clrMapOvr>
+    <a:masterClrMapping/>
+  </p:clrMapOvr>
+</p:sld>
+</file>
+
+<file path=ppt/slides/slide25.xml><?xml version="1.0" encoding="utf-8"?>
+<p:sld xmlns:a="http://schemas.openxmlformats.org/drawingml/2006/main" xmlns:r="http://schemas.openxmlformats.org/officeDocument/2006/relationships" xmlns:p="http://schemas.openxmlformats.org/presentationml/2006/main">
+  <p:cSld>
+    <p:spTree>
+      <p:nvGrpSpPr>
+        <p:cNvPr id="1" name=""/>
+        <p:cNvGrpSpPr/>
+        <p:nvPr/>
+      </p:nvGrpSpPr>
+      <p:grpSpPr>
+        <a:xfrm>
+          <a:off x="0" y="0"/>
+          <a:ext cx="0" cy="0"/>
+          <a:chOff x="0" y="0"/>
+          <a:chExt cx="0" cy="0"/>
+        </a:xfrm>
+      </p:grpSpPr>
+      <p:sp>
+        <p:nvSpPr>
+          <p:cNvPr id="2" name="Título 1">
+            <a:extLst>
+              <a:ext uri="{FF2B5EF4-FFF2-40B4-BE49-F238E27FC236}">
+                <a16:creationId xmlns:a16="http://schemas.microsoft.com/office/drawing/2014/main" id="{82704E71-0377-4B9E-8535-2D034E571AB0}"/>
+              </a:ext>
+            </a:extLst>
+          </p:cNvPr>
+          <p:cNvSpPr>
+            <a:spLocks noGrp="1"/>
+          </p:cNvSpPr>
+          <p:nvPr>
+            <p:ph type="title"/>
+          </p:nvPr>
+        </p:nvSpPr>
+        <p:spPr/>
+        <p:txBody>
+          <a:bodyPr>
+            <a:normAutofit/>
+          </a:bodyPr>
+          <a:lstStyle/>
+          <a:p>
+            <a:pPr algn="just">
+              <a:lnSpc>
+                <a:spcPct val="150000"/>
+              </a:lnSpc>
+              <a:spcAft>
+                <a:spcPts val="800"/>
+              </a:spcAft>
+              <a:buClr>
+                <a:schemeClr val="accent2"/>
+              </a:buClr>
+            </a:pPr>
+            <a:r>
+              <a:rPr lang="es-SV" b="1" dirty="0">
+                <a:latin typeface="Arial" panose="020B0604020202020204" pitchFamily="34" charset="0"/>
+                <a:cs typeface="Arial" panose="020B0604020202020204" pitchFamily="34" charset="0"/>
+              </a:rPr>
+              <a:t>EJEMPLO DE USO DE GIT EN GITHUB</a:t>
+            </a:r>
+          </a:p>
+        </p:txBody>
+      </p:sp>
+      <p:sp>
+        <p:nvSpPr>
+          <p:cNvPr id="3" name="Marcador de contenido 2">
+            <a:extLst>
+              <a:ext uri="{FF2B5EF4-FFF2-40B4-BE49-F238E27FC236}">
+                <a16:creationId xmlns:a16="http://schemas.microsoft.com/office/drawing/2014/main" id="{A4165451-1C39-4628-BD84-AF243F580CF8}"/>
+              </a:ext>
+            </a:extLst>
+          </p:cNvPr>
+          <p:cNvSpPr>
+            <a:spLocks noGrp="1"/>
+          </p:cNvSpPr>
+          <p:nvPr>
+            <p:ph idx="1"/>
+          </p:nvPr>
+        </p:nvSpPr>
+        <p:spPr>
+          <a:xfrm>
+            <a:off x="293885" y="2676324"/>
+            <a:ext cx="4426258" cy="1254926"/>
+          </a:xfrm>
+        </p:spPr>
+        <p:txBody>
+          <a:bodyPr/>
+          <a:lstStyle/>
+          <a:p>
+            <a:r>
+              <a:rPr lang="es-SV" dirty="0"/>
+              <a:t>Creación de rama</a:t>
+            </a:r>
+          </a:p>
+        </p:txBody>
+      </p:sp>
+      <p:pic>
+        <p:nvPicPr>
+          <p:cNvPr id="5" name="Imagen 4">
+            <a:extLst>
+              <a:ext uri="{FF2B5EF4-FFF2-40B4-BE49-F238E27FC236}">
+                <a16:creationId xmlns:a16="http://schemas.microsoft.com/office/drawing/2014/main" id="{F4202DD0-15F3-4E3F-9C93-55808C824D7E}"/>
+              </a:ext>
+            </a:extLst>
+          </p:cNvPr>
+          <p:cNvPicPr>
+            <a:picLocks noChangeAspect="1"/>
+          </p:cNvPicPr>
+          <p:nvPr/>
+        </p:nvPicPr>
+        <p:blipFill>
+          <a:blip r:embed="rId2" cstate="print">
+            <a:extLst>
+              <a:ext uri="{28A0092B-C50C-407E-A947-70E740481C1C}">
+                <a14:useLocalDpi xmlns:a14="http://schemas.microsoft.com/office/drawing/2010/main" val="0"/>
+              </a:ext>
+            </a:extLst>
+          </a:blip>
+          <a:srcRect/>
+          <a:stretch/>
+        </p:blipFill>
+        <p:spPr>
+          <a:xfrm>
+            <a:off x="405753" y="3208117"/>
+            <a:ext cx="3621931" cy="2039824"/>
+          </a:xfrm>
+          <a:prstGeom prst="rect">
+            <a:avLst/>
+          </a:prstGeom>
+        </p:spPr>
+      </p:pic>
+      <p:sp>
+        <p:nvSpPr>
+          <p:cNvPr id="6" name="Marcador de contenido 2">
+            <a:extLst>
+              <a:ext uri="{FF2B5EF4-FFF2-40B4-BE49-F238E27FC236}">
+                <a16:creationId xmlns:a16="http://schemas.microsoft.com/office/drawing/2014/main" id="{43E41D64-3096-4B85-B18C-C12122ED0167}"/>
+              </a:ext>
+            </a:extLst>
+          </p:cNvPr>
+          <p:cNvSpPr txBox="1">
+            <a:spLocks/>
+          </p:cNvSpPr>
+          <p:nvPr/>
+        </p:nvSpPr>
+        <p:spPr>
+          <a:xfrm>
+            <a:off x="8113895" y="2676324"/>
+            <a:ext cx="4426258" cy="1254926"/>
+          </a:xfrm>
+          <a:prstGeom prst="rect">
+            <a:avLst/>
+          </a:prstGeom>
+        </p:spPr>
+        <p:txBody>
+          <a:bodyPr vert="horz" lIns="91440" tIns="45720" rIns="91440" bIns="45720" rtlCol="0">
+            <a:normAutofit/>
+          </a:bodyPr>
+          <a:lstStyle>
+            <a:lvl1pPr marL="228600" indent="-228600" algn="l" defTabSz="914400" rtl="0" eaLnBrk="1" latinLnBrk="0" hangingPunct="1">
+              <a:lnSpc>
+                <a:spcPct val="90000"/>
+              </a:lnSpc>
+              <a:spcBef>
+                <a:spcPts val="1000"/>
+              </a:spcBef>
+              <a:buFont typeface="Arial" panose="020B0604020202020204" pitchFamily="34" charset="0"/>
+              <a:buChar char="•"/>
+              <a:defRPr sz="2800" kern="1200">
+                <a:solidFill>
+                  <a:schemeClr val="tx1"/>
+                </a:solidFill>
+                <a:latin typeface="+mn-lt"/>
+                <a:ea typeface="+mn-ea"/>
+                <a:cs typeface="+mn-cs"/>
+              </a:defRPr>
+            </a:lvl1pPr>
+            <a:lvl2pPr marL="685800" indent="-228600" algn="l" defTabSz="914400" rtl="0" eaLnBrk="1" latinLnBrk="0" hangingPunct="1">
+              <a:lnSpc>
+                <a:spcPct val="90000"/>
+              </a:lnSpc>
+              <a:spcBef>
+                <a:spcPts val="500"/>
+              </a:spcBef>
+              <a:buFont typeface="Arial" panose="020B0604020202020204" pitchFamily="34" charset="0"/>
+              <a:buChar char="•"/>
+              <a:defRPr sz="2400" kern="1200">
+                <a:solidFill>
+                  <a:schemeClr val="tx1"/>
+                </a:solidFill>
+                <a:latin typeface="+mn-lt"/>
+                <a:ea typeface="+mn-ea"/>
+                <a:cs typeface="+mn-cs"/>
+              </a:defRPr>
+            </a:lvl2pPr>
+            <a:lvl3pPr marL="1143000" indent="-228600" algn="l" defTabSz="914400" rtl="0" eaLnBrk="1" latinLnBrk="0" hangingPunct="1">
+              <a:lnSpc>
+                <a:spcPct val="90000"/>
+              </a:lnSpc>
+              <a:spcBef>
+                <a:spcPts val="500"/>
+              </a:spcBef>
+              <a:buFont typeface="Arial" panose="020B0604020202020204" pitchFamily="34" charset="0"/>
+              <a:buChar char="•"/>
+              <a:defRPr sz="2000" kern="1200">
+                <a:solidFill>
+                  <a:schemeClr val="tx1"/>
+                </a:solidFill>
+                <a:latin typeface="+mn-lt"/>
+                <a:ea typeface="+mn-ea"/>
+                <a:cs typeface="+mn-cs"/>
+              </a:defRPr>
+            </a:lvl3pPr>
+            <a:lvl4pPr marL="1600200" indent="-228600" algn="l" defTabSz="914400" rtl="0" eaLnBrk="1" latinLnBrk="0" hangingPunct="1">
+              <a:lnSpc>
+                <a:spcPct val="90000"/>
+              </a:lnSpc>
+              <a:spcBef>
+                <a:spcPts val="500"/>
+              </a:spcBef>
+              <a:buFont typeface="Arial" panose="020B0604020202020204" pitchFamily="34" charset="0"/>
+              <a:buChar char="•"/>
+              <a:defRPr sz="1800" kern="1200">
+                <a:solidFill>
+                  <a:schemeClr val="tx1"/>
+                </a:solidFill>
+                <a:latin typeface="+mn-lt"/>
+                <a:ea typeface="+mn-ea"/>
+                <a:cs typeface="+mn-cs"/>
+              </a:defRPr>
+            </a:lvl4pPr>
+            <a:lvl5pPr marL="2057400" indent="-228600" algn="l" defTabSz="914400" rtl="0" eaLnBrk="1" latinLnBrk="0" hangingPunct="1">
+              <a:lnSpc>
+                <a:spcPct val="90000"/>
+              </a:lnSpc>
+              <a:spcBef>
+                <a:spcPts val="500"/>
+              </a:spcBef>
+              <a:buFont typeface="Arial" panose="020B0604020202020204" pitchFamily="34" charset="0"/>
+              <a:buChar char="•"/>
+              <a:defRPr sz="1800" kern="1200">
+                <a:solidFill>
+                  <a:schemeClr val="tx1"/>
+                </a:solidFill>
+                <a:latin typeface="+mn-lt"/>
+                <a:ea typeface="+mn-ea"/>
+                <a:cs typeface="+mn-cs"/>
+              </a:defRPr>
+            </a:lvl5pPr>
+            <a:lvl6pPr marL="2514600" indent="-228600" algn="l" defTabSz="914400" rtl="0" eaLnBrk="1" latinLnBrk="0" hangingPunct="1">
+              <a:lnSpc>
+                <a:spcPct val="90000"/>
+              </a:lnSpc>
+              <a:spcBef>
+                <a:spcPts val="500"/>
+              </a:spcBef>
+              <a:buFont typeface="Arial" panose="020B0604020202020204" pitchFamily="34" charset="0"/>
+              <a:buChar char="•"/>
+              <a:defRPr sz="1800" kern="1200">
+                <a:solidFill>
+                  <a:schemeClr val="tx1"/>
+                </a:solidFill>
+                <a:latin typeface="+mn-lt"/>
+                <a:ea typeface="+mn-ea"/>
+                <a:cs typeface="+mn-cs"/>
+              </a:defRPr>
+            </a:lvl6pPr>
+            <a:lvl7pPr marL="2971800" indent="-228600" algn="l" defTabSz="914400" rtl="0" eaLnBrk="1" latinLnBrk="0" hangingPunct="1">
+              <a:lnSpc>
+                <a:spcPct val="90000"/>
+              </a:lnSpc>
+              <a:spcBef>
+                <a:spcPts val="500"/>
+              </a:spcBef>
+              <a:buFont typeface="Arial" panose="020B0604020202020204" pitchFamily="34" charset="0"/>
+              <a:buChar char="•"/>
+              <a:defRPr sz="1800" kern="1200">
+                <a:solidFill>
+                  <a:schemeClr val="tx1"/>
+                </a:solidFill>
+                <a:latin typeface="+mn-lt"/>
+                <a:ea typeface="+mn-ea"/>
+                <a:cs typeface="+mn-cs"/>
+              </a:defRPr>
+            </a:lvl7pPr>
+            <a:lvl8pPr marL="3429000" indent="-228600" algn="l" defTabSz="914400" rtl="0" eaLnBrk="1" latinLnBrk="0" hangingPunct="1">
+              <a:lnSpc>
+                <a:spcPct val="90000"/>
+              </a:lnSpc>
+              <a:spcBef>
+                <a:spcPts val="500"/>
+              </a:spcBef>
+              <a:buFont typeface="Arial" panose="020B0604020202020204" pitchFamily="34" charset="0"/>
+              <a:buChar char="•"/>
+              <a:defRPr sz="1800" kern="1200">
+                <a:solidFill>
+                  <a:schemeClr val="tx1"/>
+                </a:solidFill>
+                <a:latin typeface="+mn-lt"/>
+                <a:ea typeface="+mn-ea"/>
+                <a:cs typeface="+mn-cs"/>
+              </a:defRPr>
+            </a:lvl8pPr>
+            <a:lvl9pPr marL="3886200" indent="-228600" algn="l" defTabSz="914400" rtl="0" eaLnBrk="1" latinLnBrk="0" hangingPunct="1">
+              <a:lnSpc>
+                <a:spcPct val="90000"/>
+              </a:lnSpc>
+              <a:spcBef>
+                <a:spcPts val="500"/>
+              </a:spcBef>
+              <a:buFont typeface="Arial" panose="020B0604020202020204" pitchFamily="34" charset="0"/>
+              <a:buChar char="•"/>
+              <a:defRPr sz="1800" kern="1200">
+                <a:solidFill>
+                  <a:schemeClr val="tx1"/>
+                </a:solidFill>
+                <a:latin typeface="+mn-lt"/>
+                <a:ea typeface="+mn-ea"/>
+                <a:cs typeface="+mn-cs"/>
+              </a:defRPr>
+            </a:lvl9pPr>
+          </a:lstStyle>
+          <a:p>
+            <a:r>
+              <a:rPr lang="es-SV" dirty="0"/>
+              <a:t>Eliminación de rama</a:t>
+            </a:r>
+          </a:p>
+        </p:txBody>
+      </p:sp>
+      <p:pic>
+        <p:nvPicPr>
+          <p:cNvPr id="7" name="Imagen 6">
+            <a:extLst>
+              <a:ext uri="{FF2B5EF4-FFF2-40B4-BE49-F238E27FC236}">
+                <a16:creationId xmlns:a16="http://schemas.microsoft.com/office/drawing/2014/main" id="{FADC0FA3-2A76-4B4D-8AA3-71CDC34FFF9F}"/>
+              </a:ext>
+            </a:extLst>
+          </p:cNvPr>
+          <p:cNvPicPr>
+            <a:picLocks noChangeAspect="1"/>
+          </p:cNvPicPr>
+          <p:nvPr/>
+        </p:nvPicPr>
+        <p:blipFill>
+          <a:blip r:embed="rId3" cstate="print">
+            <a:extLst>
+              <a:ext uri="{28A0092B-C50C-407E-A947-70E740481C1C}">
+                <a14:useLocalDpi xmlns:a14="http://schemas.microsoft.com/office/drawing/2010/main" val="0"/>
+              </a:ext>
+            </a:extLst>
+          </a:blip>
+          <a:srcRect/>
+          <a:stretch/>
+        </p:blipFill>
+        <p:spPr>
+          <a:xfrm>
+            <a:off x="8183531" y="3266982"/>
+            <a:ext cx="3517410" cy="1980959"/>
+          </a:xfrm>
+          <a:prstGeom prst="rect">
+            <a:avLst/>
+          </a:prstGeom>
+        </p:spPr>
+      </p:pic>
+      <p:sp>
+        <p:nvSpPr>
+          <p:cNvPr id="8" name="Marcador de contenido 2">
+            <a:extLst>
+              <a:ext uri="{FF2B5EF4-FFF2-40B4-BE49-F238E27FC236}">
+                <a16:creationId xmlns:a16="http://schemas.microsoft.com/office/drawing/2014/main" id="{D3EB0FEC-D8B5-4946-9D52-649F9EEF2273}"/>
+              </a:ext>
+            </a:extLst>
+          </p:cNvPr>
+          <p:cNvSpPr txBox="1">
+            <a:spLocks/>
+          </p:cNvSpPr>
+          <p:nvPr/>
+        </p:nvSpPr>
+        <p:spPr>
+          <a:xfrm>
+            <a:off x="4097320" y="2676324"/>
+            <a:ext cx="4426258" cy="1254926"/>
+          </a:xfrm>
+          <a:prstGeom prst="rect">
+            <a:avLst/>
+          </a:prstGeom>
+        </p:spPr>
+        <p:txBody>
+          <a:bodyPr vert="horz" lIns="91440" tIns="45720" rIns="91440" bIns="45720" rtlCol="0">
+            <a:normAutofit/>
+          </a:bodyPr>
+          <a:lstStyle>
+            <a:lvl1pPr marL="228600" indent="-228600" algn="l" defTabSz="914400" rtl="0" eaLnBrk="1" latinLnBrk="0" hangingPunct="1">
+              <a:lnSpc>
+                <a:spcPct val="90000"/>
+              </a:lnSpc>
+              <a:spcBef>
+                <a:spcPts val="1000"/>
+              </a:spcBef>
+              <a:buFont typeface="Arial" panose="020B0604020202020204" pitchFamily="34" charset="0"/>
+              <a:buChar char="•"/>
+              <a:defRPr sz="2800" kern="1200">
+                <a:solidFill>
+                  <a:schemeClr val="tx1"/>
+                </a:solidFill>
+                <a:latin typeface="+mn-lt"/>
+                <a:ea typeface="+mn-ea"/>
+                <a:cs typeface="+mn-cs"/>
+              </a:defRPr>
+            </a:lvl1pPr>
+            <a:lvl2pPr marL="685800" indent="-228600" algn="l" defTabSz="914400" rtl="0" eaLnBrk="1" latinLnBrk="0" hangingPunct="1">
+              <a:lnSpc>
+                <a:spcPct val="90000"/>
+              </a:lnSpc>
+              <a:spcBef>
+                <a:spcPts val="500"/>
+              </a:spcBef>
+              <a:buFont typeface="Arial" panose="020B0604020202020204" pitchFamily="34" charset="0"/>
+              <a:buChar char="•"/>
+              <a:defRPr sz="2400" kern="1200">
+                <a:solidFill>
+                  <a:schemeClr val="tx1"/>
+                </a:solidFill>
+                <a:latin typeface="+mn-lt"/>
+                <a:ea typeface="+mn-ea"/>
+                <a:cs typeface="+mn-cs"/>
+              </a:defRPr>
+            </a:lvl2pPr>
+            <a:lvl3pPr marL="1143000" indent="-228600" algn="l" defTabSz="914400" rtl="0" eaLnBrk="1" latinLnBrk="0" hangingPunct="1">
+              <a:lnSpc>
+                <a:spcPct val="90000"/>
+              </a:lnSpc>
+              <a:spcBef>
+                <a:spcPts val="500"/>
+              </a:spcBef>
+              <a:buFont typeface="Arial" panose="020B0604020202020204" pitchFamily="34" charset="0"/>
+              <a:buChar char="•"/>
+              <a:defRPr sz="2000" kern="1200">
+                <a:solidFill>
+                  <a:schemeClr val="tx1"/>
+                </a:solidFill>
+                <a:latin typeface="+mn-lt"/>
+                <a:ea typeface="+mn-ea"/>
+                <a:cs typeface="+mn-cs"/>
+              </a:defRPr>
+            </a:lvl3pPr>
+            <a:lvl4pPr marL="1600200" indent="-228600" algn="l" defTabSz="914400" rtl="0" eaLnBrk="1" latinLnBrk="0" hangingPunct="1">
+              <a:lnSpc>
+                <a:spcPct val="90000"/>
+              </a:lnSpc>
+              <a:spcBef>
+                <a:spcPts val="500"/>
+              </a:spcBef>
+              <a:buFont typeface="Arial" panose="020B0604020202020204" pitchFamily="34" charset="0"/>
+              <a:buChar char="•"/>
+              <a:defRPr sz="1800" kern="1200">
+                <a:solidFill>
+                  <a:schemeClr val="tx1"/>
+                </a:solidFill>
+                <a:latin typeface="+mn-lt"/>
+                <a:ea typeface="+mn-ea"/>
+                <a:cs typeface="+mn-cs"/>
+              </a:defRPr>
+            </a:lvl4pPr>
+            <a:lvl5pPr marL="2057400" indent="-228600" algn="l" defTabSz="914400" rtl="0" eaLnBrk="1" latinLnBrk="0" hangingPunct="1">
+              <a:lnSpc>
+                <a:spcPct val="90000"/>
+              </a:lnSpc>
+              <a:spcBef>
+                <a:spcPts val="500"/>
+              </a:spcBef>
+              <a:buFont typeface="Arial" panose="020B0604020202020204" pitchFamily="34" charset="0"/>
+              <a:buChar char="•"/>
+              <a:defRPr sz="1800" kern="1200">
+                <a:solidFill>
+                  <a:schemeClr val="tx1"/>
+                </a:solidFill>
+                <a:latin typeface="+mn-lt"/>
+                <a:ea typeface="+mn-ea"/>
+                <a:cs typeface="+mn-cs"/>
+              </a:defRPr>
+            </a:lvl5pPr>
+            <a:lvl6pPr marL="2514600" indent="-228600" algn="l" defTabSz="914400" rtl="0" eaLnBrk="1" latinLnBrk="0" hangingPunct="1">
+              <a:lnSpc>
+                <a:spcPct val="90000"/>
+              </a:lnSpc>
+              <a:spcBef>
+                <a:spcPts val="500"/>
+              </a:spcBef>
+              <a:buFont typeface="Arial" panose="020B0604020202020204" pitchFamily="34" charset="0"/>
+              <a:buChar char="•"/>
+              <a:defRPr sz="1800" kern="1200">
+                <a:solidFill>
+                  <a:schemeClr val="tx1"/>
+                </a:solidFill>
+                <a:latin typeface="+mn-lt"/>
+                <a:ea typeface="+mn-ea"/>
+                <a:cs typeface="+mn-cs"/>
+              </a:defRPr>
+            </a:lvl6pPr>
+            <a:lvl7pPr marL="2971800" indent="-228600" algn="l" defTabSz="914400" rtl="0" eaLnBrk="1" latinLnBrk="0" hangingPunct="1">
+              <a:lnSpc>
+                <a:spcPct val="90000"/>
+              </a:lnSpc>
+              <a:spcBef>
+                <a:spcPts val="500"/>
+              </a:spcBef>
+              <a:buFont typeface="Arial" panose="020B0604020202020204" pitchFamily="34" charset="0"/>
+              <a:buChar char="•"/>
+              <a:defRPr sz="1800" kern="1200">
+                <a:solidFill>
+                  <a:schemeClr val="tx1"/>
+                </a:solidFill>
+                <a:latin typeface="+mn-lt"/>
+                <a:ea typeface="+mn-ea"/>
+                <a:cs typeface="+mn-cs"/>
+              </a:defRPr>
+            </a:lvl7pPr>
+            <a:lvl8pPr marL="3429000" indent="-228600" algn="l" defTabSz="914400" rtl="0" eaLnBrk="1" latinLnBrk="0" hangingPunct="1">
+              <a:lnSpc>
+                <a:spcPct val="90000"/>
+              </a:lnSpc>
+              <a:spcBef>
+                <a:spcPts val="500"/>
+              </a:spcBef>
+              <a:buFont typeface="Arial" panose="020B0604020202020204" pitchFamily="34" charset="0"/>
+              <a:buChar char="•"/>
+              <a:defRPr sz="1800" kern="1200">
+                <a:solidFill>
+                  <a:schemeClr val="tx1"/>
+                </a:solidFill>
+                <a:latin typeface="+mn-lt"/>
+                <a:ea typeface="+mn-ea"/>
+                <a:cs typeface="+mn-cs"/>
+              </a:defRPr>
+            </a:lvl8pPr>
+            <a:lvl9pPr marL="3886200" indent="-228600" algn="l" defTabSz="914400" rtl="0" eaLnBrk="1" latinLnBrk="0" hangingPunct="1">
+              <a:lnSpc>
+                <a:spcPct val="90000"/>
+              </a:lnSpc>
+              <a:spcBef>
+                <a:spcPts val="500"/>
+              </a:spcBef>
+              <a:buFont typeface="Arial" panose="020B0604020202020204" pitchFamily="34" charset="0"/>
+              <a:buChar char="•"/>
+              <a:defRPr sz="1800" kern="1200">
+                <a:solidFill>
+                  <a:schemeClr val="tx1"/>
+                </a:solidFill>
+                <a:latin typeface="+mn-lt"/>
+                <a:ea typeface="+mn-ea"/>
+                <a:cs typeface="+mn-cs"/>
+              </a:defRPr>
+            </a:lvl9pPr>
+          </a:lstStyle>
+          <a:p>
+            <a:r>
+              <a:rPr lang="es-SV" dirty="0"/>
+              <a:t>Combinación de ramas</a:t>
+            </a:r>
+          </a:p>
+        </p:txBody>
+      </p:sp>
+      <p:pic>
+        <p:nvPicPr>
+          <p:cNvPr id="9" name="Imagen 8">
+            <a:extLst>
+              <a:ext uri="{FF2B5EF4-FFF2-40B4-BE49-F238E27FC236}">
+                <a16:creationId xmlns:a16="http://schemas.microsoft.com/office/drawing/2014/main" id="{068C64EC-2FC3-4346-91D2-8E6E1B461700}"/>
+              </a:ext>
+            </a:extLst>
+          </p:cNvPr>
+          <p:cNvPicPr>
+            <a:picLocks noChangeAspect="1"/>
+          </p:cNvPicPr>
+          <p:nvPr/>
+        </p:nvPicPr>
+        <p:blipFill>
+          <a:blip r:embed="rId4" cstate="print">
+            <a:extLst>
+              <a:ext uri="{28A0092B-C50C-407E-A947-70E740481C1C}">
+                <a14:useLocalDpi xmlns:a14="http://schemas.microsoft.com/office/drawing/2010/main" val="0"/>
+              </a:ext>
+            </a:extLst>
+          </a:blip>
+          <a:srcRect/>
+          <a:stretch/>
+        </p:blipFill>
+        <p:spPr>
+          <a:xfrm>
+            <a:off x="4310461" y="3250485"/>
+            <a:ext cx="3590293" cy="2022006"/>
+          </a:xfrm>
+          <a:prstGeom prst="rect">
+            <a:avLst/>
+          </a:prstGeom>
+        </p:spPr>
+      </p:pic>
+    </p:spTree>
+    <p:extLst>
+      <p:ext uri="{BB962C8B-B14F-4D97-AF65-F5344CB8AC3E}">
+        <p14:creationId xmlns:p14="http://schemas.microsoft.com/office/powerpoint/2010/main" val="924143443"/>
+      </p:ext>
+    </p:extLst>
+  </p:cSld>
+  <p:clrMapOvr>
+    <a:masterClrMapping/>
+  </p:clrMapOvr>
+</p:sld>
+</file>
+
+<file path=ppt/slides/slide26.xml><?xml version="1.0" encoding="utf-8"?>
+<p:sld xmlns:a="http://schemas.openxmlformats.org/drawingml/2006/main" xmlns:r="http://schemas.openxmlformats.org/officeDocument/2006/relationships" xmlns:p="http://schemas.openxmlformats.org/presentationml/2006/main">
+  <p:cSld>
+    <p:spTree>
+      <p:nvGrpSpPr>
+        <p:cNvPr id="1" name=""/>
+        <p:cNvGrpSpPr/>
+        <p:nvPr/>
+      </p:nvGrpSpPr>
+      <p:grpSpPr>
+        <a:xfrm>
+          <a:off x="0" y="0"/>
+          <a:ext cx="0" cy="0"/>
+          <a:chOff x="0" y="0"/>
+          <a:chExt cx="0" cy="0"/>
+        </a:xfrm>
+      </p:grpSpPr>
+      <p:sp>
+        <p:nvSpPr>
+          <p:cNvPr id="4" name="CuadroTexto 3"/>
+          <p:cNvSpPr txBox="1"/>
+          <p:nvPr/>
+        </p:nvSpPr>
+        <p:spPr>
+          <a:xfrm>
+            <a:off x="2135560" y="836713"/>
+            <a:ext cx="8136904" cy="830997"/>
+          </a:xfrm>
+          <a:prstGeom prst="rect">
+            <a:avLst/>
+          </a:prstGeom>
+          <a:noFill/>
+        </p:spPr>
+        <p:txBody>
+          <a:bodyPr wrap="square" rtlCol="0">
+            <a:spAutoFit/>
+          </a:bodyPr>
+          <a:lstStyle/>
+          <a:p>
+            <a:pPr algn="ctr"/>
+            <a:r>
+              <a:rPr lang="es-SV" sz="4800" b="1" dirty="0">
+                <a:latin typeface="Arial" panose="020B0604020202020204" pitchFamily="34" charset="0"/>
+                <a:cs typeface="Arial" panose="020B0604020202020204" pitchFamily="34" charset="0"/>
+              </a:rPr>
+              <a:t>Agenda</a:t>
+            </a:r>
+          </a:p>
+        </p:txBody>
+      </p:sp>
+      <p:sp>
+        <p:nvSpPr>
+          <p:cNvPr id="7" name="Rectángulo 6"/>
+          <p:cNvSpPr/>
+          <p:nvPr/>
+        </p:nvSpPr>
+        <p:spPr>
+          <a:xfrm>
+            <a:off x="2351584" y="1988840"/>
+            <a:ext cx="8208912" cy="4103688"/>
+          </a:xfrm>
+          <a:prstGeom prst="rect">
+            <a:avLst/>
+          </a:prstGeom>
+        </p:spPr>
+        <p:txBody>
+          <a:bodyPr wrap="square">
+            <a:spAutoFit/>
+          </a:bodyPr>
+          <a:lstStyle/>
+          <a:p>
+            <a:pPr marL="342900" indent="-342900" algn="just">
+              <a:lnSpc>
+                <a:spcPct val="150000"/>
+              </a:lnSpc>
+              <a:buFont typeface="Symbol" panose="05050102010706020507" pitchFamily="18" charset="2"/>
+              <a:buChar char=""/>
+            </a:pPr>
+            <a:r>
+              <a:rPr lang="es-SV" dirty="0">
+                <a:solidFill>
+                  <a:schemeClr val="bg1">
+                    <a:lumMod val="65000"/>
+                  </a:schemeClr>
+                </a:solidFill>
+                <a:latin typeface="Arial" panose="020B0604020202020204" pitchFamily="34" charset="0"/>
+                <a:cs typeface="Arial" panose="020B0604020202020204" pitchFamily="34" charset="0"/>
+              </a:rPr>
+              <a:t>Definición y Características de los Sistemas de control de versiones</a:t>
+            </a:r>
+          </a:p>
+          <a:p>
+            <a:pPr marL="342900" indent="-342900" algn="just">
+              <a:lnSpc>
+                <a:spcPct val="150000"/>
+              </a:lnSpc>
+              <a:buFont typeface="Symbol" panose="05050102010706020507" pitchFamily="18" charset="2"/>
+              <a:buChar char=""/>
+            </a:pPr>
+            <a:r>
+              <a:rPr lang="es-SV" dirty="0">
+                <a:solidFill>
+                  <a:schemeClr val="bg1">
+                    <a:lumMod val="65000"/>
+                  </a:schemeClr>
+                </a:solidFill>
+                <a:latin typeface="Arial" panose="020B0604020202020204" pitchFamily="34" charset="0"/>
+                <a:cs typeface="Arial" panose="020B0604020202020204" pitchFamily="34" charset="0"/>
+              </a:rPr>
+              <a:t>Clasificación y Ejemplos de Sistemas de Control de Versiones</a:t>
+            </a:r>
+          </a:p>
+          <a:p>
+            <a:pPr marL="342900" indent="-342900" algn="just">
+              <a:lnSpc>
+                <a:spcPct val="150000"/>
+              </a:lnSpc>
+              <a:buFont typeface="Symbol" panose="05050102010706020507" pitchFamily="18" charset="2"/>
+              <a:buChar char=""/>
+            </a:pPr>
+            <a:r>
+              <a:rPr lang="es-SV" dirty="0">
+                <a:solidFill>
+                  <a:schemeClr val="bg1">
+                    <a:lumMod val="65000"/>
+                  </a:schemeClr>
+                </a:solidFill>
+                <a:latin typeface="Arial" panose="020B0604020202020204" pitchFamily="34" charset="0"/>
+                <a:cs typeface="Arial" panose="020B0604020202020204" pitchFamily="34" charset="0"/>
+              </a:rPr>
+              <a:t>Ventajas y Desventajas de los Sistemas de Control de Versiones</a:t>
+            </a:r>
+          </a:p>
+          <a:p>
+            <a:pPr marL="342900" indent="-342900" algn="just">
+              <a:lnSpc>
+                <a:spcPct val="150000"/>
+              </a:lnSpc>
+              <a:buFont typeface="Symbol" panose="05050102010706020507" pitchFamily="18" charset="2"/>
+              <a:buChar char=""/>
+            </a:pPr>
+            <a:r>
+              <a:rPr lang="es-SV" dirty="0">
+                <a:solidFill>
+                  <a:schemeClr val="bg1">
+                    <a:lumMod val="65000"/>
+                  </a:schemeClr>
+                </a:solidFill>
+                <a:latin typeface="Arial" panose="020B0604020202020204" pitchFamily="34" charset="0"/>
+                <a:ea typeface="Calibri" panose="020F0502020204030204" pitchFamily="34" charset="0"/>
+                <a:cs typeface="Arial" panose="020B0604020202020204" pitchFamily="34" charset="0"/>
+              </a:rPr>
+              <a:t>Resumen</a:t>
+            </a:r>
+          </a:p>
+          <a:p>
+            <a:pPr marL="342900" indent="-342900" algn="just">
+              <a:lnSpc>
+                <a:spcPct val="150000"/>
+              </a:lnSpc>
+              <a:spcAft>
+                <a:spcPts val="800"/>
+              </a:spcAft>
+              <a:buFont typeface="Symbol" panose="05050102010706020507" pitchFamily="18" charset="2"/>
+              <a:buChar char=""/>
+            </a:pPr>
+            <a:r>
+              <a:rPr lang="es-SV" dirty="0">
+                <a:solidFill>
+                  <a:schemeClr val="bg1">
+                    <a:lumMod val="65000"/>
+                  </a:schemeClr>
+                </a:solidFill>
+                <a:latin typeface="Arial" panose="020B0604020202020204" pitchFamily="34" charset="0"/>
+                <a:cs typeface="Arial" panose="020B0604020202020204" pitchFamily="34" charset="0"/>
+              </a:rPr>
+              <a:t>Cuadro Comparativo </a:t>
+            </a:r>
+          </a:p>
+          <a:p>
+            <a:pPr marL="342900" indent="-342900" algn="just">
+              <a:lnSpc>
+                <a:spcPct val="150000"/>
+              </a:lnSpc>
+              <a:spcAft>
+                <a:spcPts val="800"/>
+              </a:spcAft>
+              <a:buFont typeface="Symbol" panose="05050102010706020507" pitchFamily="18" charset="2"/>
+              <a:buChar char=""/>
+            </a:pPr>
+            <a:r>
+              <a:rPr lang="es-SV" dirty="0">
+                <a:solidFill>
+                  <a:schemeClr val="bg1">
+                    <a:lumMod val="65000"/>
+                  </a:schemeClr>
+                </a:solidFill>
+                <a:latin typeface="Arial" panose="020B0604020202020204" pitchFamily="34" charset="0"/>
+                <a:cs typeface="Arial" panose="020B0604020202020204" pitchFamily="34" charset="0"/>
+              </a:rPr>
+              <a:t>GITHUB VS GITLAB</a:t>
+            </a:r>
+          </a:p>
+          <a:p>
+            <a:pPr marL="342900" indent="-342900" algn="just">
+              <a:lnSpc>
+                <a:spcPct val="150000"/>
+              </a:lnSpc>
+              <a:spcAft>
+                <a:spcPts val="800"/>
+              </a:spcAft>
+              <a:buFont typeface="Symbol" panose="05050102010706020507" pitchFamily="18" charset="2"/>
+              <a:buChar char=""/>
+            </a:pPr>
+            <a:r>
+              <a:rPr lang="es-SV" dirty="0">
+                <a:solidFill>
+                  <a:srgbClr val="A6A6A6"/>
+                </a:solidFill>
+                <a:latin typeface="Arial" panose="020B0604020202020204" pitchFamily="34" charset="0"/>
+                <a:cs typeface="Arial" panose="020B0604020202020204" pitchFamily="34" charset="0"/>
+              </a:rPr>
+              <a:t>Ejemplo de uso de Git en GITHUB</a:t>
             </a:r>
           </a:p>
           <a:p>
@@ -8150,17 +10360,10 @@
   <p:clrMapOvr>
     <a:masterClrMapping/>
   </p:clrMapOvr>
-  <p:timing>
-    <p:tnLst>
-      <p:par>
-        <p:cTn id="1" dur="indefinite" restart="never" nodeType="tmRoot"/>
-      </p:par>
-    </p:tnLst>
-  </p:timing>
 </p:sld>
 </file>
 
-<file path=ppt/slides/slide23.xml><?xml version="1.0" encoding="utf-8"?>
+<file path=ppt/slides/slide27.xml><?xml version="1.0" encoding="utf-8"?>
 <p:sld xmlns:a="http://schemas.openxmlformats.org/drawingml/2006/main" xmlns:r="http://schemas.openxmlformats.org/officeDocument/2006/relationships" xmlns:p="http://schemas.openxmlformats.org/presentationml/2006/main">
   <p:cSld>
     <p:spTree>
@@ -8330,13 +10533,6 @@
   <p:clrMapOvr>
     <a:masterClrMapping/>
   </p:clrMapOvr>
-  <p:timing>
-    <p:tnLst>
-      <p:par>
-        <p:cTn id="1" dur="indefinite" restart="never" nodeType="tmRoot"/>
-      </p:par>
-    </p:tnLst>
-  </p:timing>
 </p:sld>
 </file>
 
@@ -8555,13 +10751,6 @@
   <p:clrMapOvr>
     <a:masterClrMapping/>
   </p:clrMapOvr>
-  <p:timing>
-    <p:tnLst>
-      <p:par>
-        <p:cTn id="1" dur="indefinite" restart="never" nodeType="tmRoot"/>
-      </p:par>
-    </p:tnLst>
-  </p:timing>
 </p:sld>
 </file>
 
@@ -8624,7 +10813,7 @@
         <p:spPr>
           <a:xfrm>
             <a:off x="2351584" y="1988840"/>
-            <a:ext cx="8208912" cy="3585597"/>
+            <a:ext cx="8208912" cy="4103688"/>
           </a:xfrm>
           <a:prstGeom prst="rect">
             <a:avLst/>
@@ -8765,6 +10954,37 @@
               </a:rPr>
               <a:t>GITHUB VS GITLAB</a:t>
             </a:r>
+          </a:p>
+          <a:p>
+            <a:pPr marL="342900" indent="-342900" algn="just">
+              <a:lnSpc>
+                <a:spcPct val="150000"/>
+              </a:lnSpc>
+              <a:spcAft>
+                <a:spcPts val="800"/>
+              </a:spcAft>
+              <a:buFont typeface="Symbol" panose="05050102010706020507" pitchFamily="18" charset="2"/>
+              <a:buChar char=""/>
+            </a:pPr>
+            <a:r>
+              <a:rPr lang="es-SV" dirty="0">
+                <a:solidFill>
+                  <a:srgbClr val="A6A6A6"/>
+                </a:solidFill>
+                <a:latin typeface="Arial" panose="020B0604020202020204" pitchFamily="34" charset="0"/>
+                <a:cs typeface="Arial" panose="020B0604020202020204" pitchFamily="34" charset="0"/>
+              </a:rPr>
+              <a:t>Ejemplo de uso de Git en GITHUB</a:t>
+            </a:r>
+            <a:endParaRPr lang="es-SV" dirty="0">
+              <a:solidFill>
+                <a:schemeClr val="bg1">
+                  <a:lumMod val="65000"/>
+                </a:schemeClr>
+              </a:solidFill>
+              <a:latin typeface="Arial" panose="020B0604020202020204" pitchFamily="34" charset="0"/>
+              <a:cs typeface="Arial" panose="020B0604020202020204" pitchFamily="34" charset="0"/>
+            </a:endParaRPr>
           </a:p>
           <a:p>
             <a:pPr marL="342900" indent="-342900" algn="just">
@@ -8813,13 +11033,6 @@
   <p:clrMapOvr>
     <a:masterClrMapping/>
   </p:clrMapOvr>
-  <p:timing>
-    <p:tnLst>
-      <p:par>
-        <p:cTn id="1" dur="indefinite" restart="never" nodeType="tmRoot"/>
-      </p:par>
-    </p:tnLst>
-  </p:timing>
 </p:sld>
 </file>
 
@@ -8859,14 +11072,11 @@
           <a:p>
             <a:pPr algn="ctr"/>
             <a:r>
-              <a:rPr lang="es-SV" sz="4800" b="1" dirty="0" smtClean="0">
+              <a:rPr lang="es-SV" sz="4800" b="1" dirty="0">
                 <a:latin typeface="+mn-lt"/>
               </a:rPr>
               <a:t>Definición y Características</a:t>
             </a:r>
-            <a:endParaRPr lang="es-SV" sz="4800" b="1" dirty="0">
-              <a:latin typeface="+mn-lt"/>
-            </a:endParaRPr>
           </a:p>
         </p:txBody>
       </p:sp>
@@ -8897,21 +11107,7 @@
                 <a:latin typeface="Times New Roman" panose="02020603050405020304" pitchFamily="18" charset="0"/>
                 <a:ea typeface="Calibri" panose="020F0502020204030204" pitchFamily="34" charset="0"/>
               </a:rPr>
-              <a:t> </a:t>
-            </a:r>
-            <a:r>
-              <a:rPr lang="es-SV" sz="2200" dirty="0" smtClean="0">
-                <a:latin typeface="Times New Roman" panose="02020603050405020304" pitchFamily="18" charset="0"/>
-                <a:ea typeface="Calibri" panose="020F0502020204030204" pitchFamily="34" charset="0"/>
-              </a:rPr>
-              <a:t>   El </a:t>
-            </a:r>
-            <a:r>
-              <a:rPr lang="es-SV" sz="2200" dirty="0">
-                <a:latin typeface="Times New Roman" panose="02020603050405020304" pitchFamily="18" charset="0"/>
-                <a:ea typeface="Calibri" panose="020F0502020204030204" pitchFamily="34" charset="0"/>
-              </a:rPr>
-              <a:t>control de versiones es un sistema que registra los cambios realizados sobre un archivo o conjunto de archivos a lo largo del tiempo de tal manera que sea posible recuperar versiones especificas más adelante</a:t>
+              <a:t>    El control de versiones es un sistema que registra los cambios realizados sobre un archivo o conjunto de archivos a lo largo del tiempo de tal manera que sea posible recuperar versiones especificas más adelante</a:t>
             </a:r>
             <a:endParaRPr lang="es-SV" sz="2200" dirty="0"/>
           </a:p>
@@ -9012,15 +11208,7 @@
                 <a:ea typeface="Calibri" panose="020F0502020204030204" pitchFamily="34" charset="0"/>
                 <a:cs typeface="Times New Roman" panose="02020603050405020304" pitchFamily="18" charset="0"/>
               </a:rPr>
-              <a:t>Mecanismo de almacenamiento de los elementos que deba </a:t>
-            </a:r>
-            <a:r>
-              <a:rPr lang="es-SV" sz="2200" dirty="0" smtClean="0">
-                <a:latin typeface="Times New Roman" panose="02020603050405020304" pitchFamily="18" charset="0"/>
-                <a:ea typeface="Calibri" panose="020F0502020204030204" pitchFamily="34" charset="0"/>
-                <a:cs typeface="Times New Roman" panose="02020603050405020304" pitchFamily="18" charset="0"/>
-              </a:rPr>
-              <a:t>gestionar.</a:t>
+              <a:t>Mecanismo de almacenamiento de los elementos que deba gestionar.</a:t>
             </a:r>
           </a:p>
           <a:p>
@@ -9035,28 +11223,12 @@
               <a:buChar char=""/>
             </a:pPr>
             <a:r>
-              <a:rPr lang="es-SV" sz="2200" dirty="0" smtClean="0">
-                <a:latin typeface="Times New Roman" panose="02020603050405020304" pitchFamily="18" charset="0"/>
-                <a:ea typeface="Calibri" panose="020F0502020204030204" pitchFamily="34" charset="0"/>
-                <a:cs typeface="Times New Roman" panose="02020603050405020304" pitchFamily="18" charset="0"/>
-              </a:rPr>
-              <a:t>Posibilidad </a:t>
-            </a:r>
-            <a:r>
               <a:rPr lang="es-SV" sz="2200" dirty="0">
                 <a:latin typeface="Times New Roman" panose="02020603050405020304" pitchFamily="18" charset="0"/>
                 <a:ea typeface="Calibri" panose="020F0502020204030204" pitchFamily="34" charset="0"/>
                 <a:cs typeface="Times New Roman" panose="02020603050405020304" pitchFamily="18" charset="0"/>
               </a:rPr>
-              <a:t>de realizar cambios sobre los elementos </a:t>
-            </a:r>
-            <a:r>
-              <a:rPr lang="es-SV" sz="2200" dirty="0" smtClean="0">
-                <a:latin typeface="Times New Roman" panose="02020603050405020304" pitchFamily="18" charset="0"/>
-                <a:ea typeface="Calibri" panose="020F0502020204030204" pitchFamily="34" charset="0"/>
-                <a:cs typeface="Times New Roman" panose="02020603050405020304" pitchFamily="18" charset="0"/>
-              </a:rPr>
-              <a:t>almacenados.</a:t>
+              <a:t>Posibilidad de realizar cambios sobre los elementos almacenados.</a:t>
             </a:r>
           </a:p>
           <a:p>
@@ -9071,42 +11243,21 @@
               <a:buChar char=""/>
             </a:pPr>
             <a:r>
-              <a:rPr lang="es-SV" sz="2200" dirty="0" smtClean="0">
-                <a:latin typeface="Times New Roman" panose="02020603050405020304" pitchFamily="18" charset="0"/>
-                <a:ea typeface="Calibri" panose="020F0502020204030204" pitchFamily="34" charset="0"/>
-                <a:cs typeface="Times New Roman" panose="02020603050405020304" pitchFamily="18" charset="0"/>
-              </a:rPr>
-              <a:t>Registro </a:t>
-            </a:r>
-            <a:r>
               <a:rPr lang="es-SV" sz="2200" dirty="0">
                 <a:latin typeface="Times New Roman" panose="02020603050405020304" pitchFamily="18" charset="0"/>
                 <a:ea typeface="Calibri" panose="020F0502020204030204" pitchFamily="34" charset="0"/>
                 <a:cs typeface="Times New Roman" panose="02020603050405020304" pitchFamily="18" charset="0"/>
               </a:rPr>
-              <a:t>histórico de las acciones realizadas con cada elemento o conjunto de </a:t>
-            </a:r>
-            <a:r>
-              <a:rPr lang="es-SV" sz="2200" dirty="0" smtClean="0">
+              <a:t>Registro histórico de las acciones realizadas con cada elemento o conjunto de elementos</a:t>
+            </a:r>
+            <a:r>
+              <a:rPr lang="es-SV" dirty="0">
                 <a:latin typeface="Times New Roman" panose="02020603050405020304" pitchFamily="18" charset="0"/>
                 <a:ea typeface="Calibri" panose="020F0502020204030204" pitchFamily="34" charset="0"/>
                 <a:cs typeface="Times New Roman" panose="02020603050405020304" pitchFamily="18" charset="0"/>
               </a:rPr>
-              <a:t>elementos</a:t>
-            </a:r>
-            <a:r>
-              <a:rPr lang="es-SV" dirty="0" smtClean="0">
-                <a:latin typeface="Times New Roman" panose="02020603050405020304" pitchFamily="18" charset="0"/>
-                <a:ea typeface="Calibri" panose="020F0502020204030204" pitchFamily="34" charset="0"/>
-                <a:cs typeface="Times New Roman" panose="02020603050405020304" pitchFamily="18" charset="0"/>
-              </a:rPr>
               <a:t>.</a:t>
             </a:r>
-            <a:endParaRPr lang="es-SV" dirty="0">
-              <a:latin typeface="Times New Roman" panose="02020603050405020304" pitchFamily="18" charset="0"/>
-              <a:ea typeface="Calibri" panose="020F0502020204030204" pitchFamily="34" charset="0"/>
-              <a:cs typeface="Times New Roman" panose="02020603050405020304" pitchFamily="18" charset="0"/>
-            </a:endParaRPr>
           </a:p>
         </p:txBody>
       </p:sp>
@@ -9120,13 +11271,6 @@
   <p:clrMapOvr>
     <a:masterClrMapping/>
   </p:clrMapOvr>
-  <p:timing>
-    <p:tnLst>
-      <p:par>
-        <p:cTn id="1" dur="indefinite" restart="never" nodeType="tmRoot"/>
-      </p:par>
-    </p:tnLst>
-  </p:timing>
 </p:sld>
 </file>
 
@@ -9189,7 +11333,7 @@
         <p:spPr>
           <a:xfrm>
             <a:off x="2351584" y="1988840"/>
-            <a:ext cx="8208912" cy="3585597"/>
+            <a:ext cx="8208912" cy="4103688"/>
           </a:xfrm>
           <a:prstGeom prst="rect">
             <a:avLst/>
@@ -9330,6 +11474,37 @@
               </a:rPr>
               <a:t>GITHUB VS GITLAB</a:t>
             </a:r>
+          </a:p>
+          <a:p>
+            <a:pPr marL="342900" indent="-342900" algn="just">
+              <a:lnSpc>
+                <a:spcPct val="150000"/>
+              </a:lnSpc>
+              <a:spcAft>
+                <a:spcPts val="800"/>
+              </a:spcAft>
+              <a:buFont typeface="Symbol" panose="05050102010706020507" pitchFamily="18" charset="2"/>
+              <a:buChar char=""/>
+            </a:pPr>
+            <a:r>
+              <a:rPr lang="es-SV" dirty="0">
+                <a:solidFill>
+                  <a:srgbClr val="A6A6A6"/>
+                </a:solidFill>
+                <a:latin typeface="Arial" panose="020B0604020202020204" pitchFamily="34" charset="0"/>
+                <a:cs typeface="Arial" panose="020B0604020202020204" pitchFamily="34" charset="0"/>
+              </a:rPr>
+              <a:t>Ejemplo de uso de Git en GITHUB</a:t>
+            </a:r>
+            <a:endParaRPr lang="es-SV" dirty="0">
+              <a:solidFill>
+                <a:schemeClr val="bg1">
+                  <a:lumMod val="65000"/>
+                </a:schemeClr>
+              </a:solidFill>
+              <a:latin typeface="Arial" panose="020B0604020202020204" pitchFamily="34" charset="0"/>
+              <a:cs typeface="Arial" panose="020B0604020202020204" pitchFamily="34" charset="0"/>
+            </a:endParaRPr>
           </a:p>
           <a:p>
             <a:pPr marL="342900" indent="-342900" algn="just">
@@ -9378,13 +11553,6 @@
   <p:clrMapOvr>
     <a:masterClrMapping/>
   </p:clrMapOvr>
-  <p:timing>
-    <p:tnLst>
-      <p:par>
-        <p:cTn id="1" dur="indefinite" restart="never" nodeType="tmRoot"/>
-      </p:par>
-    </p:tnLst>
-  </p:timing>
 </p:sld>
 </file>
 
@@ -9429,14 +11597,11 @@
           <a:p>
             <a:pPr algn="ctr"/>
             <a:r>
-              <a:rPr lang="es-SV" sz="4800" b="1" dirty="0" smtClean="0">
+              <a:rPr lang="es-SV" sz="4800" b="1" dirty="0">
                 <a:latin typeface="+mn-lt"/>
               </a:rPr>
               <a:t>Clasificación y Ejemplos de Sistemas de Control de Versiones</a:t>
             </a:r>
-            <a:endParaRPr lang="es-SV" sz="4800" b="1" dirty="0">
-              <a:latin typeface="+mn-lt"/>
-            </a:endParaRPr>
           </a:p>
         </p:txBody>
       </p:sp>
@@ -9468,14 +11633,14 @@
                 <a:gridCol w="573178">
                   <a:extLst>
                     <a:ext uri="{9D8B030D-6E8A-4147-A177-3AD203B41FA5}">
-                      <a16:colId xmlns:a16="http://schemas.microsoft.com/office/drawing/2014/main" xmlns="" val="2342766503"/>
+                      <a16:colId xmlns:a16="http://schemas.microsoft.com/office/drawing/2014/main" val="2342766503"/>
                     </a:ext>
                   </a:extLst>
                 </a:gridCol>
                 <a:gridCol w="8964523">
                   <a:extLst>
                     <a:ext uri="{9D8B030D-6E8A-4147-A177-3AD203B41FA5}">
-                      <a16:colId xmlns:a16="http://schemas.microsoft.com/office/drawing/2014/main" xmlns="" val="583804734"/>
+                      <a16:colId xmlns:a16="http://schemas.microsoft.com/office/drawing/2014/main" val="583804734"/>
                     </a:ext>
                   </a:extLst>
                 </a:gridCol>
@@ -9488,10 +11653,9 @@
                     <a:p>
                       <a:pPr algn="ctr"/>
                       <a:r>
-                        <a:rPr lang="es-SV" b="1" dirty="0" smtClean="0"/>
+                        <a:rPr lang="es-SV" b="1" dirty="0"/>
                         <a:t>DISTRIBUIDOS</a:t>
                       </a:r>
-                      <a:endParaRPr lang="es-SV" b="1" dirty="0"/>
                     </a:p>
                   </a:txBody>
                   <a:tcPr vert="vert270">
@@ -9582,7 +11746,7 @@
                 </a:tc>
                 <a:extLst>
                   <a:ext uri="{0D108BD9-81ED-4DB2-BD59-A6C34878D82A}">
-                    <a16:rowId xmlns:a16="http://schemas.microsoft.com/office/drawing/2014/main" xmlns="" val="3762790894"/>
+                    <a16:rowId xmlns:a16="http://schemas.microsoft.com/office/drawing/2014/main" val="3762790894"/>
                   </a:ext>
                 </a:extLst>
               </a:tr>
@@ -9594,10 +11758,9 @@
                     <a:p>
                       <a:pPr algn="ctr"/>
                       <a:r>
-                        <a:rPr lang="es-SV" b="1" dirty="0" smtClean="0"/>
+                        <a:rPr lang="es-SV" b="1" dirty="0"/>
                         <a:t>CENTRALIZADOS</a:t>
                       </a:r>
-                      <a:endParaRPr lang="es-SV" b="1" dirty="0"/>
                     </a:p>
                   </a:txBody>
                   <a:tcPr vert="vert270">
@@ -9688,7 +11851,7 @@
                 </a:tc>
                 <a:extLst>
                   <a:ext uri="{0D108BD9-81ED-4DB2-BD59-A6C34878D82A}">
-                    <a16:rowId xmlns:a16="http://schemas.microsoft.com/office/drawing/2014/main" xmlns="" val="2998220991"/>
+                    <a16:rowId xmlns:a16="http://schemas.microsoft.com/office/drawing/2014/main" val="2998220991"/>
                   </a:ext>
                 </a:extLst>
               </a:tr>
@@ -9764,18 +11927,13 @@
             <a:p>
               <a:pPr algn="ctr"/>
               <a:r>
-                <a:rPr lang="es-SV" b="1" spc="300" dirty="0" smtClean="0">
+                <a:rPr lang="es-SV" b="1" spc="300" dirty="0">
                   <a:solidFill>
                     <a:schemeClr val="bg1"/>
                   </a:solidFill>
                 </a:rPr>
                 <a:t>GIT</a:t>
               </a:r>
-              <a:endParaRPr lang="es-SV" b="1" spc="300" dirty="0">
-                <a:solidFill>
-                  <a:schemeClr val="bg1"/>
-                </a:solidFill>
-              </a:endParaRPr>
             </a:p>
           </p:txBody>
         </p:sp>
@@ -9803,18 +11961,13 @@
             <a:p>
               <a:pPr algn="ctr"/>
               <a:r>
-                <a:rPr lang="es-SV" b="1" spc="300" dirty="0" smtClean="0">
+                <a:rPr lang="es-SV" b="1" spc="300" dirty="0">
                   <a:solidFill>
                     <a:schemeClr val="bg1"/>
                   </a:solidFill>
                 </a:rPr>
                 <a:t>MERCURIAL</a:t>
               </a:r>
-              <a:endParaRPr lang="es-SV" b="1" spc="300" dirty="0">
-                <a:solidFill>
-                  <a:schemeClr val="bg1"/>
-                </a:solidFill>
-              </a:endParaRPr>
             </a:p>
           </p:txBody>
         </p:sp>
@@ -9842,18 +11995,13 @@
             <a:p>
               <a:pPr algn="ctr"/>
               <a:r>
-                <a:rPr lang="es-SV" b="1" spc="300" dirty="0" smtClean="0">
+                <a:rPr lang="es-SV" b="1" spc="300" dirty="0">
                   <a:solidFill>
                     <a:schemeClr val="bg1"/>
                   </a:solidFill>
                 </a:rPr>
                 <a:t>CVS</a:t>
               </a:r>
-              <a:endParaRPr lang="es-SV" b="1" spc="300" dirty="0">
-                <a:solidFill>
-                  <a:schemeClr val="bg1"/>
-                </a:solidFill>
-              </a:endParaRPr>
             </a:p>
           </p:txBody>
         </p:sp>
@@ -9881,18 +12029,13 @@
             <a:p>
               <a:pPr algn="ctr"/>
               <a:r>
-                <a:rPr lang="es-SV" b="1" spc="300" dirty="0" smtClean="0">
+                <a:rPr lang="es-SV" b="1" spc="300" dirty="0">
                   <a:solidFill>
                     <a:schemeClr val="bg1"/>
                   </a:solidFill>
                 </a:rPr>
                 <a:t>SVN</a:t>
               </a:r>
-              <a:endParaRPr lang="es-SV" b="1" spc="300" dirty="0">
-                <a:solidFill>
-                  <a:schemeClr val="bg1"/>
-                </a:solidFill>
-              </a:endParaRPr>
             </a:p>
           </p:txBody>
         </p:sp>
@@ -10046,44 +12189,12 @@
                 </a:spcAft>
               </a:pPr>
               <a:r>
-                <a:rPr lang="es-SV" sz="1050" dirty="0" smtClean="0">
-                  <a:ea typeface="Calibri" panose="020F0502020204030204" pitchFamily="34" charset="0"/>
-                  <a:cs typeface="Times New Roman" panose="02020603050405020304" pitchFamily="18" charset="0"/>
-                </a:rPr>
-                <a:t>Se encarga </a:t>
-              </a:r>
-              <a:r>
                 <a:rPr lang="es-SV" sz="1050" dirty="0">
                   <a:ea typeface="Calibri" panose="020F0502020204030204" pitchFamily="34" charset="0"/>
                   <a:cs typeface="Times New Roman" panose="02020603050405020304" pitchFamily="18" charset="0"/>
                 </a:rPr>
-                <a:t>de mantener el registro de todo el trabajo y los cambios en los </a:t>
+                <a:t>Se encarga de mantener el registro de todo el trabajo y los cambios en los ficheros (código fuente principalmente) que conforman un proyecto.</a:t>
               </a:r>
-              <a:r>
-                <a:rPr lang="es-SV" sz="1050" dirty="0" smtClean="0">
-                  <a:ea typeface="Calibri" panose="020F0502020204030204" pitchFamily="34" charset="0"/>
-                  <a:cs typeface="Times New Roman" panose="02020603050405020304" pitchFamily="18" charset="0"/>
-                </a:rPr>
-                <a:t>ficheros </a:t>
-              </a:r>
-              <a:r>
-                <a:rPr lang="es-SV" sz="1050" dirty="0">
-                  <a:ea typeface="Calibri" panose="020F0502020204030204" pitchFamily="34" charset="0"/>
-                  <a:cs typeface="Times New Roman" panose="02020603050405020304" pitchFamily="18" charset="0"/>
-                </a:rPr>
-                <a:t>(código fuente principalmente) que conforman un </a:t>
-              </a:r>
-              <a:r>
-                <a:rPr lang="es-SV" sz="1050" dirty="0" smtClean="0">
-                  <a:ea typeface="Calibri" panose="020F0502020204030204" pitchFamily="34" charset="0"/>
-                  <a:cs typeface="Times New Roman" panose="02020603050405020304" pitchFamily="18" charset="0"/>
-                </a:rPr>
-                <a:t>proyecto.</a:t>
-              </a:r>
-              <a:endParaRPr lang="es-SV" sz="1050" dirty="0">
-                <a:ea typeface="Calibri" panose="020F0502020204030204" pitchFamily="34" charset="0"/>
-                <a:cs typeface="Times New Roman" panose="02020603050405020304" pitchFamily="18" charset="0"/>
-              </a:endParaRPr>
             </a:p>
           </p:txBody>
         </p:sp>
@@ -10142,40 +12253,13 @@
             <a:p>
               <a:pPr algn="ctr"/>
               <a:r>
-                <a:rPr lang="es-SV" sz="1000" dirty="0" smtClean="0">
-                  <a:solidFill>
-                    <a:srgbClr val="000000"/>
-                  </a:solidFill>
-                  <a:ea typeface="Calibri" panose="020F0502020204030204" pitchFamily="34" charset="0"/>
-                </a:rPr>
-                <a:t>Ofrece</a:t>
-              </a:r>
-              <a:r>
                 <a:rPr lang="es-SV" sz="1000" dirty="0">
                   <a:solidFill>
                     <a:srgbClr val="000000"/>
                   </a:solidFill>
                   <a:ea typeface="Calibri" panose="020F0502020204030204" pitchFamily="34" charset="0"/>
                 </a:rPr>
-                <a:t>, entre otras cosas, "una completa ""indexación cruzada"" de ficheros y </a:t>
-              </a:r>
-              <a:r>
-                <a:rPr lang="es-SV" sz="1000" dirty="0" smtClean="0">
-                  <a:solidFill>
-                    <a:srgbClr val="000000"/>
-                  </a:solidFill>
-                  <a:ea typeface="Calibri" panose="020F0502020204030204" pitchFamily="34" charset="0"/>
-                </a:rPr>
-                <a:t>conjuntos </a:t>
-              </a:r>
-              <a:r>
-                <a:rPr lang="es-SV" sz="1000" dirty="0">
-                  <a:solidFill>
-                    <a:srgbClr val="000000"/>
-                  </a:solidFill>
-                  <a:ea typeface="Calibri" panose="020F0502020204030204" pitchFamily="34" charset="0"/>
-                </a:rPr>
-                <a:t>de cambios; unos </a:t>
+                <a:t>Ofrece, entre otras cosas, "una completa ""indexación cruzada"" de ficheros y conjuntos de cambios; unos </a:t>
               </a:r>
               <a:r>
                 <a:rPr lang="es-SV" sz="1000" u="sng" dirty="0">
@@ -10222,18 +12306,17 @@
             <a:p>
               <a:pPr algn="ctr"/>
               <a:r>
-                <a:rPr lang="es-SV" sz="1000" dirty="0" smtClean="0"/>
+                <a:rPr lang="es-SV" sz="1000" dirty="0"/>
                 <a:t>Es un </a:t>
               </a:r>
               <a:r>
-                <a:rPr lang="es-SV" sz="1000" dirty="0" err="1" smtClean="0"/>
+                <a:rPr lang="es-SV" sz="1000" dirty="0" err="1"/>
                 <a:t>SCV</a:t>
               </a:r>
               <a:r>
-                <a:rPr lang="es-SV" sz="1000" dirty="0" smtClean="0"/>
+                <a:rPr lang="es-SV" sz="1000" dirty="0"/>
                 <a:t> gratuito y de código abierto diseñado para manejar todo, desde proyectos pequeños hasta muy grandes, con rapidez y eficiencia.</a:t>
               </a:r>
-              <a:endParaRPr lang="es-SV" sz="1000" dirty="0"/>
             </a:p>
           </p:txBody>
         </p:sp>
@@ -10248,13 +12331,6 @@
   <p:clrMapOvr>
     <a:masterClrMapping/>
   </p:clrMapOvr>
-  <p:timing>
-    <p:tnLst>
-      <p:par>
-        <p:cTn id="1" dur="indefinite" restart="never" nodeType="tmRoot"/>
-      </p:par>
-    </p:tnLst>
-  </p:timing>
 </p:sld>
 </file>
 
@@ -10317,7 +12393,7 @@
         <p:spPr>
           <a:xfrm>
             <a:off x="2351584" y="1988840"/>
-            <a:ext cx="8208912" cy="3585597"/>
+            <a:ext cx="8208912" cy="4103688"/>
           </a:xfrm>
           <a:prstGeom prst="rect">
             <a:avLst/>
@@ -10458,6 +12534,37 @@
               </a:rPr>
               <a:t>GITHUB VS GITLAB</a:t>
             </a:r>
+          </a:p>
+          <a:p>
+            <a:pPr marL="342900" indent="-342900" algn="just">
+              <a:lnSpc>
+                <a:spcPct val="150000"/>
+              </a:lnSpc>
+              <a:spcAft>
+                <a:spcPts val="800"/>
+              </a:spcAft>
+              <a:buFont typeface="Symbol" panose="05050102010706020507" pitchFamily="18" charset="2"/>
+              <a:buChar char=""/>
+            </a:pPr>
+            <a:r>
+              <a:rPr lang="es-SV" dirty="0">
+                <a:solidFill>
+                  <a:srgbClr val="A6A6A6"/>
+                </a:solidFill>
+                <a:latin typeface="Arial" panose="020B0604020202020204" pitchFamily="34" charset="0"/>
+                <a:cs typeface="Arial" panose="020B0604020202020204" pitchFamily="34" charset="0"/>
+              </a:rPr>
+              <a:t>Ejemplo de uso de Git en GITHUB</a:t>
+            </a:r>
+            <a:endParaRPr lang="es-SV" dirty="0">
+              <a:solidFill>
+                <a:schemeClr val="bg1">
+                  <a:lumMod val="65000"/>
+                </a:schemeClr>
+              </a:solidFill>
+              <a:latin typeface="Arial" panose="020B0604020202020204" pitchFamily="34" charset="0"/>
+              <a:cs typeface="Arial" panose="020B0604020202020204" pitchFamily="34" charset="0"/>
+            </a:endParaRPr>
           </a:p>
           <a:p>
             <a:pPr marL="342900" indent="-342900" algn="just">
@@ -10506,13 +12613,6 @@
   <p:clrMapOvr>
     <a:masterClrMapping/>
   </p:clrMapOvr>
-  <p:timing>
-    <p:tnLst>
-      <p:par>
-        <p:cTn id="1" dur="indefinite" restart="never" nodeType="tmRoot"/>
-      </p:par>
-    </p:tnLst>
-  </p:timing>
 </p:sld>
 </file>
 
@@ -10557,14 +12657,11 @@
           <a:p>
             <a:pPr algn="ctr"/>
             <a:r>
-              <a:rPr lang="es-SV" sz="4800" b="1" dirty="0" smtClean="0">
+              <a:rPr lang="es-SV" sz="4800" b="1" dirty="0">
                 <a:latin typeface="+mn-lt"/>
               </a:rPr>
               <a:t>Ventajas y Desventajas de los Sistemas de Control de Versiones</a:t>
             </a:r>
-            <a:endParaRPr lang="es-SV" sz="4800" b="1" dirty="0">
-              <a:latin typeface="+mn-lt"/>
-            </a:endParaRPr>
           </a:p>
         </p:txBody>
       </p:sp>
@@ -10636,10 +12733,9 @@
             <a:p>
               <a:pPr algn="ctr"/>
               <a:r>
-                <a:rPr lang="es-SV" b="1" dirty="0" smtClean="0"/>
+                <a:rPr lang="es-SV" b="1" dirty="0"/>
                 <a:t>VENTAJAS</a:t>
               </a:r>
-              <a:endParaRPr lang="es-SV" b="1" dirty="0"/>
             </a:p>
           </p:txBody>
         </p:sp>
@@ -10667,10 +12763,9 @@
             <a:p>
               <a:pPr algn="ctr"/>
               <a:r>
-                <a:rPr lang="es-SV" b="1" dirty="0" smtClean="0"/>
+                <a:rPr lang="es-SV" b="1" dirty="0"/>
                 <a:t>DESVENTAJAS</a:t>
               </a:r>
-              <a:endParaRPr lang="es-SV" b="1" dirty="0"/>
             </a:p>
           </p:txBody>
         </p:sp>
@@ -10697,10 +12792,9 @@
             <a:lstStyle/>
             <a:p>
               <a:r>
-                <a:rPr lang="es-SV" b="1" dirty="0" smtClean="0"/>
+                <a:rPr lang="es-SV" b="1" dirty="0"/>
                 <a:t>DISTRIBUIDOS</a:t>
               </a:r>
-              <a:endParaRPr lang="es-SV" b="1" dirty="0"/>
             </a:p>
           </p:txBody>
         </p:sp>
@@ -10727,10 +12821,9 @@
             <a:lstStyle/>
             <a:p>
               <a:r>
-                <a:rPr lang="es-SV" b="1" dirty="0" smtClean="0"/>
+                <a:rPr lang="es-SV" b="1" dirty="0"/>
                 <a:t>CENTRALIZADOS</a:t>
               </a:r>
-              <a:endParaRPr lang="es-SV" b="1" dirty="0"/>
             </a:p>
           </p:txBody>
         </p:sp>
@@ -10944,16 +13037,6 @@
                 </a:tabLst>
               </a:pPr>
               <a:r>
-                <a:rPr lang="es-SV" sz="1000" dirty="0" smtClean="0">
-                  <a:solidFill>
-                    <a:srgbClr val="000000"/>
-                  </a:solidFill>
-                  <a:ea typeface="Times New Roman" panose="02020603050405020304" pitchFamily="18" charset="0"/>
-                  <a:cs typeface="Times New Roman" panose="02020603050405020304" pitchFamily="18" charset="0"/>
-                </a:rPr>
-                <a:t>El </a:t>
-              </a:r>
-              <a:r>
                 <a:rPr lang="es-SV" sz="1000" dirty="0">
                   <a:solidFill>
                     <a:srgbClr val="000000"/>
@@ -10961,7 +13044,7 @@
                   <a:ea typeface="Times New Roman" panose="02020603050405020304" pitchFamily="18" charset="0"/>
                   <a:cs typeface="Times New Roman" panose="02020603050405020304" pitchFamily="18" charset="0"/>
                 </a:rPr>
-                <a:t>servidor remoto requiere menos recursos que los que necesitaría un servidor centralizado ya que gran parte del trabajo lo realizan los repositorios locales.</a:t>
+                <a:t>El servidor remoto requiere menos recursos que los que necesitaría un servidor centralizado ya que gran parte del trabajo lo realizan los repositorios locales.</a:t>
               </a:r>
               <a:endParaRPr lang="es-SV" sz="1000" dirty="0">
                 <a:solidFill>
@@ -11023,14 +13106,7 @@
                   <a:ea typeface="Calibri" panose="020F0502020204030204" pitchFamily="34" charset="0"/>
                   <a:cs typeface="Times New Roman" panose="02020603050405020304" pitchFamily="18" charset="0"/>
                 </a:rPr>
-                <a:t>. No hay que fiarse de que </a:t>
-              </a:r>
-              <a:r>
-                <a:rPr lang="es-SV" sz="1000" dirty="0" smtClean="0">
-                  <a:ea typeface="Calibri" panose="020F0502020204030204" pitchFamily="34" charset="0"/>
-                  <a:cs typeface="Times New Roman" panose="02020603050405020304" pitchFamily="18" charset="0"/>
-                </a:rPr>
-                <a:t>el </a:t>
+                <a:t>. No hay que fiarse de que el </a:t>
               </a:r>
               <a:r>
                 <a:rPr lang="es-SV" sz="1000" dirty="0" err="1">
@@ -11044,14 +13120,7 @@
                   <a:ea typeface="Calibri" panose="020F0502020204030204" pitchFamily="34" charset="0"/>
                   <a:cs typeface="Times New Roman" panose="02020603050405020304" pitchFamily="18" charset="0"/>
                 </a:rPr>
-                <a:t> reside en otro </a:t>
-              </a:r>
-              <a:r>
-                <a:rPr lang="es-SV" sz="1000" dirty="0" smtClean="0">
-                  <a:ea typeface="Calibri" panose="020F0502020204030204" pitchFamily="34" charset="0"/>
-                  <a:cs typeface="Times New Roman" panose="02020603050405020304" pitchFamily="18" charset="0"/>
-                </a:rPr>
-                <a:t>usuario.</a:t>
+                <a:t> reside en otro usuario.</a:t>
               </a:r>
             </a:p>
             <a:p>
@@ -11084,14 +13153,7 @@
                   <a:ea typeface="Calibri" panose="020F0502020204030204" pitchFamily="34" charset="0"/>
                   <a:cs typeface="Times New Roman" panose="02020603050405020304" pitchFamily="18" charset="0"/>
                 </a:rPr>
-                <a:t>Realmente no hay una última versión. Si no hay un repositorio central no hay manera de saber cuál es la última versión estable del producto</a:t>
-              </a:r>
-              <a:r>
-                <a:rPr lang="es-SV" sz="1000" dirty="0" smtClean="0">
-                  <a:ea typeface="Calibri" panose="020F0502020204030204" pitchFamily="34" charset="0"/>
-                  <a:cs typeface="Times New Roman" panose="02020603050405020304" pitchFamily="18" charset="0"/>
-                </a:rPr>
-                <a:t>.</a:t>
+                <a:t>Realmente no hay una última versión. Si no hay un repositorio central no hay manera de saber cuál es la última versión estable del producto.</a:t>
               </a:r>
             </a:p>
             <a:p>
@@ -11124,21 +13186,7 @@
                   <a:ea typeface="Calibri" panose="020F0502020204030204" pitchFamily="34" charset="0"/>
                   <a:cs typeface="Times New Roman" panose="02020603050405020304" pitchFamily="18" charset="0"/>
                 </a:rPr>
-                <a:t>Realmente no hay números de versión. Cada repositorio tiene sus propios números de revisión dependiendo de los </a:t>
-              </a:r>
-              <a:r>
-                <a:rPr lang="es-SV" sz="1000" dirty="0" smtClean="0">
-                  <a:ea typeface="Calibri" panose="020F0502020204030204" pitchFamily="34" charset="0"/>
-                  <a:cs typeface="Times New Roman" panose="02020603050405020304" pitchFamily="18" charset="0"/>
-                </a:rPr>
-                <a:t>cambios, Aunque se puede etiquetar </a:t>
-              </a:r>
-              <a:r>
-                <a:rPr lang="es-SV" sz="1000" dirty="0">
-                  <a:ea typeface="Calibri" panose="020F0502020204030204" pitchFamily="34" charset="0"/>
-                  <a:cs typeface="Times New Roman" panose="02020603050405020304" pitchFamily="18" charset="0"/>
-                </a:rPr>
-                <a:t>cada versión.</a:t>
+                <a:t>Realmente no hay números de versión. Cada repositorio tiene sus propios números de revisión dependiendo de los cambios, Aunque se puede etiquetar cada versión.</a:t>
               </a:r>
             </a:p>
           </p:txBody>
@@ -11167,10 +13215,9 @@
             <a:p>
               <a:pPr algn="ctr"/>
               <a:r>
-                <a:rPr lang="es-SV" b="1" spc="600" dirty="0" smtClean="0"/>
+                <a:rPr lang="es-SV" b="1" spc="600" dirty="0"/>
                 <a:t>CONTROL DE VERSIONES</a:t>
               </a:r>
-              <a:endParaRPr lang="es-SV" b="1" spc="600" dirty="0"/>
             </a:p>
           </p:txBody>
         </p:sp>
@@ -11185,13 +13232,6 @@
   <p:clrMapOvr>
     <a:masterClrMapping/>
   </p:clrMapOvr>
-  <p:timing>
-    <p:tnLst>
-      <p:par>
-        <p:cTn id="1" dur="indefinite" restart="never" nodeType="tmRoot"/>
-      </p:par>
-    </p:tnLst>
-  </p:timing>
 </p:sld>
 </file>
 

</xml_diff>